<commit_message>
PPT almost ready only missing subsytem test slides
</commit_message>
<xml_diff>
--- a/Presentation1.pptx
+++ b/Presentation1.pptx
@@ -10,20 +10,17 @@
     <p:sldId id="275" r:id="rId4"/>
     <p:sldId id="277" r:id="rId5"/>
     <p:sldId id="260" r:id="rId6"/>
-    <p:sldId id="262" r:id="rId7"/>
+    <p:sldId id="286" r:id="rId7"/>
     <p:sldId id="263" r:id="rId8"/>
     <p:sldId id="264" r:id="rId9"/>
     <p:sldId id="265" r:id="rId10"/>
-    <p:sldId id="266" r:id="rId11"/>
-    <p:sldId id="278" r:id="rId12"/>
-    <p:sldId id="279" r:id="rId13"/>
-    <p:sldId id="280" r:id="rId14"/>
-    <p:sldId id="268" r:id="rId15"/>
-    <p:sldId id="269" r:id="rId16"/>
-    <p:sldId id="270" r:id="rId17"/>
-    <p:sldId id="271" r:id="rId18"/>
-    <p:sldId id="272" r:id="rId19"/>
-    <p:sldId id="273" r:id="rId20"/>
+    <p:sldId id="281" r:id="rId11"/>
+    <p:sldId id="268" r:id="rId12"/>
+    <p:sldId id="269" r:id="rId13"/>
+    <p:sldId id="282" r:id="rId14"/>
+    <p:sldId id="283" r:id="rId15"/>
+    <p:sldId id="284" r:id="rId16"/>
+    <p:sldId id="285" r:id="rId17"/>
   </p:sldIdLst>
   <p:sldSz cx="12192000" cy="6858000"/>
   <p:notesSz cx="6858000" cy="9144000"/>
@@ -7865,57 +7862,28 @@
           <a:chExt cx="0" cy="0"/>
         </a:xfrm>
       </p:grpSpPr>
-      <p:sp>
-        <p:nvSpPr>
-          <p:cNvPr id="2" name="Title 1">
+      <p:graphicFrame>
+        <p:nvGraphicFramePr>
+          <p:cNvPr id="2" name="Content Placeholder 3">
             <a:extLst>
               <a:ext uri="{FF2B5EF4-FFF2-40B4-BE49-F238E27FC236}">
-                <a16:creationId xmlns:a16="http://schemas.microsoft.com/office/drawing/2014/main" id="{FD5C20F7-B6B6-344E-B9AE-99ABE4AEDE21}"/>
-              </a:ext>
-            </a:extLst>
-          </p:cNvPr>
-          <p:cNvSpPr>
-            <a:spLocks noGrp="1"/>
-          </p:cNvSpPr>
-          <p:nvPr>
-            <p:ph type="title"/>
-          </p:nvPr>
-        </p:nvSpPr>
-        <p:spPr/>
-        <p:txBody>
-          <a:bodyPr/>
-          <a:lstStyle/>
-          <a:p>
-            <a:r>
-              <a:rPr lang="en-US" dirty="0"/>
-              <a:t>Unit Tests</a:t>
-            </a:r>
-          </a:p>
-        </p:txBody>
-      </p:sp>
-      <p:graphicFrame>
-        <p:nvGraphicFramePr>
-          <p:cNvPr id="4" name="Content Placeholder 3">
-            <a:extLst>
-              <a:ext uri="{FF2B5EF4-FFF2-40B4-BE49-F238E27FC236}">
-                <a16:creationId xmlns:a16="http://schemas.microsoft.com/office/drawing/2014/main" id="{D701F141-9382-FC4B-8E68-B162488F6095}"/>
+                <a16:creationId xmlns:a16="http://schemas.microsoft.com/office/drawing/2014/main" id="{3BEE3847-DAF6-7042-A6CF-2523D85B41E9}"/>
               </a:ext>
             </a:extLst>
           </p:cNvPr>
           <p:cNvGraphicFramePr>
-            <a:graphicFrameLocks noGrp="1"/>
+            <a:graphicFrameLocks/>
           </p:cNvGraphicFramePr>
           <p:nvPr>
-            <p:ph idx="1"/>
             <p:extLst>
               <p:ext uri="{D42A27DB-BD31-4B8C-83A1-F6EECF244321}">
-                <p14:modId xmlns:p14="http://schemas.microsoft.com/office/powerpoint/2010/main" val="1792746435"/>
+                <p14:modId xmlns:p14="http://schemas.microsoft.com/office/powerpoint/2010/main" val="1508559319"/>
               </p:ext>
             </p:extLst>
           </p:nvPr>
         </p:nvGraphicFramePr>
         <p:xfrm>
-          <a:off x="680320" y="1606443"/>
+          <a:off x="680320" y="1510191"/>
           <a:ext cx="9613861" cy="4633719"/>
         </p:xfrm>
         <a:graphic>
@@ -8655,10 +8623,63 @@
           </a:graphicData>
         </a:graphic>
       </p:graphicFrame>
+      <p:sp>
+        <p:nvSpPr>
+          <p:cNvPr id="3" name="Title 1">
+            <a:extLst>
+              <a:ext uri="{FF2B5EF4-FFF2-40B4-BE49-F238E27FC236}">
+                <a16:creationId xmlns:a16="http://schemas.microsoft.com/office/drawing/2014/main" id="{018C3A98-7EFE-7446-A0DB-5F1EE6C4792B}"/>
+              </a:ext>
+            </a:extLst>
+          </p:cNvPr>
+          <p:cNvSpPr txBox="1">
+            <a:spLocks/>
+          </p:cNvSpPr>
+          <p:nvPr/>
+        </p:nvSpPr>
+        <p:spPr>
+          <a:xfrm>
+            <a:off x="680321" y="753228"/>
+            <a:ext cx="9613861" cy="1080938"/>
+          </a:xfrm>
+          <a:prstGeom prst="rect">
+            <a:avLst/>
+          </a:prstGeom>
+        </p:spPr>
+        <p:txBody>
+          <a:bodyPr/>
+          <a:lstStyle>
+            <a:lvl1pPr algn="l" defTabSz="914400" rtl="0" eaLnBrk="1" latinLnBrk="0" hangingPunct="1">
+              <a:lnSpc>
+                <a:spcPct val="90000"/>
+              </a:lnSpc>
+              <a:spcBef>
+                <a:spcPct val="0"/>
+              </a:spcBef>
+              <a:buNone/>
+              <a:defRPr sz="3600" kern="1200">
+                <a:solidFill>
+                  <a:schemeClr val="tx1"/>
+                </a:solidFill>
+                <a:latin typeface="+mj-lt"/>
+                <a:ea typeface="+mj-ea"/>
+                <a:cs typeface="+mj-cs"/>
+              </a:defRPr>
+            </a:lvl1pPr>
+          </a:lstStyle>
+          <a:p>
+            <a:r>
+              <a:rPr lang="en-US"/>
+              <a:t>Unit Tests</a:t>
+            </a:r>
+            <a:endParaRPr lang="en-US" dirty="0"/>
+          </a:p>
+        </p:txBody>
+      </p:sp>
     </p:spTree>
     <p:extLst>
       <p:ext uri="{BB962C8B-B14F-4D97-AF65-F5344CB8AC3E}">
-        <p14:creationId xmlns:p14="http://schemas.microsoft.com/office/powerpoint/2010/main" val="2459518993"/>
+        <p14:creationId xmlns:p14="http://schemas.microsoft.com/office/powerpoint/2010/main" val="1071875757"/>
       </p:ext>
     </p:extLst>
   </p:cSld>
@@ -8690,7 +8711,7 @@
           <p:cNvPr id="2" name="Title 1">
             <a:extLst>
               <a:ext uri="{FF2B5EF4-FFF2-40B4-BE49-F238E27FC236}">
-                <a16:creationId xmlns:a16="http://schemas.microsoft.com/office/drawing/2014/main" id="{445B66D5-4A66-EF48-AB13-8A23953255C0}"/>
+                <a16:creationId xmlns:a16="http://schemas.microsoft.com/office/drawing/2014/main" id="{DE7F5719-5653-1047-BA4E-4ED7E0B26388}"/>
               </a:ext>
             </a:extLst>
           </p:cNvPr>
@@ -8706,7 +8727,10 @@
           <a:bodyPr/>
           <a:lstStyle/>
           <a:p>
-            <a:endParaRPr lang="en-US"/>
+            <a:r>
+              <a:rPr lang="en-US" dirty="0"/>
+              <a:t>Subsystem Tests</a:t>
+            </a:r>
           </a:p>
         </p:txBody>
       </p:sp>
@@ -8715,7 +8739,7 @@
           <p:cNvPr id="3" name="Content Placeholder 2">
             <a:extLst>
               <a:ext uri="{FF2B5EF4-FFF2-40B4-BE49-F238E27FC236}">
-                <a16:creationId xmlns:a16="http://schemas.microsoft.com/office/drawing/2014/main" id="{B291ADC6-8367-3F41-9728-AD399C09F22B}"/>
+                <a16:creationId xmlns:a16="http://schemas.microsoft.com/office/drawing/2014/main" id="{A4770D8C-886E-CC42-9A2F-25290EA19401}"/>
               </a:ext>
             </a:extLst>
           </p:cNvPr>
@@ -8731,14 +8755,14 @@
           <a:bodyPr/>
           <a:lstStyle/>
           <a:p>
-            <a:endParaRPr lang="en-US"/>
+            <a:endParaRPr lang="en-US" dirty="0"/>
           </a:p>
         </p:txBody>
       </p:sp>
     </p:spTree>
     <p:extLst>
       <p:ext uri="{BB962C8B-B14F-4D97-AF65-F5344CB8AC3E}">
-        <p14:creationId xmlns:p14="http://schemas.microsoft.com/office/powerpoint/2010/main" val="1239801677"/>
+        <p14:creationId xmlns:p14="http://schemas.microsoft.com/office/powerpoint/2010/main" val="3198564959"/>
       </p:ext>
     </p:extLst>
   </p:cSld>
@@ -8749,6 +8773,89 @@
 </file>
 
 <file path=ppt/slides/slide12.xml><?xml version="1.0" encoding="utf-8"?>
+<p:sld xmlns:a="http://schemas.openxmlformats.org/drawingml/2006/main" xmlns:r="http://schemas.openxmlformats.org/officeDocument/2006/relationships" xmlns:p="http://schemas.openxmlformats.org/presentationml/2006/main">
+  <p:cSld>
+    <p:spTree>
+      <p:nvGrpSpPr>
+        <p:cNvPr id="1" name=""/>
+        <p:cNvGrpSpPr/>
+        <p:nvPr/>
+      </p:nvGrpSpPr>
+      <p:grpSpPr>
+        <a:xfrm>
+          <a:off x="0" y="0"/>
+          <a:ext cx="0" cy="0"/>
+          <a:chOff x="0" y="0"/>
+          <a:chExt cx="0" cy="0"/>
+        </a:xfrm>
+      </p:grpSpPr>
+      <p:sp>
+        <p:nvSpPr>
+          <p:cNvPr id="2" name="Title 1">
+            <a:extLst>
+              <a:ext uri="{FF2B5EF4-FFF2-40B4-BE49-F238E27FC236}">
+                <a16:creationId xmlns:a16="http://schemas.microsoft.com/office/drawing/2014/main" id="{36260049-BECA-1D4C-ABF1-D6343EE7F226}"/>
+              </a:ext>
+            </a:extLst>
+          </p:cNvPr>
+          <p:cNvSpPr>
+            <a:spLocks noGrp="1"/>
+          </p:cNvSpPr>
+          <p:nvPr>
+            <p:ph type="title"/>
+          </p:nvPr>
+        </p:nvSpPr>
+        <p:spPr/>
+        <p:txBody>
+          <a:bodyPr/>
+          <a:lstStyle/>
+          <a:p>
+            <a:r>
+              <a:rPr lang="en-US" dirty="0"/>
+              <a:t>Subsystem Tests</a:t>
+            </a:r>
+          </a:p>
+        </p:txBody>
+      </p:sp>
+      <p:sp>
+        <p:nvSpPr>
+          <p:cNvPr id="3" name="Content Placeholder 2">
+            <a:extLst>
+              <a:ext uri="{FF2B5EF4-FFF2-40B4-BE49-F238E27FC236}">
+                <a16:creationId xmlns:a16="http://schemas.microsoft.com/office/drawing/2014/main" id="{1A35579C-D1B0-FA46-A057-796F118E5D5D}"/>
+              </a:ext>
+            </a:extLst>
+          </p:cNvPr>
+          <p:cNvSpPr>
+            <a:spLocks noGrp="1"/>
+          </p:cNvSpPr>
+          <p:nvPr>
+            <p:ph idx="1"/>
+          </p:nvPr>
+        </p:nvSpPr>
+        <p:spPr/>
+        <p:txBody>
+          <a:bodyPr/>
+          <a:lstStyle/>
+          <a:p>
+            <a:endParaRPr lang="en-US"/>
+          </a:p>
+        </p:txBody>
+      </p:sp>
+    </p:spTree>
+    <p:extLst>
+      <p:ext uri="{BB962C8B-B14F-4D97-AF65-F5344CB8AC3E}">
+        <p14:creationId xmlns:p14="http://schemas.microsoft.com/office/powerpoint/2010/main" val="3797687294"/>
+      </p:ext>
+    </p:extLst>
+  </p:cSld>
+  <p:clrMapOvr>
+    <a:masterClrMapping/>
+  </p:clrMapOvr>
+</p:sld>
+</file>
+
+<file path=ppt/slides/slide13.xml><?xml version="1.0" encoding="utf-8"?>
 <p:sld xmlns:a="http://schemas.openxmlformats.org/drawingml/2006/main" xmlns:r="http://schemas.openxmlformats.org/officeDocument/2006/relationships" xmlns:p="http://schemas.openxmlformats.org/presentationml/2006/main">
   <p:cSld>
     <p:spTree>
@@ -9007,7 +9114,7 @@
           <p:nvPr>
             <p:extLst>
               <p:ext uri="{D42A27DB-BD31-4B8C-83A1-F6EECF244321}">
-                <p14:modId xmlns:p14="http://schemas.microsoft.com/office/powerpoint/2010/main" val="3989218014"/>
+                <p14:modId xmlns:p14="http://schemas.microsoft.com/office/powerpoint/2010/main" val="1187042348"/>
               </p:ext>
             </p:extLst>
           </p:nvPr>
@@ -9056,12 +9163,12 @@
                         </a:spcAft>
                       </a:pPr>
                       <a:r>
-                        <a:rPr lang="en-US" sz="1100">
+                        <a:rPr lang="en-US" sz="1600">
                           <a:effectLst/>
                         </a:rPr>
                         <a:t>employer</a:t>
                       </a:r>
-                      <a:endParaRPr lang="en-US" sz="1200">
+                      <a:endParaRPr lang="en-US" sz="1600">
                         <a:effectLst/>
                         <a:latin typeface="Times New Roman" panose="02020603050405020304" pitchFamily="18" charset="0"/>
                         <a:ea typeface="Calibri" panose="020F0502020204030204" pitchFamily="34" charset="0"/>
@@ -9105,12 +9212,12 @@
                         </a:spcAft>
                       </a:pPr>
                       <a:r>
-                        <a:rPr lang="en-US" sz="1100">
+                        <a:rPr lang="en-US" sz="1600">
                           <a:effectLst/>
                         </a:rPr>
                         <a:t>username</a:t>
                       </a:r>
-                      <a:endParaRPr lang="en-US" sz="1200">
+                      <a:endParaRPr lang="en-US" sz="1600">
                         <a:effectLst/>
                         <a:latin typeface="Times New Roman" panose="02020603050405020304" pitchFamily="18" charset="0"/>
                         <a:ea typeface="Calibri" panose="020F0502020204030204" pitchFamily="34" charset="0"/>
@@ -9137,12 +9244,12 @@
                         </a:spcAft>
                       </a:pPr>
                       <a:r>
-                        <a:rPr lang="en-US" sz="1100">
+                        <a:rPr lang="en-US" sz="1600">
                           <a:effectLst/>
                         </a:rPr>
                         <a:t>password</a:t>
                       </a:r>
-                      <a:endParaRPr lang="en-US" sz="1200">
+                      <a:endParaRPr lang="en-US" sz="1600">
                         <a:effectLst/>
                         <a:latin typeface="Times New Roman" panose="02020603050405020304" pitchFamily="18" charset="0"/>
                         <a:ea typeface="Calibri" panose="020F0502020204030204" pitchFamily="34" charset="0"/>
@@ -9176,12 +9283,12 @@
                         </a:spcAft>
                       </a:pPr>
                       <a:r>
-                        <a:rPr lang="en-US" sz="1100">
+                        <a:rPr lang="en-US" sz="1600">
                           <a:effectLst/>
                         </a:rPr>
                         <a:t>user1</a:t>
                       </a:r>
-                      <a:endParaRPr lang="en-US" sz="1200">
+                      <a:endParaRPr lang="en-US" sz="1600">
                         <a:effectLst/>
                         <a:latin typeface="Times New Roman" panose="02020603050405020304" pitchFamily="18" charset="0"/>
                         <a:ea typeface="Calibri" panose="020F0502020204030204" pitchFamily="34" charset="0"/>
@@ -9208,12 +9315,12 @@
                         </a:spcAft>
                       </a:pPr>
                       <a:r>
-                        <a:rPr lang="en-US" sz="1100" dirty="0">
+                        <a:rPr lang="en-US" sz="1600" dirty="0">
                           <a:effectLst/>
                         </a:rPr>
                         <a:t>user1</a:t>
                       </a:r>
-                      <a:endParaRPr lang="en-US" sz="1200" dirty="0">
+                      <a:endParaRPr lang="en-US" sz="1600" dirty="0">
                         <a:effectLst/>
                         <a:latin typeface="Times New Roman" panose="02020603050405020304" pitchFamily="18" charset="0"/>
                         <a:ea typeface="Calibri" panose="020F0502020204030204" pitchFamily="34" charset="0"/>
@@ -9288,7 +9395,7 @@
     </p:spTree>
     <p:extLst>
       <p:ext uri="{BB962C8B-B14F-4D97-AF65-F5344CB8AC3E}">
-        <p14:creationId xmlns:p14="http://schemas.microsoft.com/office/powerpoint/2010/main" val="4087857999"/>
+        <p14:creationId xmlns:p14="http://schemas.microsoft.com/office/powerpoint/2010/main" val="1007734018"/>
       </p:ext>
     </p:extLst>
   </p:cSld>
@@ -9298,7 +9405,7 @@
 </p:sld>
 </file>
 
-<file path=ppt/slides/slide13.xml><?xml version="1.0" encoding="utf-8"?>
+<file path=ppt/slides/slide14.xml><?xml version="1.0" encoding="utf-8"?>
 <p:sld xmlns:a="http://schemas.openxmlformats.org/drawingml/2006/main" xmlns:r="http://schemas.openxmlformats.org/officeDocument/2006/relationships" xmlns:p="http://schemas.openxmlformats.org/presentationml/2006/main">
   <p:cSld>
     <p:spTree>
@@ -9610,8 +9717,8 @@
         </p:nvSpPr>
         <p:spPr>
           <a:xfrm>
-            <a:off x="600110" y="3048001"/>
-            <a:ext cx="9613861" cy="1737212"/>
+            <a:off x="539951" y="2935706"/>
+            <a:ext cx="10388731" cy="1106904"/>
           </a:xfrm>
           <a:prstGeom prst="rect">
             <a:avLst/>
@@ -9794,104 +9901,1072 @@
           <a:p>
             <a:pPr lvl="1"/>
             <a:r>
-              <a:rPr lang="en-US" b="1" dirty="0"/>
-              <a:t>New employee will be added to the </a:t>
-            </a:r>
-            <a:r>
-              <a:rPr lang="en-US" b="1"/>
-              <a:t>PMS database</a:t>
-            </a:r>
-            <a:endParaRPr lang="en-US" b="1" dirty="0"/>
+              <a:rPr lang="en-US" dirty="0"/>
+              <a:t>New employee will be added to the PMS database (the following row will be added to </a:t>
+            </a:r>
+            <a:r>
+              <a:rPr lang="en-US" i="1" dirty="0"/>
+              <a:t>employees </a:t>
+            </a:r>
+            <a:r>
+              <a:rPr lang="en-US" dirty="0"/>
+              <a:t>table of the DB).</a:t>
+            </a:r>
           </a:p>
         </p:txBody>
       </p:sp>
+      <p:graphicFrame>
+        <p:nvGraphicFramePr>
+          <p:cNvPr id="12" name="Table 11">
+            <a:extLst>
+              <a:ext uri="{FF2B5EF4-FFF2-40B4-BE49-F238E27FC236}">
+                <a16:creationId xmlns:a16="http://schemas.microsoft.com/office/drawing/2014/main" id="{AEC270BB-1814-6346-A5E8-8AAFC4CA60C5}"/>
+              </a:ext>
+            </a:extLst>
+          </p:cNvPr>
+          <p:cNvGraphicFramePr>
+            <a:graphicFrameLocks noGrp="1"/>
+          </p:cNvGraphicFramePr>
+          <p:nvPr/>
+        </p:nvGraphicFramePr>
+        <p:xfrm>
+          <a:off x="479794" y="4334024"/>
+          <a:ext cx="11074535" cy="1831467"/>
+        </p:xfrm>
+        <a:graphic>
+          <a:graphicData uri="http://schemas.openxmlformats.org/drawingml/2006/table">
+            <a:tbl>
+              <a:tblPr firstRow="1" firstCol="1" bandRow="1">
+                <a:tableStyleId>{5C22544A-7EE6-4342-B048-85BDC9FD1C3A}</a:tableStyleId>
+              </a:tblPr>
+              <a:tblGrid>
+                <a:gridCol w="950828">
+                  <a:extLst>
+                    <a:ext uri="{9D8B030D-6E8A-4147-A177-3AD203B41FA5}">
+                      <a16:colId xmlns:a16="http://schemas.microsoft.com/office/drawing/2014/main" val="2204404661"/>
+                    </a:ext>
+                  </a:extLst>
+                </a:gridCol>
+                <a:gridCol w="739074">
+                  <a:extLst>
+                    <a:ext uri="{9D8B030D-6E8A-4147-A177-3AD203B41FA5}">
+                      <a16:colId xmlns:a16="http://schemas.microsoft.com/office/drawing/2014/main" val="3253727166"/>
+                    </a:ext>
+                  </a:extLst>
+                </a:gridCol>
+                <a:gridCol w="850231">
+                  <a:extLst>
+                    <a:ext uri="{9D8B030D-6E8A-4147-A177-3AD203B41FA5}">
+                      <a16:colId xmlns:a16="http://schemas.microsoft.com/office/drawing/2014/main" val="2254588445"/>
+                    </a:ext>
+                  </a:extLst>
+                </a:gridCol>
+                <a:gridCol w="641684">
+                  <a:extLst>
+                    <a:ext uri="{9D8B030D-6E8A-4147-A177-3AD203B41FA5}">
+                      <a16:colId xmlns:a16="http://schemas.microsoft.com/office/drawing/2014/main" val="1572357578"/>
+                    </a:ext>
+                  </a:extLst>
+                </a:gridCol>
+                <a:gridCol w="1138990">
+                  <a:extLst>
+                    <a:ext uri="{9D8B030D-6E8A-4147-A177-3AD203B41FA5}">
+                      <a16:colId xmlns:a16="http://schemas.microsoft.com/office/drawing/2014/main" val="2098747580"/>
+                    </a:ext>
+                  </a:extLst>
+                </a:gridCol>
+                <a:gridCol w="1042737">
+                  <a:extLst>
+                    <a:ext uri="{9D8B030D-6E8A-4147-A177-3AD203B41FA5}">
+                      <a16:colId xmlns:a16="http://schemas.microsoft.com/office/drawing/2014/main" val="1029581821"/>
+                    </a:ext>
+                  </a:extLst>
+                </a:gridCol>
+                <a:gridCol w="641684">
+                  <a:extLst>
+                    <a:ext uri="{9D8B030D-6E8A-4147-A177-3AD203B41FA5}">
+                      <a16:colId xmlns:a16="http://schemas.microsoft.com/office/drawing/2014/main" val="3653306898"/>
+                    </a:ext>
+                  </a:extLst>
+                </a:gridCol>
+                <a:gridCol w="1060498">
+                  <a:extLst>
+                    <a:ext uri="{9D8B030D-6E8A-4147-A177-3AD203B41FA5}">
+                      <a16:colId xmlns:a16="http://schemas.microsoft.com/office/drawing/2014/main" val="1334932434"/>
+                    </a:ext>
+                  </a:extLst>
+                </a:gridCol>
+                <a:gridCol w="969993">
+                  <a:extLst>
+                    <a:ext uri="{9D8B030D-6E8A-4147-A177-3AD203B41FA5}">
+                      <a16:colId xmlns:a16="http://schemas.microsoft.com/office/drawing/2014/main" val="1675668963"/>
+                    </a:ext>
+                  </a:extLst>
+                </a:gridCol>
+                <a:gridCol w="787920">
+                  <a:extLst>
+                    <a:ext uri="{9D8B030D-6E8A-4147-A177-3AD203B41FA5}">
+                      <a16:colId xmlns:a16="http://schemas.microsoft.com/office/drawing/2014/main" val="1135514268"/>
+                    </a:ext>
+                  </a:extLst>
+                </a:gridCol>
+                <a:gridCol w="1234053">
+                  <a:extLst>
+                    <a:ext uri="{9D8B030D-6E8A-4147-A177-3AD203B41FA5}">
+                      <a16:colId xmlns:a16="http://schemas.microsoft.com/office/drawing/2014/main" val="1712737267"/>
+                    </a:ext>
+                  </a:extLst>
+                </a:gridCol>
+                <a:gridCol w="1016843">
+                  <a:extLst>
+                    <a:ext uri="{9D8B030D-6E8A-4147-A177-3AD203B41FA5}">
+                      <a16:colId xmlns:a16="http://schemas.microsoft.com/office/drawing/2014/main" val="1067622710"/>
+                    </a:ext>
+                  </a:extLst>
+                </a:gridCol>
+              </a:tblGrid>
+              <a:tr h="341273">
+                <a:tc gridSpan="12">
+                  <a:txBody>
+                    <a:bodyPr/>
+                    <a:lstStyle/>
+                    <a:p>
+                      <a:pPr marL="0" marR="0" algn="ctr">
+                        <a:lnSpc>
+                          <a:spcPct val="107000"/>
+                        </a:lnSpc>
+                        <a:spcBef>
+                          <a:spcPts val="0"/>
+                        </a:spcBef>
+                        <a:spcAft>
+                          <a:spcPts val="800"/>
+                        </a:spcAft>
+                      </a:pPr>
+                      <a:r>
+                        <a:rPr lang="en-US" sz="1600">
+                          <a:effectLst/>
+                        </a:rPr>
+                        <a:t>employees</a:t>
+                      </a:r>
+                      <a:endParaRPr lang="en-US" sz="1600">
+                        <a:effectLst/>
+                        <a:latin typeface="Times New Roman" panose="02020603050405020304" pitchFamily="18" charset="0"/>
+                        <a:ea typeface="Calibri" panose="020F0502020204030204" pitchFamily="34" charset="0"/>
+                        <a:cs typeface="Arial" panose="020B0604020202020204" pitchFamily="34" charset="0"/>
+                      </a:endParaRPr>
+                    </a:p>
+                  </a:txBody>
+                  <a:tcPr marL="68580" marR="68580" marT="0" marB="0"/>
+                </a:tc>
+                <a:tc hMerge="1">
+                  <a:txBody>
+                    <a:bodyPr/>
+                    <a:lstStyle/>
+                    <a:p>
+                      <a:endParaRPr lang="en-US"/>
+                    </a:p>
+                  </a:txBody>
+                  <a:tcPr/>
+                </a:tc>
+                <a:tc hMerge="1">
+                  <a:txBody>
+                    <a:bodyPr/>
+                    <a:lstStyle/>
+                    <a:p>
+                      <a:endParaRPr lang="en-US"/>
+                    </a:p>
+                  </a:txBody>
+                  <a:tcPr/>
+                </a:tc>
+                <a:tc hMerge="1">
+                  <a:txBody>
+                    <a:bodyPr/>
+                    <a:lstStyle/>
+                    <a:p>
+                      <a:endParaRPr lang="en-US"/>
+                    </a:p>
+                  </a:txBody>
+                  <a:tcPr/>
+                </a:tc>
+                <a:tc hMerge="1">
+                  <a:txBody>
+                    <a:bodyPr/>
+                    <a:lstStyle/>
+                    <a:p>
+                      <a:endParaRPr lang="en-US"/>
+                    </a:p>
+                  </a:txBody>
+                  <a:tcPr/>
+                </a:tc>
+                <a:tc hMerge="1">
+                  <a:txBody>
+                    <a:bodyPr/>
+                    <a:lstStyle/>
+                    <a:p>
+                      <a:endParaRPr lang="en-US"/>
+                    </a:p>
+                  </a:txBody>
+                  <a:tcPr/>
+                </a:tc>
+                <a:tc hMerge="1">
+                  <a:txBody>
+                    <a:bodyPr/>
+                    <a:lstStyle/>
+                    <a:p>
+                      <a:endParaRPr lang="en-US"/>
+                    </a:p>
+                  </a:txBody>
+                  <a:tcPr/>
+                </a:tc>
+                <a:tc hMerge="1">
+                  <a:txBody>
+                    <a:bodyPr/>
+                    <a:lstStyle/>
+                    <a:p>
+                      <a:endParaRPr lang="en-US"/>
+                    </a:p>
+                  </a:txBody>
+                  <a:tcPr/>
+                </a:tc>
+                <a:tc hMerge="1">
+                  <a:txBody>
+                    <a:bodyPr/>
+                    <a:lstStyle/>
+                    <a:p>
+                      <a:endParaRPr lang="en-US"/>
+                    </a:p>
+                  </a:txBody>
+                  <a:tcPr/>
+                </a:tc>
+                <a:tc hMerge="1">
+                  <a:txBody>
+                    <a:bodyPr/>
+                    <a:lstStyle/>
+                    <a:p>
+                      <a:endParaRPr lang="en-US"/>
+                    </a:p>
+                  </a:txBody>
+                  <a:tcPr/>
+                </a:tc>
+                <a:tc hMerge="1">
+                  <a:txBody>
+                    <a:bodyPr/>
+                    <a:lstStyle/>
+                    <a:p>
+                      <a:endParaRPr lang="en-US"/>
+                    </a:p>
+                  </a:txBody>
+                  <a:tcPr/>
+                </a:tc>
+                <a:tc hMerge="1">
+                  <a:txBody>
+                    <a:bodyPr/>
+                    <a:lstStyle/>
+                    <a:p>
+                      <a:endParaRPr lang="en-US"/>
+                    </a:p>
+                  </a:txBody>
+                  <a:tcPr/>
+                </a:tc>
+                <a:extLst>
+                  <a:ext uri="{0D108BD9-81ED-4DB2-BD59-A6C34878D82A}">
+                    <a16:rowId xmlns:a16="http://schemas.microsoft.com/office/drawing/2014/main" val="1721782251"/>
+                  </a:ext>
+                </a:extLst>
+              </a:tr>
+              <a:tr h="707429">
+                <a:tc>
+                  <a:txBody>
+                    <a:bodyPr/>
+                    <a:lstStyle/>
+                    <a:p>
+                      <a:pPr marL="0" marR="0">
+                        <a:lnSpc>
+                          <a:spcPct val="107000"/>
+                        </a:lnSpc>
+                        <a:spcBef>
+                          <a:spcPts val="0"/>
+                        </a:spcBef>
+                        <a:spcAft>
+                          <a:spcPts val="800"/>
+                        </a:spcAft>
+                      </a:pPr>
+                      <a:r>
+                        <a:rPr lang="en-US" sz="1600">
+                          <a:effectLst/>
+                        </a:rPr>
+                        <a:t>emp_id</a:t>
+                      </a:r>
+                      <a:endParaRPr lang="en-US" sz="1600">
+                        <a:effectLst/>
+                        <a:latin typeface="Times New Roman" panose="02020603050405020304" pitchFamily="18" charset="0"/>
+                        <a:ea typeface="Calibri" panose="020F0502020204030204" pitchFamily="34" charset="0"/>
+                        <a:cs typeface="Arial" panose="020B0604020202020204" pitchFamily="34" charset="0"/>
+                      </a:endParaRPr>
+                    </a:p>
+                  </a:txBody>
+                  <a:tcPr marL="68580" marR="68580" marT="0" marB="0"/>
+                </a:tc>
+                <a:tc>
+                  <a:txBody>
+                    <a:bodyPr/>
+                    <a:lstStyle/>
+                    <a:p>
+                      <a:pPr marL="0" marR="0">
+                        <a:lnSpc>
+                          <a:spcPct val="107000"/>
+                        </a:lnSpc>
+                        <a:spcBef>
+                          <a:spcPts val="0"/>
+                        </a:spcBef>
+                        <a:spcAft>
+                          <a:spcPts val="800"/>
+                        </a:spcAft>
+                      </a:pPr>
+                      <a:r>
+                        <a:rPr lang="en-US" sz="1600">
+                          <a:effectLst/>
+                        </a:rPr>
+                        <a:t>first_name</a:t>
+                      </a:r>
+                      <a:endParaRPr lang="en-US" sz="1600">
+                        <a:effectLst/>
+                        <a:latin typeface="Times New Roman" panose="02020603050405020304" pitchFamily="18" charset="0"/>
+                        <a:ea typeface="Calibri" panose="020F0502020204030204" pitchFamily="34" charset="0"/>
+                        <a:cs typeface="Arial" panose="020B0604020202020204" pitchFamily="34" charset="0"/>
+                      </a:endParaRPr>
+                    </a:p>
+                  </a:txBody>
+                  <a:tcPr marL="68580" marR="68580" marT="0" marB="0"/>
+                </a:tc>
+                <a:tc>
+                  <a:txBody>
+                    <a:bodyPr/>
+                    <a:lstStyle/>
+                    <a:p>
+                      <a:pPr marL="0" marR="0">
+                        <a:lnSpc>
+                          <a:spcPct val="107000"/>
+                        </a:lnSpc>
+                        <a:spcBef>
+                          <a:spcPts val="0"/>
+                        </a:spcBef>
+                        <a:spcAft>
+                          <a:spcPts val="800"/>
+                        </a:spcAft>
+                      </a:pPr>
+                      <a:r>
+                        <a:rPr lang="en-US" sz="1600">
+                          <a:effectLst/>
+                        </a:rPr>
+                        <a:t>last_name</a:t>
+                      </a:r>
+                      <a:endParaRPr lang="en-US" sz="1600">
+                        <a:effectLst/>
+                        <a:latin typeface="Times New Roman" panose="02020603050405020304" pitchFamily="18" charset="0"/>
+                        <a:ea typeface="Calibri" panose="020F0502020204030204" pitchFamily="34" charset="0"/>
+                        <a:cs typeface="Arial" panose="020B0604020202020204" pitchFamily="34" charset="0"/>
+                      </a:endParaRPr>
+                    </a:p>
+                  </a:txBody>
+                  <a:tcPr marL="68580" marR="68580" marT="0" marB="0"/>
+                </a:tc>
+                <a:tc>
+                  <a:txBody>
+                    <a:bodyPr/>
+                    <a:lstStyle/>
+                    <a:p>
+                      <a:pPr marL="0" marR="0">
+                        <a:lnSpc>
+                          <a:spcPct val="107000"/>
+                        </a:lnSpc>
+                        <a:spcBef>
+                          <a:spcPts val="0"/>
+                        </a:spcBef>
+                        <a:spcAft>
+                          <a:spcPts val="800"/>
+                        </a:spcAft>
+                      </a:pPr>
+                      <a:r>
+                        <a:rPr lang="en-US" sz="1600">
+                          <a:effectLst/>
+                        </a:rPr>
+                        <a:t>gender</a:t>
+                      </a:r>
+                      <a:endParaRPr lang="en-US" sz="1600">
+                        <a:effectLst/>
+                        <a:latin typeface="Times New Roman" panose="02020603050405020304" pitchFamily="18" charset="0"/>
+                        <a:ea typeface="Calibri" panose="020F0502020204030204" pitchFamily="34" charset="0"/>
+                        <a:cs typeface="Arial" panose="020B0604020202020204" pitchFamily="34" charset="0"/>
+                      </a:endParaRPr>
+                    </a:p>
+                  </a:txBody>
+                  <a:tcPr marL="68580" marR="68580" marT="0" marB="0"/>
+                </a:tc>
+                <a:tc>
+                  <a:txBody>
+                    <a:bodyPr/>
+                    <a:lstStyle/>
+                    <a:p>
+                      <a:pPr marL="0" marR="0">
+                        <a:lnSpc>
+                          <a:spcPct val="107000"/>
+                        </a:lnSpc>
+                        <a:spcBef>
+                          <a:spcPts val="0"/>
+                        </a:spcBef>
+                        <a:spcAft>
+                          <a:spcPts val="800"/>
+                        </a:spcAft>
+                      </a:pPr>
+                      <a:r>
+                        <a:rPr lang="en-US" sz="1600">
+                          <a:effectLst/>
+                        </a:rPr>
+                        <a:t>dob</a:t>
+                      </a:r>
+                      <a:endParaRPr lang="en-US" sz="1600">
+                        <a:effectLst/>
+                        <a:latin typeface="Times New Roman" panose="02020603050405020304" pitchFamily="18" charset="0"/>
+                        <a:ea typeface="Calibri" panose="020F0502020204030204" pitchFamily="34" charset="0"/>
+                        <a:cs typeface="Arial" panose="020B0604020202020204" pitchFamily="34" charset="0"/>
+                      </a:endParaRPr>
+                    </a:p>
+                  </a:txBody>
+                  <a:tcPr marL="68580" marR="68580" marT="0" marB="0"/>
+                </a:tc>
+                <a:tc>
+                  <a:txBody>
+                    <a:bodyPr/>
+                    <a:lstStyle/>
+                    <a:p>
+                      <a:pPr marL="0" marR="0">
+                        <a:lnSpc>
+                          <a:spcPct val="107000"/>
+                        </a:lnSpc>
+                        <a:spcBef>
+                          <a:spcPts val="0"/>
+                        </a:spcBef>
+                        <a:spcAft>
+                          <a:spcPts val="800"/>
+                        </a:spcAft>
+                      </a:pPr>
+                      <a:r>
+                        <a:rPr lang="en-US" sz="1600">
+                          <a:effectLst/>
+                        </a:rPr>
+                        <a:t>job</a:t>
+                      </a:r>
+                      <a:endParaRPr lang="en-US" sz="1600">
+                        <a:effectLst/>
+                        <a:latin typeface="Times New Roman" panose="02020603050405020304" pitchFamily="18" charset="0"/>
+                        <a:ea typeface="Calibri" panose="020F0502020204030204" pitchFamily="34" charset="0"/>
+                        <a:cs typeface="Arial" panose="020B0604020202020204" pitchFamily="34" charset="0"/>
+                      </a:endParaRPr>
+                    </a:p>
+                  </a:txBody>
+                  <a:tcPr marL="68580" marR="68580" marT="0" marB="0"/>
+                </a:tc>
+                <a:tc>
+                  <a:txBody>
+                    <a:bodyPr/>
+                    <a:lstStyle/>
+                    <a:p>
+                      <a:pPr marL="0" marR="0">
+                        <a:lnSpc>
+                          <a:spcPct val="107000"/>
+                        </a:lnSpc>
+                        <a:spcBef>
+                          <a:spcPts val="0"/>
+                        </a:spcBef>
+                        <a:spcAft>
+                          <a:spcPts val="800"/>
+                        </a:spcAft>
+                      </a:pPr>
+                      <a:r>
+                        <a:rPr lang="en-US" sz="1600" dirty="0">
+                          <a:effectLst/>
+                        </a:rPr>
+                        <a:t>phone</a:t>
+                      </a:r>
+                      <a:endParaRPr lang="en-US" sz="1600" dirty="0">
+                        <a:effectLst/>
+                        <a:latin typeface="Times New Roman" panose="02020603050405020304" pitchFamily="18" charset="0"/>
+                        <a:ea typeface="Calibri" panose="020F0502020204030204" pitchFamily="34" charset="0"/>
+                        <a:cs typeface="Arial" panose="020B0604020202020204" pitchFamily="34" charset="0"/>
+                      </a:endParaRPr>
+                    </a:p>
+                  </a:txBody>
+                  <a:tcPr marL="68580" marR="68580" marT="0" marB="0"/>
+                </a:tc>
+                <a:tc>
+                  <a:txBody>
+                    <a:bodyPr/>
+                    <a:lstStyle/>
+                    <a:p>
+                      <a:pPr marL="0" marR="0">
+                        <a:lnSpc>
+                          <a:spcPct val="107000"/>
+                        </a:lnSpc>
+                        <a:spcBef>
+                          <a:spcPts val="0"/>
+                        </a:spcBef>
+                        <a:spcAft>
+                          <a:spcPts val="800"/>
+                        </a:spcAft>
+                      </a:pPr>
+                      <a:r>
+                        <a:rPr lang="en-US" sz="1600">
+                          <a:effectLst/>
+                        </a:rPr>
+                        <a:t>email</a:t>
+                      </a:r>
+                      <a:endParaRPr lang="en-US" sz="1600">
+                        <a:effectLst/>
+                        <a:latin typeface="Times New Roman" panose="02020603050405020304" pitchFamily="18" charset="0"/>
+                        <a:ea typeface="Calibri" panose="020F0502020204030204" pitchFamily="34" charset="0"/>
+                        <a:cs typeface="Arial" panose="020B0604020202020204" pitchFamily="34" charset="0"/>
+                      </a:endParaRPr>
+                    </a:p>
+                  </a:txBody>
+                  <a:tcPr marL="68580" marR="68580" marT="0" marB="0"/>
+                </a:tc>
+                <a:tc>
+                  <a:txBody>
+                    <a:bodyPr/>
+                    <a:lstStyle/>
+                    <a:p>
+                      <a:pPr marL="0" marR="0">
+                        <a:lnSpc>
+                          <a:spcPct val="107000"/>
+                        </a:lnSpc>
+                        <a:spcBef>
+                          <a:spcPts val="0"/>
+                        </a:spcBef>
+                        <a:spcAft>
+                          <a:spcPts val="800"/>
+                        </a:spcAft>
+                      </a:pPr>
+                      <a:r>
+                        <a:rPr lang="en-US" sz="1600">
+                          <a:effectLst/>
+                        </a:rPr>
+                        <a:t>address</a:t>
+                      </a:r>
+                      <a:endParaRPr lang="en-US" sz="1600">
+                        <a:effectLst/>
+                        <a:latin typeface="Times New Roman" panose="02020603050405020304" pitchFamily="18" charset="0"/>
+                        <a:ea typeface="Calibri" panose="020F0502020204030204" pitchFamily="34" charset="0"/>
+                        <a:cs typeface="Arial" panose="020B0604020202020204" pitchFamily="34" charset="0"/>
+                      </a:endParaRPr>
+                    </a:p>
+                  </a:txBody>
+                  <a:tcPr marL="68580" marR="68580" marT="0" marB="0"/>
+                </a:tc>
+                <a:tc>
+                  <a:txBody>
+                    <a:bodyPr/>
+                    <a:lstStyle/>
+                    <a:p>
+                      <a:pPr marL="0" marR="0">
+                        <a:lnSpc>
+                          <a:spcPct val="107000"/>
+                        </a:lnSpc>
+                        <a:spcBef>
+                          <a:spcPts val="0"/>
+                        </a:spcBef>
+                        <a:spcAft>
+                          <a:spcPts val="800"/>
+                        </a:spcAft>
+                      </a:pPr>
+                      <a:r>
+                        <a:rPr lang="en-US" sz="1600">
+                          <a:effectLst/>
+                        </a:rPr>
+                        <a:t>accno</a:t>
+                      </a:r>
+                      <a:endParaRPr lang="en-US" sz="1600">
+                        <a:effectLst/>
+                        <a:latin typeface="Times New Roman" panose="02020603050405020304" pitchFamily="18" charset="0"/>
+                        <a:ea typeface="Calibri" panose="020F0502020204030204" pitchFamily="34" charset="0"/>
+                        <a:cs typeface="Arial" panose="020B0604020202020204" pitchFamily="34" charset="0"/>
+                      </a:endParaRPr>
+                    </a:p>
+                  </a:txBody>
+                  <a:tcPr marL="68580" marR="68580" marT="0" marB="0"/>
+                </a:tc>
+                <a:tc>
+                  <a:txBody>
+                    <a:bodyPr/>
+                    <a:lstStyle/>
+                    <a:p>
+                      <a:pPr marL="0" marR="0">
+                        <a:lnSpc>
+                          <a:spcPct val="107000"/>
+                        </a:lnSpc>
+                        <a:spcBef>
+                          <a:spcPts val="0"/>
+                        </a:spcBef>
+                        <a:spcAft>
+                          <a:spcPts val="800"/>
+                        </a:spcAft>
+                      </a:pPr>
+                      <a:r>
+                        <a:rPr lang="en-US" sz="1600">
+                          <a:effectLst/>
+                        </a:rPr>
+                        <a:t>bankname</a:t>
+                      </a:r>
+                      <a:endParaRPr lang="en-US" sz="1600">
+                        <a:effectLst/>
+                        <a:latin typeface="Times New Roman" panose="02020603050405020304" pitchFamily="18" charset="0"/>
+                        <a:ea typeface="Calibri" panose="020F0502020204030204" pitchFamily="34" charset="0"/>
+                        <a:cs typeface="Arial" panose="020B0604020202020204" pitchFamily="34" charset="0"/>
+                      </a:endParaRPr>
+                    </a:p>
+                  </a:txBody>
+                  <a:tcPr marL="68580" marR="68580" marT="0" marB="0"/>
+                </a:tc>
+                <a:tc>
+                  <a:txBody>
+                    <a:bodyPr/>
+                    <a:lstStyle/>
+                    <a:p>
+                      <a:pPr marL="0" marR="0">
+                        <a:lnSpc>
+                          <a:spcPct val="107000"/>
+                        </a:lnSpc>
+                        <a:spcBef>
+                          <a:spcPts val="0"/>
+                        </a:spcBef>
+                        <a:spcAft>
+                          <a:spcPts val="800"/>
+                        </a:spcAft>
+                      </a:pPr>
+                      <a:r>
+                        <a:rPr lang="en-US" sz="1600">
+                          <a:effectLst/>
+                        </a:rPr>
+                        <a:t>joindate</a:t>
+                      </a:r>
+                      <a:endParaRPr lang="en-US" sz="1600">
+                        <a:effectLst/>
+                        <a:latin typeface="Times New Roman" panose="02020603050405020304" pitchFamily="18" charset="0"/>
+                        <a:ea typeface="Calibri" panose="020F0502020204030204" pitchFamily="34" charset="0"/>
+                        <a:cs typeface="Arial" panose="020B0604020202020204" pitchFamily="34" charset="0"/>
+                      </a:endParaRPr>
+                    </a:p>
+                  </a:txBody>
+                  <a:tcPr marL="68580" marR="68580" marT="0" marB="0"/>
+                </a:tc>
+                <a:extLst>
+                  <a:ext uri="{0D108BD9-81ED-4DB2-BD59-A6C34878D82A}">
+                    <a16:rowId xmlns:a16="http://schemas.microsoft.com/office/drawing/2014/main" val="3702323217"/>
+                  </a:ext>
+                </a:extLst>
+              </a:tr>
+              <a:tr h="707301">
+                <a:tc>
+                  <a:txBody>
+                    <a:bodyPr/>
+                    <a:lstStyle/>
+                    <a:p>
+                      <a:pPr marL="0" marR="0">
+                        <a:lnSpc>
+                          <a:spcPct val="107000"/>
+                        </a:lnSpc>
+                        <a:spcBef>
+                          <a:spcPts val="0"/>
+                        </a:spcBef>
+                        <a:spcAft>
+                          <a:spcPts val="800"/>
+                        </a:spcAft>
+                      </a:pPr>
+                      <a:r>
+                        <a:rPr lang="en-US" sz="1600" dirty="0">
+                          <a:effectLst/>
+                        </a:rPr>
+                        <a:t>2</a:t>
+                      </a:r>
+                      <a:endParaRPr lang="en-US" sz="1600" dirty="0">
+                        <a:effectLst/>
+                        <a:latin typeface="Times New Roman" panose="02020603050405020304" pitchFamily="18" charset="0"/>
+                        <a:ea typeface="Calibri" panose="020F0502020204030204" pitchFamily="34" charset="0"/>
+                        <a:cs typeface="Arial" panose="020B0604020202020204" pitchFamily="34" charset="0"/>
+                      </a:endParaRPr>
+                    </a:p>
+                  </a:txBody>
+                  <a:tcPr marL="68580" marR="68580" marT="0" marB="0"/>
+                </a:tc>
+                <a:tc>
+                  <a:txBody>
+                    <a:bodyPr/>
+                    <a:lstStyle/>
+                    <a:p>
+                      <a:pPr marL="0" marR="0">
+                        <a:lnSpc>
+                          <a:spcPct val="107000"/>
+                        </a:lnSpc>
+                        <a:spcBef>
+                          <a:spcPts val="0"/>
+                        </a:spcBef>
+                        <a:spcAft>
+                          <a:spcPts val="800"/>
+                        </a:spcAft>
+                      </a:pPr>
+                      <a:r>
+                        <a:rPr lang="en-US" sz="1600" dirty="0">
+                          <a:effectLst/>
+                        </a:rPr>
+                        <a:t>Sara</a:t>
+                      </a:r>
+                      <a:endParaRPr lang="en-US" sz="1600" dirty="0">
+                        <a:effectLst/>
+                        <a:latin typeface="Times New Roman" panose="02020603050405020304" pitchFamily="18" charset="0"/>
+                        <a:ea typeface="Calibri" panose="020F0502020204030204" pitchFamily="34" charset="0"/>
+                        <a:cs typeface="Arial" panose="020B0604020202020204" pitchFamily="34" charset="0"/>
+                      </a:endParaRPr>
+                    </a:p>
+                  </a:txBody>
+                  <a:tcPr marL="68580" marR="68580" marT="0" marB="0"/>
+                </a:tc>
+                <a:tc>
+                  <a:txBody>
+                    <a:bodyPr/>
+                    <a:lstStyle/>
+                    <a:p>
+                      <a:pPr marL="0" marR="0">
+                        <a:lnSpc>
+                          <a:spcPct val="107000"/>
+                        </a:lnSpc>
+                        <a:spcBef>
+                          <a:spcPts val="0"/>
+                        </a:spcBef>
+                        <a:spcAft>
+                          <a:spcPts val="800"/>
+                        </a:spcAft>
+                      </a:pPr>
+                      <a:r>
+                        <a:rPr lang="en-US" sz="1600">
+                          <a:effectLst/>
+                        </a:rPr>
+                        <a:t>Smith</a:t>
+                      </a:r>
+                      <a:endParaRPr lang="en-US" sz="1600">
+                        <a:effectLst/>
+                        <a:latin typeface="Times New Roman" panose="02020603050405020304" pitchFamily="18" charset="0"/>
+                        <a:ea typeface="Calibri" panose="020F0502020204030204" pitchFamily="34" charset="0"/>
+                        <a:cs typeface="Arial" panose="020B0604020202020204" pitchFamily="34" charset="0"/>
+                      </a:endParaRPr>
+                    </a:p>
+                  </a:txBody>
+                  <a:tcPr marL="68580" marR="68580" marT="0" marB="0"/>
+                </a:tc>
+                <a:tc>
+                  <a:txBody>
+                    <a:bodyPr/>
+                    <a:lstStyle/>
+                    <a:p>
+                      <a:pPr marL="0" marR="0">
+                        <a:lnSpc>
+                          <a:spcPct val="107000"/>
+                        </a:lnSpc>
+                        <a:spcBef>
+                          <a:spcPts val="0"/>
+                        </a:spcBef>
+                        <a:spcAft>
+                          <a:spcPts val="800"/>
+                        </a:spcAft>
+                      </a:pPr>
+                      <a:r>
+                        <a:rPr lang="en-US" sz="1600">
+                          <a:effectLst/>
+                        </a:rPr>
+                        <a:t>on</a:t>
+                      </a:r>
+                      <a:endParaRPr lang="en-US" sz="1600">
+                        <a:effectLst/>
+                        <a:latin typeface="Times New Roman" panose="02020603050405020304" pitchFamily="18" charset="0"/>
+                        <a:ea typeface="Calibri" panose="020F0502020204030204" pitchFamily="34" charset="0"/>
+                        <a:cs typeface="Arial" panose="020B0604020202020204" pitchFamily="34" charset="0"/>
+                      </a:endParaRPr>
+                    </a:p>
+                  </a:txBody>
+                  <a:tcPr marL="68580" marR="68580" marT="0" marB="0"/>
+                </a:tc>
+                <a:tc>
+                  <a:txBody>
+                    <a:bodyPr/>
+                    <a:lstStyle/>
+                    <a:p>
+                      <a:pPr marL="0" marR="0">
+                        <a:lnSpc>
+                          <a:spcPct val="107000"/>
+                        </a:lnSpc>
+                        <a:spcBef>
+                          <a:spcPts val="0"/>
+                        </a:spcBef>
+                        <a:spcAft>
+                          <a:spcPts val="800"/>
+                        </a:spcAft>
+                      </a:pPr>
+                      <a:r>
+                        <a:rPr lang="en-US" sz="1600" dirty="0">
+                          <a:effectLst/>
+                        </a:rPr>
+                        <a:t>1990-01-01</a:t>
+                      </a:r>
+                      <a:endParaRPr lang="en-US" sz="1600" dirty="0">
+                        <a:effectLst/>
+                        <a:latin typeface="Times New Roman" panose="02020603050405020304" pitchFamily="18" charset="0"/>
+                        <a:ea typeface="Calibri" panose="020F0502020204030204" pitchFamily="34" charset="0"/>
+                        <a:cs typeface="Arial" panose="020B0604020202020204" pitchFamily="34" charset="0"/>
+                      </a:endParaRPr>
+                    </a:p>
+                  </a:txBody>
+                  <a:tcPr marL="68580" marR="68580" marT="0" marB="0"/>
+                </a:tc>
+                <a:tc>
+                  <a:txBody>
+                    <a:bodyPr/>
+                    <a:lstStyle/>
+                    <a:p>
+                      <a:pPr marL="0" marR="0">
+                        <a:lnSpc>
+                          <a:spcPct val="107000"/>
+                        </a:lnSpc>
+                        <a:spcBef>
+                          <a:spcPts val="0"/>
+                        </a:spcBef>
+                        <a:spcAft>
+                          <a:spcPts val="800"/>
+                        </a:spcAft>
+                      </a:pPr>
+                      <a:r>
+                        <a:rPr lang="en-US" sz="1600" dirty="0">
+                          <a:effectLst/>
+                          <a:latin typeface="Times New Roman" panose="02020603050405020304" pitchFamily="18" charset="0"/>
+                          <a:ea typeface="Calibri" panose="020F0502020204030204" pitchFamily="34" charset="0"/>
+                          <a:cs typeface="Arial" panose="020B0604020202020204" pitchFamily="34" charset="0"/>
+                        </a:rPr>
+                        <a:t>Sales Assistant</a:t>
+                      </a:r>
+                    </a:p>
+                  </a:txBody>
+                  <a:tcPr marL="68580" marR="68580" marT="0" marB="0"/>
+                </a:tc>
+                <a:tc>
+                  <a:txBody>
+                    <a:bodyPr/>
+                    <a:lstStyle/>
+                    <a:p>
+                      <a:pPr marL="0" marR="0">
+                        <a:lnSpc>
+                          <a:spcPct val="107000"/>
+                        </a:lnSpc>
+                        <a:spcBef>
+                          <a:spcPts val="0"/>
+                        </a:spcBef>
+                        <a:spcAft>
+                          <a:spcPts val="800"/>
+                        </a:spcAft>
+                      </a:pPr>
+                      <a:r>
+                        <a:rPr lang="en-US" sz="1600" dirty="0">
+                          <a:effectLst/>
+                          <a:latin typeface="Times New Roman" panose="02020603050405020304" pitchFamily="18" charset="0"/>
+                          <a:ea typeface="Calibri" panose="020F0502020204030204" pitchFamily="34" charset="0"/>
+                          <a:cs typeface="Arial" panose="020B0604020202020204" pitchFamily="34" charset="0"/>
+                        </a:rPr>
+                        <a:t>3053458989</a:t>
+                      </a:r>
+                    </a:p>
+                  </a:txBody>
+                  <a:tcPr marL="68580" marR="68580" marT="0" marB="0"/>
+                </a:tc>
+                <a:tc>
+                  <a:txBody>
+                    <a:bodyPr/>
+                    <a:lstStyle/>
+                    <a:p>
+                      <a:pPr marL="0" marR="0">
+                        <a:lnSpc>
+                          <a:spcPct val="107000"/>
+                        </a:lnSpc>
+                        <a:spcBef>
+                          <a:spcPts val="0"/>
+                        </a:spcBef>
+                        <a:spcAft>
+                          <a:spcPts val="800"/>
+                        </a:spcAft>
+                      </a:pPr>
+                      <a:r>
+                        <a:rPr lang="en-US" sz="1600" dirty="0" err="1">
+                          <a:effectLst/>
+                        </a:rPr>
+                        <a:t>ssmith@email.com</a:t>
+                      </a:r>
+                      <a:endParaRPr lang="en-US" sz="1600" dirty="0">
+                        <a:effectLst/>
+                        <a:latin typeface="Times New Roman" panose="02020603050405020304" pitchFamily="18" charset="0"/>
+                        <a:ea typeface="Calibri" panose="020F0502020204030204" pitchFamily="34" charset="0"/>
+                        <a:cs typeface="Arial" panose="020B0604020202020204" pitchFamily="34" charset="0"/>
+                      </a:endParaRPr>
+                    </a:p>
+                  </a:txBody>
+                  <a:tcPr marL="68580" marR="68580" marT="0" marB="0"/>
+                </a:tc>
+                <a:tc>
+                  <a:txBody>
+                    <a:bodyPr/>
+                    <a:lstStyle/>
+                    <a:p>
+                      <a:pPr marL="0" marR="0">
+                        <a:lnSpc>
+                          <a:spcPct val="107000"/>
+                        </a:lnSpc>
+                        <a:spcBef>
+                          <a:spcPts val="0"/>
+                        </a:spcBef>
+                        <a:spcAft>
+                          <a:spcPts val="800"/>
+                        </a:spcAft>
+                      </a:pPr>
+                      <a:r>
+                        <a:rPr lang="en-US" sz="1600" dirty="0">
+                          <a:effectLst/>
+                        </a:rPr>
+                        <a:t>21 SE 10</a:t>
+                      </a:r>
+                      <a:r>
+                        <a:rPr lang="en-US" sz="1600" baseline="30000" dirty="0">
+                          <a:effectLst/>
+                        </a:rPr>
+                        <a:t>th</a:t>
+                      </a:r>
+                      <a:r>
+                        <a:rPr lang="en-US" sz="1600" dirty="0">
+                          <a:effectLst/>
+                        </a:rPr>
+                        <a:t> St</a:t>
+                      </a:r>
+                      <a:endParaRPr lang="en-US" sz="1600" dirty="0">
+                        <a:effectLst/>
+                        <a:latin typeface="Times New Roman" panose="02020603050405020304" pitchFamily="18" charset="0"/>
+                        <a:ea typeface="Calibri" panose="020F0502020204030204" pitchFamily="34" charset="0"/>
+                        <a:cs typeface="Arial" panose="020B0604020202020204" pitchFamily="34" charset="0"/>
+                      </a:endParaRPr>
+                    </a:p>
+                  </a:txBody>
+                  <a:tcPr marL="68580" marR="68580" marT="0" marB="0"/>
+                </a:tc>
+                <a:tc>
+                  <a:txBody>
+                    <a:bodyPr/>
+                    <a:lstStyle/>
+                    <a:p>
+                      <a:pPr marL="0" marR="0">
+                        <a:lnSpc>
+                          <a:spcPct val="107000"/>
+                        </a:lnSpc>
+                        <a:spcBef>
+                          <a:spcPts val="0"/>
+                        </a:spcBef>
+                        <a:spcAft>
+                          <a:spcPts val="800"/>
+                        </a:spcAft>
+                      </a:pPr>
+                      <a:r>
+                        <a:rPr lang="en-US" sz="1600" dirty="0">
+                          <a:effectLst/>
+                          <a:latin typeface="Times New Roman" panose="02020603050405020304" pitchFamily="18" charset="0"/>
+                          <a:ea typeface="Calibri" panose="020F0502020204030204" pitchFamily="34" charset="0"/>
+                          <a:cs typeface="Arial" panose="020B0604020202020204" pitchFamily="34" charset="0"/>
+                        </a:rPr>
+                        <a:t>123456789</a:t>
+                      </a:r>
+                    </a:p>
+                  </a:txBody>
+                  <a:tcPr marL="68580" marR="68580" marT="0" marB="0"/>
+                </a:tc>
+                <a:tc>
+                  <a:txBody>
+                    <a:bodyPr/>
+                    <a:lstStyle/>
+                    <a:p>
+                      <a:pPr marL="0" marR="0">
+                        <a:lnSpc>
+                          <a:spcPct val="107000"/>
+                        </a:lnSpc>
+                        <a:spcBef>
+                          <a:spcPts val="0"/>
+                        </a:spcBef>
+                        <a:spcAft>
+                          <a:spcPts val="800"/>
+                        </a:spcAft>
+                      </a:pPr>
+                      <a:r>
+                        <a:rPr lang="en-US" sz="1600" dirty="0">
+                          <a:effectLst/>
+                        </a:rPr>
+                        <a:t>Bank of America</a:t>
+                      </a:r>
+                      <a:endParaRPr lang="en-US" sz="1600" dirty="0">
+                        <a:effectLst/>
+                        <a:latin typeface="Times New Roman" panose="02020603050405020304" pitchFamily="18" charset="0"/>
+                        <a:ea typeface="Calibri" panose="020F0502020204030204" pitchFamily="34" charset="0"/>
+                        <a:cs typeface="Arial" panose="020B0604020202020204" pitchFamily="34" charset="0"/>
+                      </a:endParaRPr>
+                    </a:p>
+                  </a:txBody>
+                  <a:tcPr marL="68580" marR="68580" marT="0" marB="0"/>
+                </a:tc>
+                <a:tc>
+                  <a:txBody>
+                    <a:bodyPr/>
+                    <a:lstStyle/>
+                    <a:p>
+                      <a:pPr marL="0" marR="0">
+                        <a:lnSpc>
+                          <a:spcPct val="107000"/>
+                        </a:lnSpc>
+                        <a:spcBef>
+                          <a:spcPts val="0"/>
+                        </a:spcBef>
+                        <a:spcAft>
+                          <a:spcPts val="800"/>
+                        </a:spcAft>
+                      </a:pPr>
+                      <a:r>
+                        <a:rPr lang="en-US" sz="1600" dirty="0">
+                          <a:effectLst/>
+                        </a:rPr>
+                        <a:t>2020-02-29</a:t>
+                      </a:r>
+                      <a:endParaRPr lang="en-US" sz="1600" dirty="0">
+                        <a:effectLst/>
+                        <a:latin typeface="Times New Roman" panose="02020603050405020304" pitchFamily="18" charset="0"/>
+                        <a:ea typeface="Calibri" panose="020F0502020204030204" pitchFamily="34" charset="0"/>
+                        <a:cs typeface="Arial" panose="020B0604020202020204" pitchFamily="34" charset="0"/>
+                      </a:endParaRPr>
+                    </a:p>
+                  </a:txBody>
+                  <a:tcPr marL="68580" marR="68580" marT="0" marB="0"/>
+                </a:tc>
+                <a:extLst>
+                  <a:ext uri="{0D108BD9-81ED-4DB2-BD59-A6C34878D82A}">
+                    <a16:rowId xmlns:a16="http://schemas.microsoft.com/office/drawing/2014/main" val="187022608"/>
+                  </a:ext>
+                </a:extLst>
+              </a:tr>
+            </a:tbl>
+          </a:graphicData>
+        </a:graphic>
+      </p:graphicFrame>
     </p:spTree>
     <p:extLst>
       <p:ext uri="{BB962C8B-B14F-4D97-AF65-F5344CB8AC3E}">
-        <p14:creationId xmlns:p14="http://schemas.microsoft.com/office/powerpoint/2010/main" val="1650710772"/>
-      </p:ext>
-    </p:extLst>
-  </p:cSld>
-  <p:clrMapOvr>
-    <a:masterClrMapping/>
-  </p:clrMapOvr>
-</p:sld>
-</file>
-
-<file path=ppt/slides/slide14.xml><?xml version="1.0" encoding="utf-8"?>
-<p:sld xmlns:a="http://schemas.openxmlformats.org/drawingml/2006/main" xmlns:r="http://schemas.openxmlformats.org/officeDocument/2006/relationships" xmlns:p="http://schemas.openxmlformats.org/presentationml/2006/main">
-  <p:cSld>
-    <p:spTree>
-      <p:nvGrpSpPr>
-        <p:cNvPr id="1" name=""/>
-        <p:cNvGrpSpPr/>
-        <p:nvPr/>
-      </p:nvGrpSpPr>
-      <p:grpSpPr>
-        <a:xfrm>
-          <a:off x="0" y="0"/>
-          <a:ext cx="0" cy="0"/>
-          <a:chOff x="0" y="0"/>
-          <a:chExt cx="0" cy="0"/>
-        </a:xfrm>
-      </p:grpSpPr>
-      <p:sp>
-        <p:nvSpPr>
-          <p:cNvPr id="2" name="Title 1">
-            <a:extLst>
-              <a:ext uri="{FF2B5EF4-FFF2-40B4-BE49-F238E27FC236}">
-                <a16:creationId xmlns:a16="http://schemas.microsoft.com/office/drawing/2014/main" id="{DE7F5719-5653-1047-BA4E-4ED7E0B26388}"/>
-              </a:ext>
-            </a:extLst>
-          </p:cNvPr>
-          <p:cNvSpPr>
-            <a:spLocks noGrp="1"/>
-          </p:cNvSpPr>
-          <p:nvPr>
-            <p:ph type="title"/>
-          </p:nvPr>
-        </p:nvSpPr>
-        <p:spPr/>
-        <p:txBody>
-          <a:bodyPr/>
-          <a:lstStyle/>
-          <a:p>
-            <a:r>
-              <a:rPr lang="en-US" dirty="0"/>
-              <a:t>Subsystem Tests</a:t>
-            </a:r>
-          </a:p>
-        </p:txBody>
-      </p:sp>
-      <p:sp>
-        <p:nvSpPr>
-          <p:cNvPr id="3" name="Content Placeholder 2">
-            <a:extLst>
-              <a:ext uri="{FF2B5EF4-FFF2-40B4-BE49-F238E27FC236}">
-                <a16:creationId xmlns:a16="http://schemas.microsoft.com/office/drawing/2014/main" id="{A4770D8C-886E-CC42-9A2F-25290EA19401}"/>
-              </a:ext>
-            </a:extLst>
-          </p:cNvPr>
-          <p:cNvSpPr>
-            <a:spLocks noGrp="1"/>
-          </p:cNvSpPr>
-          <p:nvPr>
-            <p:ph idx="1"/>
-          </p:nvPr>
-        </p:nvSpPr>
-        <p:spPr/>
-        <p:txBody>
-          <a:bodyPr/>
-          <a:lstStyle/>
-          <a:p>
-            <a:endParaRPr lang="en-US" dirty="0"/>
-          </a:p>
-        </p:txBody>
-      </p:sp>
-    </p:spTree>
-    <p:extLst>
-      <p:ext uri="{BB962C8B-B14F-4D97-AF65-F5344CB8AC3E}">
-        <p14:creationId xmlns:p14="http://schemas.microsoft.com/office/powerpoint/2010/main" val="3198564959"/>
+        <p14:creationId xmlns:p14="http://schemas.microsoft.com/office/powerpoint/2010/main" val="3425068000"/>
       </p:ext>
     </p:extLst>
   </p:cSld>
@@ -9920,61 +10995,1179 @@
       </p:grpSpPr>
       <p:sp>
         <p:nvSpPr>
-          <p:cNvPr id="2" name="Title 1">
+          <p:cNvPr id="4" name="Content Placeholder 2">
             <a:extLst>
               <a:ext uri="{FF2B5EF4-FFF2-40B4-BE49-F238E27FC236}">
-                <a16:creationId xmlns:a16="http://schemas.microsoft.com/office/drawing/2014/main" id="{36260049-BECA-1D4C-ABF1-D6343EE7F226}"/>
+                <a16:creationId xmlns:a16="http://schemas.microsoft.com/office/drawing/2014/main" id="{F3A7E595-961B-AE4B-A9DD-0A4042FA8A53}"/>
               </a:ext>
             </a:extLst>
           </p:cNvPr>
-          <p:cNvSpPr>
-            <a:spLocks noGrp="1"/>
+          <p:cNvSpPr txBox="1">
+            <a:spLocks/>
           </p:cNvSpPr>
-          <p:nvPr>
-            <p:ph type="title"/>
-          </p:nvPr>
-        </p:nvSpPr>
-        <p:spPr/>
+          <p:nvPr/>
+        </p:nvSpPr>
+        <p:spPr>
+          <a:xfrm>
+            <a:off x="1001162" y="2080809"/>
+            <a:ext cx="9613861" cy="2170959"/>
+          </a:xfrm>
+          <a:prstGeom prst="rect">
+            <a:avLst/>
+          </a:prstGeom>
+        </p:spPr>
         <p:txBody>
-          <a:bodyPr/>
-          <a:lstStyle/>
-          <a:p>
+          <a:bodyPr>
+            <a:normAutofit/>
+          </a:bodyPr>
+          <a:lstStyle>
+            <a:lvl1pPr marL="228600" indent="-228600" algn="l" defTabSz="914400" rtl="0" eaLnBrk="1" latinLnBrk="0" hangingPunct="1">
+              <a:lnSpc>
+                <a:spcPct val="90000"/>
+              </a:lnSpc>
+              <a:spcBef>
+                <a:spcPts val="1000"/>
+              </a:spcBef>
+              <a:buFont typeface="Arial" panose="020B0604020202020204" pitchFamily="34" charset="0"/>
+              <a:buChar char="•"/>
+              <a:defRPr sz="2400" kern="1200">
+                <a:solidFill>
+                  <a:schemeClr val="tx1"/>
+                </a:solidFill>
+                <a:latin typeface="+mn-lt"/>
+                <a:ea typeface="+mn-ea"/>
+                <a:cs typeface="+mn-cs"/>
+              </a:defRPr>
+            </a:lvl1pPr>
+            <a:lvl2pPr marL="685800" indent="-228600" algn="l" defTabSz="914400" rtl="0" eaLnBrk="1" latinLnBrk="0" hangingPunct="1">
+              <a:lnSpc>
+                <a:spcPct val="90000"/>
+              </a:lnSpc>
+              <a:spcBef>
+                <a:spcPts val="500"/>
+              </a:spcBef>
+              <a:buFont typeface="Arial" panose="020B0604020202020204" pitchFamily="34" charset="0"/>
+              <a:buChar char="•"/>
+              <a:defRPr sz="2000" kern="1200">
+                <a:solidFill>
+                  <a:schemeClr val="tx1"/>
+                </a:solidFill>
+                <a:latin typeface="+mn-lt"/>
+                <a:ea typeface="+mn-ea"/>
+                <a:cs typeface="+mn-cs"/>
+              </a:defRPr>
+            </a:lvl2pPr>
+            <a:lvl3pPr marL="1143000" indent="-228600" algn="l" defTabSz="914400" rtl="0" eaLnBrk="1" latinLnBrk="0" hangingPunct="1">
+              <a:lnSpc>
+                <a:spcPct val="90000"/>
+              </a:lnSpc>
+              <a:spcBef>
+                <a:spcPts val="500"/>
+              </a:spcBef>
+              <a:buFont typeface="Arial" panose="020B0604020202020204" pitchFamily="34" charset="0"/>
+              <a:buChar char="•"/>
+              <a:defRPr sz="1800" kern="1200">
+                <a:solidFill>
+                  <a:schemeClr val="tx1"/>
+                </a:solidFill>
+                <a:latin typeface="+mn-lt"/>
+                <a:ea typeface="+mn-ea"/>
+                <a:cs typeface="+mn-cs"/>
+              </a:defRPr>
+            </a:lvl3pPr>
+            <a:lvl4pPr marL="1600200" indent="-228600" algn="l" defTabSz="914400" rtl="0" eaLnBrk="1" latinLnBrk="0" hangingPunct="1">
+              <a:lnSpc>
+                <a:spcPct val="90000"/>
+              </a:lnSpc>
+              <a:spcBef>
+                <a:spcPts val="500"/>
+              </a:spcBef>
+              <a:buFont typeface="Arial" panose="020B0604020202020204" pitchFamily="34" charset="0"/>
+              <a:buChar char="•"/>
+              <a:defRPr sz="1600" kern="1200">
+                <a:solidFill>
+                  <a:schemeClr val="tx1"/>
+                </a:solidFill>
+                <a:latin typeface="+mn-lt"/>
+                <a:ea typeface="+mn-ea"/>
+                <a:cs typeface="+mn-cs"/>
+              </a:defRPr>
+            </a:lvl4pPr>
+            <a:lvl5pPr marL="2057400" indent="-228600" algn="l" defTabSz="914400" rtl="0" eaLnBrk="1" latinLnBrk="0" hangingPunct="1">
+              <a:lnSpc>
+                <a:spcPct val="90000"/>
+              </a:lnSpc>
+              <a:spcBef>
+                <a:spcPts val="500"/>
+              </a:spcBef>
+              <a:buFont typeface="Arial" panose="020B0604020202020204" pitchFamily="34" charset="0"/>
+              <a:buChar char="•"/>
+              <a:defRPr sz="1600" kern="1200">
+                <a:solidFill>
+                  <a:schemeClr val="tx1"/>
+                </a:solidFill>
+                <a:latin typeface="+mn-lt"/>
+                <a:ea typeface="+mn-ea"/>
+                <a:cs typeface="+mn-cs"/>
+              </a:defRPr>
+            </a:lvl5pPr>
+            <a:lvl6pPr marL="2514600" indent="-228600" algn="l" defTabSz="914400" rtl="0" eaLnBrk="1" latinLnBrk="0" hangingPunct="1">
+              <a:lnSpc>
+                <a:spcPct val="90000"/>
+              </a:lnSpc>
+              <a:spcBef>
+                <a:spcPts val="500"/>
+              </a:spcBef>
+              <a:buFont typeface="Arial" panose="020B0604020202020204" pitchFamily="34" charset="0"/>
+              <a:buChar char="•"/>
+              <a:defRPr sz="1400" kern="1200">
+                <a:solidFill>
+                  <a:schemeClr val="tx1"/>
+                </a:solidFill>
+                <a:latin typeface="+mn-lt"/>
+                <a:ea typeface="+mn-ea"/>
+                <a:cs typeface="+mn-cs"/>
+              </a:defRPr>
+            </a:lvl6pPr>
+            <a:lvl7pPr marL="2971800" indent="-228600" algn="l" defTabSz="914400" rtl="0" eaLnBrk="1" latinLnBrk="0" hangingPunct="1">
+              <a:lnSpc>
+                <a:spcPct val="90000"/>
+              </a:lnSpc>
+              <a:spcBef>
+                <a:spcPts val="500"/>
+              </a:spcBef>
+              <a:buFont typeface="Arial" panose="020B0604020202020204" pitchFamily="34" charset="0"/>
+              <a:buChar char="•"/>
+              <a:defRPr sz="1400" kern="1200">
+                <a:solidFill>
+                  <a:schemeClr val="tx1"/>
+                </a:solidFill>
+                <a:latin typeface="+mn-lt"/>
+                <a:ea typeface="+mn-ea"/>
+                <a:cs typeface="+mn-cs"/>
+              </a:defRPr>
+            </a:lvl7pPr>
+            <a:lvl8pPr marL="3429000" indent="-228600" algn="l" defTabSz="914400" rtl="0" eaLnBrk="1" latinLnBrk="0" hangingPunct="1">
+              <a:lnSpc>
+                <a:spcPct val="90000"/>
+              </a:lnSpc>
+              <a:spcBef>
+                <a:spcPts val="500"/>
+              </a:spcBef>
+              <a:buFont typeface="Arial" panose="020B0604020202020204" pitchFamily="34" charset="0"/>
+              <a:buChar char="•"/>
+              <a:defRPr sz="1400" kern="1200">
+                <a:solidFill>
+                  <a:schemeClr val="tx1"/>
+                </a:solidFill>
+                <a:latin typeface="+mn-lt"/>
+                <a:ea typeface="+mn-ea"/>
+                <a:cs typeface="+mn-cs"/>
+              </a:defRPr>
+            </a:lvl8pPr>
+            <a:lvl9pPr marL="3886200" indent="-228600" algn="l" defTabSz="914400" rtl="0" eaLnBrk="1" latinLnBrk="0" hangingPunct="1">
+              <a:lnSpc>
+                <a:spcPct val="90000"/>
+              </a:lnSpc>
+              <a:spcBef>
+                <a:spcPts val="500"/>
+              </a:spcBef>
+              <a:buFont typeface="Arial" panose="020B0604020202020204" pitchFamily="34" charset="0"/>
+              <a:buChar char="•"/>
+              <a:defRPr sz="1400" kern="1200">
+                <a:solidFill>
+                  <a:schemeClr val="tx1"/>
+                </a:solidFill>
+                <a:latin typeface="+mn-lt"/>
+                <a:ea typeface="+mn-ea"/>
+                <a:cs typeface="+mn-cs"/>
+              </a:defRPr>
+            </a:lvl9pPr>
+          </a:lstStyle>
+          <a:p>
+            <a:r>
+              <a:rPr lang="en-US" b="1" dirty="0"/>
+              <a:t>Test Case ID: </a:t>
+            </a:r>
             <a:r>
               <a:rPr lang="en-US" dirty="0"/>
-              <a:t>Subsystem Tests</a:t>
-            </a:r>
+              <a:t>SystemTest-PMS-SecurityQuestion-003-Rainy02</a:t>
+            </a:r>
+          </a:p>
+          <a:p>
+            <a:r>
+              <a:rPr lang="en-US" b="1" dirty="0"/>
+              <a:t>Purpose: </a:t>
+            </a:r>
+            <a:r>
+              <a:rPr lang="en-US" dirty="0"/>
+              <a:t>Investigate the proper execution of the security question security use case for Adam Sandler (an employee). </a:t>
+            </a:r>
+          </a:p>
+          <a:p>
+            <a:r>
+              <a:rPr lang="en-US" b="1" dirty="0"/>
+              <a:t>Test Setup: </a:t>
+            </a:r>
+            <a:r>
+              <a:rPr lang="en-US" dirty="0"/>
+              <a:t>PMS is setup and running, with the database setup</a:t>
+            </a:r>
+          </a:p>
+          <a:p>
+            <a:pPr lvl="1"/>
+            <a:endParaRPr lang="en-US" b="1" dirty="0"/>
           </a:p>
         </p:txBody>
       </p:sp>
       <p:sp>
         <p:nvSpPr>
-          <p:cNvPr id="3" name="Content Placeholder 2">
+          <p:cNvPr id="6" name="Title 1">
             <a:extLst>
               <a:ext uri="{FF2B5EF4-FFF2-40B4-BE49-F238E27FC236}">
-                <a16:creationId xmlns:a16="http://schemas.microsoft.com/office/drawing/2014/main" id="{1A35579C-D1B0-FA46-A057-796F118E5D5D}"/>
+                <a16:creationId xmlns:a16="http://schemas.microsoft.com/office/drawing/2014/main" id="{EEABFE92-121F-6C41-89DC-CF2BF51D5DB9}"/>
               </a:ext>
             </a:extLst>
           </p:cNvPr>
-          <p:cNvSpPr>
-            <a:spLocks noGrp="1"/>
+          <p:cNvSpPr txBox="1">
+            <a:spLocks/>
           </p:cNvSpPr>
-          <p:nvPr>
-            <p:ph idx="1"/>
-          </p:nvPr>
-        </p:nvSpPr>
-        <p:spPr/>
+          <p:nvPr/>
+        </p:nvSpPr>
+        <p:spPr>
+          <a:xfrm>
+            <a:off x="680321" y="753228"/>
+            <a:ext cx="9613861" cy="1080938"/>
+          </a:xfrm>
+          <a:prstGeom prst="rect">
+            <a:avLst/>
+          </a:prstGeom>
+        </p:spPr>
         <p:txBody>
           <a:bodyPr/>
-          <a:lstStyle/>
-          <a:p>
-            <a:endParaRPr lang="en-US"/>
+          <a:lstStyle>
+            <a:lvl1pPr algn="l" defTabSz="914400" rtl="0" eaLnBrk="1" latinLnBrk="0" hangingPunct="1">
+              <a:lnSpc>
+                <a:spcPct val="90000"/>
+              </a:lnSpc>
+              <a:spcBef>
+                <a:spcPct val="0"/>
+              </a:spcBef>
+              <a:buNone/>
+              <a:defRPr sz="3600" kern="1200">
+                <a:solidFill>
+                  <a:schemeClr val="tx1"/>
+                </a:solidFill>
+                <a:latin typeface="+mj-lt"/>
+                <a:ea typeface="+mj-ea"/>
+                <a:cs typeface="+mj-cs"/>
+              </a:defRPr>
+            </a:lvl1pPr>
+          </a:lstStyle>
+          <a:p>
+            <a:r>
+              <a:rPr lang="en-US" dirty="0"/>
+              <a:t>System Tests</a:t>
+            </a:r>
           </a:p>
         </p:txBody>
       </p:sp>
+      <p:graphicFrame>
+        <p:nvGraphicFramePr>
+          <p:cNvPr id="2" name="Table 1">
+            <a:extLst>
+              <a:ext uri="{FF2B5EF4-FFF2-40B4-BE49-F238E27FC236}">
+                <a16:creationId xmlns:a16="http://schemas.microsoft.com/office/drawing/2014/main" id="{97541FB5-BC70-A540-9495-56251EFD256E}"/>
+              </a:ext>
+            </a:extLst>
+          </p:cNvPr>
+          <p:cNvGraphicFramePr>
+            <a:graphicFrameLocks noGrp="1"/>
+          </p:cNvGraphicFramePr>
+          <p:nvPr>
+            <p:extLst>
+              <p:ext uri="{D42A27DB-BD31-4B8C-83A1-F6EECF244321}">
+                <p14:modId xmlns:p14="http://schemas.microsoft.com/office/powerpoint/2010/main" val="3023043995"/>
+              </p:ext>
+            </p:extLst>
+          </p:nvPr>
+        </p:nvGraphicFramePr>
+        <p:xfrm>
+          <a:off x="680321" y="4068261"/>
+          <a:ext cx="10404777" cy="1658771"/>
+        </p:xfrm>
+        <a:graphic>
+          <a:graphicData uri="http://schemas.openxmlformats.org/drawingml/2006/table">
+            <a:tbl>
+              <a:tblPr firstRow="1" firstCol="1" bandRow="1">
+                <a:tableStyleId>{5C22544A-7EE6-4342-B048-85BDC9FD1C3A}</a:tableStyleId>
+              </a:tblPr>
+              <a:tblGrid>
+                <a:gridCol w="907850">
+                  <a:extLst>
+                    <a:ext uri="{9D8B030D-6E8A-4147-A177-3AD203B41FA5}">
+                      <a16:colId xmlns:a16="http://schemas.microsoft.com/office/drawing/2014/main" val="3089547088"/>
+                    </a:ext>
+                  </a:extLst>
+                </a:gridCol>
+                <a:gridCol w="898357">
+                  <a:extLst>
+                    <a:ext uri="{9D8B030D-6E8A-4147-A177-3AD203B41FA5}">
+                      <a16:colId xmlns:a16="http://schemas.microsoft.com/office/drawing/2014/main" val="1710980542"/>
+                    </a:ext>
+                  </a:extLst>
+                </a:gridCol>
+                <a:gridCol w="1026695">
+                  <a:extLst>
+                    <a:ext uri="{9D8B030D-6E8A-4147-A177-3AD203B41FA5}">
+                      <a16:colId xmlns:a16="http://schemas.microsoft.com/office/drawing/2014/main" val="3023112879"/>
+                    </a:ext>
+                  </a:extLst>
+                </a:gridCol>
+                <a:gridCol w="1010653">
+                  <a:extLst>
+                    <a:ext uri="{9D8B030D-6E8A-4147-A177-3AD203B41FA5}">
+                      <a16:colId xmlns:a16="http://schemas.microsoft.com/office/drawing/2014/main" val="3842053574"/>
+                    </a:ext>
+                  </a:extLst>
+                </a:gridCol>
+                <a:gridCol w="641684">
+                  <a:extLst>
+                    <a:ext uri="{9D8B030D-6E8A-4147-A177-3AD203B41FA5}">
+                      <a16:colId xmlns:a16="http://schemas.microsoft.com/office/drawing/2014/main" val="3914664385"/>
+                    </a:ext>
+                  </a:extLst>
+                </a:gridCol>
+                <a:gridCol w="1042737">
+                  <a:extLst>
+                    <a:ext uri="{9D8B030D-6E8A-4147-A177-3AD203B41FA5}">
+                      <a16:colId xmlns:a16="http://schemas.microsoft.com/office/drawing/2014/main" val="1964637987"/>
+                    </a:ext>
+                  </a:extLst>
+                </a:gridCol>
+                <a:gridCol w="673768">
+                  <a:extLst>
+                    <a:ext uri="{9D8B030D-6E8A-4147-A177-3AD203B41FA5}">
+                      <a16:colId xmlns:a16="http://schemas.microsoft.com/office/drawing/2014/main" val="1581475036"/>
+                    </a:ext>
+                  </a:extLst>
+                </a:gridCol>
+                <a:gridCol w="1347537">
+                  <a:extLst>
+                    <a:ext uri="{9D8B030D-6E8A-4147-A177-3AD203B41FA5}">
+                      <a16:colId xmlns:a16="http://schemas.microsoft.com/office/drawing/2014/main" val="2413083189"/>
+                    </a:ext>
+                  </a:extLst>
+                </a:gridCol>
+                <a:gridCol w="770021">
+                  <a:extLst>
+                    <a:ext uri="{9D8B030D-6E8A-4147-A177-3AD203B41FA5}">
+                      <a16:colId xmlns:a16="http://schemas.microsoft.com/office/drawing/2014/main" val="636624809"/>
+                    </a:ext>
+                  </a:extLst>
+                </a:gridCol>
+                <a:gridCol w="2085475">
+                  <a:extLst>
+                    <a:ext uri="{9D8B030D-6E8A-4147-A177-3AD203B41FA5}">
+                      <a16:colId xmlns:a16="http://schemas.microsoft.com/office/drawing/2014/main" val="3419877866"/>
+                    </a:ext>
+                  </a:extLst>
+                </a:gridCol>
+              </a:tblGrid>
+              <a:tr h="322376">
+                <a:tc gridSpan="10">
+                  <a:txBody>
+                    <a:bodyPr/>
+                    <a:lstStyle/>
+                    <a:p>
+                      <a:pPr marL="0" marR="0" algn="ctr">
+                        <a:lnSpc>
+                          <a:spcPct val="107000"/>
+                        </a:lnSpc>
+                        <a:spcBef>
+                          <a:spcPts val="0"/>
+                        </a:spcBef>
+                        <a:spcAft>
+                          <a:spcPts val="800"/>
+                        </a:spcAft>
+                      </a:pPr>
+                      <a:r>
+                        <a:rPr lang="en-US" sz="1500">
+                          <a:effectLst/>
+                        </a:rPr>
+                        <a:t>users</a:t>
+                      </a:r>
+                      <a:endParaRPr lang="en-US" sz="1500">
+                        <a:effectLst/>
+                        <a:latin typeface="Times New Roman" panose="02020603050405020304" pitchFamily="18" charset="0"/>
+                        <a:ea typeface="Calibri" panose="020F0502020204030204" pitchFamily="34" charset="0"/>
+                        <a:cs typeface="Arial" panose="020B0604020202020204" pitchFamily="34" charset="0"/>
+                      </a:endParaRPr>
+                    </a:p>
+                  </a:txBody>
+                  <a:tcPr marL="68580" marR="68580" marT="0" marB="0"/>
+                </a:tc>
+                <a:tc hMerge="1">
+                  <a:txBody>
+                    <a:bodyPr/>
+                    <a:lstStyle/>
+                    <a:p>
+                      <a:endParaRPr lang="en-US"/>
+                    </a:p>
+                  </a:txBody>
+                  <a:tcPr/>
+                </a:tc>
+                <a:tc hMerge="1">
+                  <a:txBody>
+                    <a:bodyPr/>
+                    <a:lstStyle/>
+                    <a:p>
+                      <a:endParaRPr lang="en-US"/>
+                    </a:p>
+                  </a:txBody>
+                  <a:tcPr/>
+                </a:tc>
+                <a:tc hMerge="1">
+                  <a:txBody>
+                    <a:bodyPr/>
+                    <a:lstStyle/>
+                    <a:p>
+                      <a:endParaRPr lang="en-US"/>
+                    </a:p>
+                  </a:txBody>
+                  <a:tcPr/>
+                </a:tc>
+                <a:tc hMerge="1">
+                  <a:txBody>
+                    <a:bodyPr/>
+                    <a:lstStyle/>
+                    <a:p>
+                      <a:endParaRPr lang="en-US"/>
+                    </a:p>
+                  </a:txBody>
+                  <a:tcPr/>
+                </a:tc>
+                <a:tc hMerge="1">
+                  <a:txBody>
+                    <a:bodyPr/>
+                    <a:lstStyle/>
+                    <a:p>
+                      <a:endParaRPr lang="en-US"/>
+                    </a:p>
+                  </a:txBody>
+                  <a:tcPr/>
+                </a:tc>
+                <a:tc hMerge="1">
+                  <a:txBody>
+                    <a:bodyPr/>
+                    <a:lstStyle/>
+                    <a:p>
+                      <a:endParaRPr lang="en-US"/>
+                    </a:p>
+                  </a:txBody>
+                  <a:tcPr/>
+                </a:tc>
+                <a:tc hMerge="1">
+                  <a:txBody>
+                    <a:bodyPr/>
+                    <a:lstStyle/>
+                    <a:p>
+                      <a:endParaRPr lang="en-US"/>
+                    </a:p>
+                  </a:txBody>
+                  <a:tcPr/>
+                </a:tc>
+                <a:tc hMerge="1">
+                  <a:txBody>
+                    <a:bodyPr/>
+                    <a:lstStyle/>
+                    <a:p>
+                      <a:endParaRPr lang="en-US"/>
+                    </a:p>
+                  </a:txBody>
+                  <a:tcPr/>
+                </a:tc>
+                <a:tc hMerge="1">
+                  <a:txBody>
+                    <a:bodyPr/>
+                    <a:lstStyle/>
+                    <a:p>
+                      <a:endParaRPr lang="en-US"/>
+                    </a:p>
+                  </a:txBody>
+                  <a:tcPr/>
+                </a:tc>
+                <a:extLst>
+                  <a:ext uri="{0D108BD9-81ED-4DB2-BD59-A6C34878D82A}">
+                    <a16:rowId xmlns:a16="http://schemas.microsoft.com/office/drawing/2014/main" val="1639851192"/>
+                  </a:ext>
+                </a:extLst>
+              </a:tr>
+              <a:tr h="668258">
+                <a:tc>
+                  <a:txBody>
+                    <a:bodyPr/>
+                    <a:lstStyle/>
+                    <a:p>
+                      <a:pPr marL="0" marR="0" algn="l">
+                        <a:lnSpc>
+                          <a:spcPct val="107000"/>
+                        </a:lnSpc>
+                        <a:spcBef>
+                          <a:spcPts val="0"/>
+                        </a:spcBef>
+                        <a:spcAft>
+                          <a:spcPts val="800"/>
+                        </a:spcAft>
+                      </a:pPr>
+                      <a:r>
+                        <a:rPr lang="en-US" sz="1500">
+                          <a:effectLst/>
+                        </a:rPr>
+                        <a:t>emp_id</a:t>
+                      </a:r>
+                      <a:endParaRPr lang="en-US" sz="1500">
+                        <a:effectLst/>
+                        <a:latin typeface="Times New Roman" panose="02020603050405020304" pitchFamily="18" charset="0"/>
+                        <a:ea typeface="Calibri" panose="020F0502020204030204" pitchFamily="34" charset="0"/>
+                        <a:cs typeface="Arial" panose="020B0604020202020204" pitchFamily="34" charset="0"/>
+                      </a:endParaRPr>
+                    </a:p>
+                  </a:txBody>
+                  <a:tcPr marL="68580" marR="68580" marT="0" marB="0"/>
+                </a:tc>
+                <a:tc>
+                  <a:txBody>
+                    <a:bodyPr/>
+                    <a:lstStyle/>
+                    <a:p>
+                      <a:pPr marL="0" marR="0" algn="l">
+                        <a:lnSpc>
+                          <a:spcPct val="107000"/>
+                        </a:lnSpc>
+                        <a:spcBef>
+                          <a:spcPts val="0"/>
+                        </a:spcBef>
+                        <a:spcAft>
+                          <a:spcPts val="800"/>
+                        </a:spcAft>
+                      </a:pPr>
+                      <a:r>
+                        <a:rPr lang="en-US" sz="1500">
+                          <a:effectLst/>
+                        </a:rPr>
+                        <a:t>user_id</a:t>
+                      </a:r>
+                      <a:endParaRPr lang="en-US" sz="1500">
+                        <a:effectLst/>
+                        <a:latin typeface="Times New Roman" panose="02020603050405020304" pitchFamily="18" charset="0"/>
+                        <a:ea typeface="Calibri" panose="020F0502020204030204" pitchFamily="34" charset="0"/>
+                        <a:cs typeface="Arial" panose="020B0604020202020204" pitchFamily="34" charset="0"/>
+                      </a:endParaRPr>
+                    </a:p>
+                  </a:txBody>
+                  <a:tcPr marL="68580" marR="68580" marT="0" marB="0"/>
+                </a:tc>
+                <a:tc>
+                  <a:txBody>
+                    <a:bodyPr/>
+                    <a:lstStyle/>
+                    <a:p>
+                      <a:pPr marL="0" marR="0" algn="l">
+                        <a:lnSpc>
+                          <a:spcPct val="107000"/>
+                        </a:lnSpc>
+                        <a:spcBef>
+                          <a:spcPts val="0"/>
+                        </a:spcBef>
+                        <a:spcAft>
+                          <a:spcPts val="800"/>
+                        </a:spcAft>
+                      </a:pPr>
+                      <a:r>
+                        <a:rPr lang="en-US" sz="1500" dirty="0">
+                          <a:effectLst/>
+                        </a:rPr>
+                        <a:t>password</a:t>
+                      </a:r>
+                      <a:endParaRPr lang="en-US" sz="1500" dirty="0">
+                        <a:effectLst/>
+                        <a:latin typeface="Times New Roman" panose="02020603050405020304" pitchFamily="18" charset="0"/>
+                        <a:ea typeface="Calibri" panose="020F0502020204030204" pitchFamily="34" charset="0"/>
+                        <a:cs typeface="Arial" panose="020B0604020202020204" pitchFamily="34" charset="0"/>
+                      </a:endParaRPr>
+                    </a:p>
+                  </a:txBody>
+                  <a:tcPr marL="68580" marR="68580" marT="0" marB="0"/>
+                </a:tc>
+                <a:tc>
+                  <a:txBody>
+                    <a:bodyPr/>
+                    <a:lstStyle/>
+                    <a:p>
+                      <a:pPr marL="0" marR="0" algn="l">
+                        <a:lnSpc>
+                          <a:spcPct val="107000"/>
+                        </a:lnSpc>
+                        <a:spcBef>
+                          <a:spcPts val="0"/>
+                        </a:spcBef>
+                        <a:spcAft>
+                          <a:spcPts val="800"/>
+                        </a:spcAft>
+                      </a:pPr>
+                      <a:r>
+                        <a:rPr lang="en-US" sz="1500">
+                          <a:effectLst/>
+                        </a:rPr>
+                        <a:t>sec_que1</a:t>
+                      </a:r>
+                      <a:endParaRPr lang="en-US" sz="1500">
+                        <a:effectLst/>
+                        <a:latin typeface="Times New Roman" panose="02020603050405020304" pitchFamily="18" charset="0"/>
+                        <a:ea typeface="Calibri" panose="020F0502020204030204" pitchFamily="34" charset="0"/>
+                        <a:cs typeface="Arial" panose="020B0604020202020204" pitchFamily="34" charset="0"/>
+                      </a:endParaRPr>
+                    </a:p>
+                  </a:txBody>
+                  <a:tcPr marL="68580" marR="68580" marT="0" marB="0"/>
+                </a:tc>
+                <a:tc>
+                  <a:txBody>
+                    <a:bodyPr/>
+                    <a:lstStyle/>
+                    <a:p>
+                      <a:pPr marL="0" marR="0" algn="l">
+                        <a:lnSpc>
+                          <a:spcPct val="107000"/>
+                        </a:lnSpc>
+                        <a:spcBef>
+                          <a:spcPts val="0"/>
+                        </a:spcBef>
+                        <a:spcAft>
+                          <a:spcPts val="800"/>
+                        </a:spcAft>
+                      </a:pPr>
+                      <a:r>
+                        <a:rPr lang="en-US" sz="1500">
+                          <a:effectLst/>
+                        </a:rPr>
+                        <a:t>ans1</a:t>
+                      </a:r>
+                      <a:endParaRPr lang="en-US" sz="1500">
+                        <a:effectLst/>
+                        <a:latin typeface="Times New Roman" panose="02020603050405020304" pitchFamily="18" charset="0"/>
+                        <a:ea typeface="Calibri" panose="020F0502020204030204" pitchFamily="34" charset="0"/>
+                        <a:cs typeface="Arial" panose="020B0604020202020204" pitchFamily="34" charset="0"/>
+                      </a:endParaRPr>
+                    </a:p>
+                  </a:txBody>
+                  <a:tcPr marL="68580" marR="68580" marT="0" marB="0"/>
+                </a:tc>
+                <a:tc>
+                  <a:txBody>
+                    <a:bodyPr/>
+                    <a:lstStyle/>
+                    <a:p>
+                      <a:pPr marL="0" marR="0" algn="l">
+                        <a:lnSpc>
+                          <a:spcPct val="107000"/>
+                        </a:lnSpc>
+                        <a:spcBef>
+                          <a:spcPts val="0"/>
+                        </a:spcBef>
+                        <a:spcAft>
+                          <a:spcPts val="800"/>
+                        </a:spcAft>
+                      </a:pPr>
+                      <a:r>
+                        <a:rPr lang="en-US" sz="1500">
+                          <a:effectLst/>
+                        </a:rPr>
+                        <a:t>sec_que2</a:t>
+                      </a:r>
+                      <a:endParaRPr lang="en-US" sz="1500">
+                        <a:effectLst/>
+                        <a:latin typeface="Times New Roman" panose="02020603050405020304" pitchFamily="18" charset="0"/>
+                        <a:ea typeface="Calibri" panose="020F0502020204030204" pitchFamily="34" charset="0"/>
+                        <a:cs typeface="Arial" panose="020B0604020202020204" pitchFamily="34" charset="0"/>
+                      </a:endParaRPr>
+                    </a:p>
+                  </a:txBody>
+                  <a:tcPr marL="68580" marR="68580" marT="0" marB="0"/>
+                </a:tc>
+                <a:tc>
+                  <a:txBody>
+                    <a:bodyPr/>
+                    <a:lstStyle/>
+                    <a:p>
+                      <a:pPr marL="0" marR="0" algn="l">
+                        <a:lnSpc>
+                          <a:spcPct val="107000"/>
+                        </a:lnSpc>
+                        <a:spcBef>
+                          <a:spcPts val="0"/>
+                        </a:spcBef>
+                        <a:spcAft>
+                          <a:spcPts val="800"/>
+                        </a:spcAft>
+                      </a:pPr>
+                      <a:r>
+                        <a:rPr lang="en-US" sz="1500">
+                          <a:effectLst/>
+                        </a:rPr>
+                        <a:t>ans2</a:t>
+                      </a:r>
+                      <a:endParaRPr lang="en-US" sz="1500">
+                        <a:effectLst/>
+                        <a:latin typeface="Times New Roman" panose="02020603050405020304" pitchFamily="18" charset="0"/>
+                        <a:ea typeface="Calibri" panose="020F0502020204030204" pitchFamily="34" charset="0"/>
+                        <a:cs typeface="Arial" panose="020B0604020202020204" pitchFamily="34" charset="0"/>
+                      </a:endParaRPr>
+                    </a:p>
+                  </a:txBody>
+                  <a:tcPr marL="68580" marR="68580" marT="0" marB="0"/>
+                </a:tc>
+                <a:tc>
+                  <a:txBody>
+                    <a:bodyPr/>
+                    <a:lstStyle/>
+                    <a:p>
+                      <a:pPr marL="0" marR="0" algn="l">
+                        <a:lnSpc>
+                          <a:spcPct val="107000"/>
+                        </a:lnSpc>
+                        <a:spcBef>
+                          <a:spcPts val="0"/>
+                        </a:spcBef>
+                        <a:spcAft>
+                          <a:spcPts val="800"/>
+                        </a:spcAft>
+                      </a:pPr>
+                      <a:r>
+                        <a:rPr lang="en-US" sz="1500">
+                          <a:effectLst/>
+                        </a:rPr>
+                        <a:t>sec_que3</a:t>
+                      </a:r>
+                      <a:endParaRPr lang="en-US" sz="1500">
+                        <a:effectLst/>
+                        <a:latin typeface="Times New Roman" panose="02020603050405020304" pitchFamily="18" charset="0"/>
+                        <a:ea typeface="Calibri" panose="020F0502020204030204" pitchFamily="34" charset="0"/>
+                        <a:cs typeface="Arial" panose="020B0604020202020204" pitchFamily="34" charset="0"/>
+                      </a:endParaRPr>
+                    </a:p>
+                  </a:txBody>
+                  <a:tcPr marL="68580" marR="68580" marT="0" marB="0"/>
+                </a:tc>
+                <a:tc>
+                  <a:txBody>
+                    <a:bodyPr/>
+                    <a:lstStyle/>
+                    <a:p>
+                      <a:pPr marL="0" marR="0" algn="l">
+                        <a:lnSpc>
+                          <a:spcPct val="107000"/>
+                        </a:lnSpc>
+                        <a:spcBef>
+                          <a:spcPts val="0"/>
+                        </a:spcBef>
+                        <a:spcAft>
+                          <a:spcPts val="800"/>
+                        </a:spcAft>
+                      </a:pPr>
+                      <a:r>
+                        <a:rPr lang="en-US" sz="1500">
+                          <a:effectLst/>
+                        </a:rPr>
+                        <a:t>ans3</a:t>
+                      </a:r>
+                      <a:endParaRPr lang="en-US" sz="1500">
+                        <a:effectLst/>
+                        <a:latin typeface="Times New Roman" panose="02020603050405020304" pitchFamily="18" charset="0"/>
+                        <a:ea typeface="Calibri" panose="020F0502020204030204" pitchFamily="34" charset="0"/>
+                        <a:cs typeface="Arial" panose="020B0604020202020204" pitchFamily="34" charset="0"/>
+                      </a:endParaRPr>
+                    </a:p>
+                  </a:txBody>
+                  <a:tcPr marL="68580" marR="68580" marT="0" marB="0"/>
+                </a:tc>
+                <a:tc>
+                  <a:txBody>
+                    <a:bodyPr/>
+                    <a:lstStyle/>
+                    <a:p>
+                      <a:pPr marL="0" marR="0" algn="l">
+                        <a:lnSpc>
+                          <a:spcPct val="107000"/>
+                        </a:lnSpc>
+                        <a:spcBef>
+                          <a:spcPts val="0"/>
+                        </a:spcBef>
+                        <a:spcAft>
+                          <a:spcPts val="800"/>
+                        </a:spcAft>
+                      </a:pPr>
+                      <a:r>
+                        <a:rPr lang="en-US" sz="1500">
+                          <a:effectLst/>
+                        </a:rPr>
+                        <a:t>createDate</a:t>
+                      </a:r>
+                      <a:endParaRPr lang="en-US" sz="1500">
+                        <a:effectLst/>
+                        <a:latin typeface="Times New Roman" panose="02020603050405020304" pitchFamily="18" charset="0"/>
+                        <a:ea typeface="Calibri" panose="020F0502020204030204" pitchFamily="34" charset="0"/>
+                        <a:cs typeface="Arial" panose="020B0604020202020204" pitchFamily="34" charset="0"/>
+                      </a:endParaRPr>
+                    </a:p>
+                  </a:txBody>
+                  <a:tcPr marL="68580" marR="68580" marT="0" marB="0"/>
+                </a:tc>
+                <a:extLst>
+                  <a:ext uri="{0D108BD9-81ED-4DB2-BD59-A6C34878D82A}">
+                    <a16:rowId xmlns:a16="http://schemas.microsoft.com/office/drawing/2014/main" val="4038802540"/>
+                  </a:ext>
+                </a:extLst>
+              </a:tr>
+              <a:tr h="668137">
+                <a:tc>
+                  <a:txBody>
+                    <a:bodyPr/>
+                    <a:lstStyle/>
+                    <a:p>
+                      <a:pPr marL="0" marR="0" algn="l">
+                        <a:lnSpc>
+                          <a:spcPct val="107000"/>
+                        </a:lnSpc>
+                        <a:spcBef>
+                          <a:spcPts val="0"/>
+                        </a:spcBef>
+                        <a:spcAft>
+                          <a:spcPts val="800"/>
+                        </a:spcAft>
+                      </a:pPr>
+                      <a:r>
+                        <a:rPr lang="en-US" sz="1500">
+                          <a:effectLst/>
+                        </a:rPr>
+                        <a:t>1</a:t>
+                      </a:r>
+                      <a:endParaRPr lang="en-US" sz="1500">
+                        <a:effectLst/>
+                        <a:latin typeface="Times New Roman" panose="02020603050405020304" pitchFamily="18" charset="0"/>
+                        <a:ea typeface="Calibri" panose="020F0502020204030204" pitchFamily="34" charset="0"/>
+                        <a:cs typeface="Arial" panose="020B0604020202020204" pitchFamily="34" charset="0"/>
+                      </a:endParaRPr>
+                    </a:p>
+                  </a:txBody>
+                  <a:tcPr marL="68580" marR="68580" marT="0" marB="0"/>
+                </a:tc>
+                <a:tc>
+                  <a:txBody>
+                    <a:bodyPr/>
+                    <a:lstStyle/>
+                    <a:p>
+                      <a:pPr marL="0" marR="0" algn="l">
+                        <a:lnSpc>
+                          <a:spcPct val="107000"/>
+                        </a:lnSpc>
+                        <a:spcBef>
+                          <a:spcPts val="0"/>
+                        </a:spcBef>
+                        <a:spcAft>
+                          <a:spcPts val="800"/>
+                        </a:spcAft>
+                      </a:pPr>
+                      <a:r>
+                        <a:rPr lang="en-US" sz="1500">
+                          <a:effectLst/>
+                        </a:rPr>
+                        <a:t>adam</a:t>
+                      </a:r>
+                      <a:endParaRPr lang="en-US" sz="1500">
+                        <a:effectLst/>
+                        <a:latin typeface="Times New Roman" panose="02020603050405020304" pitchFamily="18" charset="0"/>
+                        <a:ea typeface="Calibri" panose="020F0502020204030204" pitchFamily="34" charset="0"/>
+                        <a:cs typeface="Arial" panose="020B0604020202020204" pitchFamily="34" charset="0"/>
+                      </a:endParaRPr>
+                    </a:p>
+                  </a:txBody>
+                  <a:tcPr marL="68580" marR="68580" marT="0" marB="0"/>
+                </a:tc>
+                <a:tc>
+                  <a:txBody>
+                    <a:bodyPr/>
+                    <a:lstStyle/>
+                    <a:p>
+                      <a:pPr marL="0" marR="0" algn="l">
+                        <a:lnSpc>
+                          <a:spcPct val="107000"/>
+                        </a:lnSpc>
+                        <a:spcBef>
+                          <a:spcPts val="0"/>
+                        </a:spcBef>
+                        <a:spcAft>
+                          <a:spcPts val="800"/>
+                        </a:spcAft>
+                      </a:pPr>
+                      <a:r>
+                        <a:rPr lang="en-US" sz="1500">
+                          <a:effectLst/>
+                        </a:rPr>
+                        <a:t>adam</a:t>
+                      </a:r>
+                      <a:endParaRPr lang="en-US" sz="1500">
+                        <a:effectLst/>
+                        <a:latin typeface="Times New Roman" panose="02020603050405020304" pitchFamily="18" charset="0"/>
+                        <a:ea typeface="Calibri" panose="020F0502020204030204" pitchFamily="34" charset="0"/>
+                        <a:cs typeface="Arial" panose="020B0604020202020204" pitchFamily="34" charset="0"/>
+                      </a:endParaRPr>
+                    </a:p>
+                  </a:txBody>
+                  <a:tcPr marL="68580" marR="68580" marT="0" marB="0"/>
+                </a:tc>
+                <a:tc>
+                  <a:txBody>
+                    <a:bodyPr/>
+                    <a:lstStyle/>
+                    <a:p>
+                      <a:pPr marL="0" marR="0" algn="l">
+                        <a:lnSpc>
+                          <a:spcPct val="107000"/>
+                        </a:lnSpc>
+                        <a:spcBef>
+                          <a:spcPts val="0"/>
+                        </a:spcBef>
+                        <a:spcAft>
+                          <a:spcPts val="800"/>
+                        </a:spcAft>
+                      </a:pPr>
+                      <a:r>
+                        <a:rPr lang="en-US" sz="1500">
+                          <a:effectLst/>
+                        </a:rPr>
+                        <a:t>Favorite Color?</a:t>
+                      </a:r>
+                      <a:endParaRPr lang="en-US" sz="1500">
+                        <a:effectLst/>
+                        <a:latin typeface="Times New Roman" panose="02020603050405020304" pitchFamily="18" charset="0"/>
+                        <a:ea typeface="Calibri" panose="020F0502020204030204" pitchFamily="34" charset="0"/>
+                        <a:cs typeface="Arial" panose="020B0604020202020204" pitchFamily="34" charset="0"/>
+                      </a:endParaRPr>
+                    </a:p>
+                  </a:txBody>
+                  <a:tcPr marL="68580" marR="68580" marT="0" marB="0"/>
+                </a:tc>
+                <a:tc>
+                  <a:txBody>
+                    <a:bodyPr/>
+                    <a:lstStyle/>
+                    <a:p>
+                      <a:pPr marL="0" marR="0" algn="l">
+                        <a:lnSpc>
+                          <a:spcPct val="107000"/>
+                        </a:lnSpc>
+                        <a:spcBef>
+                          <a:spcPts val="0"/>
+                        </a:spcBef>
+                        <a:spcAft>
+                          <a:spcPts val="800"/>
+                        </a:spcAft>
+                        <a:tabLst>
+                          <a:tab pos="316230" algn="l"/>
+                        </a:tabLst>
+                      </a:pPr>
+                      <a:r>
+                        <a:rPr lang="en-US" sz="1500">
+                          <a:effectLst/>
+                        </a:rPr>
+                        <a:t>pink</a:t>
+                      </a:r>
+                      <a:endParaRPr lang="en-US" sz="1500">
+                        <a:effectLst/>
+                        <a:latin typeface="Times New Roman" panose="02020603050405020304" pitchFamily="18" charset="0"/>
+                        <a:ea typeface="Calibri" panose="020F0502020204030204" pitchFamily="34" charset="0"/>
+                        <a:cs typeface="Arial" panose="020B0604020202020204" pitchFamily="34" charset="0"/>
+                      </a:endParaRPr>
+                    </a:p>
+                  </a:txBody>
+                  <a:tcPr marL="68580" marR="68580" marT="0" marB="0"/>
+                </a:tc>
+                <a:tc>
+                  <a:txBody>
+                    <a:bodyPr/>
+                    <a:lstStyle/>
+                    <a:p>
+                      <a:pPr marL="0" marR="0" algn="l">
+                        <a:lnSpc>
+                          <a:spcPct val="107000"/>
+                        </a:lnSpc>
+                        <a:spcBef>
+                          <a:spcPts val="0"/>
+                        </a:spcBef>
+                        <a:spcAft>
+                          <a:spcPts val="800"/>
+                        </a:spcAft>
+                      </a:pPr>
+                      <a:r>
+                        <a:rPr lang="en-US" sz="1500">
+                          <a:effectLst/>
+                        </a:rPr>
+                        <a:t>First pet name?</a:t>
+                      </a:r>
+                      <a:endParaRPr lang="en-US" sz="1500">
+                        <a:effectLst/>
+                        <a:latin typeface="Times New Roman" panose="02020603050405020304" pitchFamily="18" charset="0"/>
+                        <a:ea typeface="Calibri" panose="020F0502020204030204" pitchFamily="34" charset="0"/>
+                        <a:cs typeface="Arial" panose="020B0604020202020204" pitchFamily="34" charset="0"/>
+                      </a:endParaRPr>
+                    </a:p>
+                  </a:txBody>
+                  <a:tcPr marL="68580" marR="68580" marT="0" marB="0"/>
+                </a:tc>
+                <a:tc>
+                  <a:txBody>
+                    <a:bodyPr/>
+                    <a:lstStyle/>
+                    <a:p>
+                      <a:pPr marL="0" marR="0" algn="l">
+                        <a:lnSpc>
+                          <a:spcPct val="107000"/>
+                        </a:lnSpc>
+                        <a:spcBef>
+                          <a:spcPts val="0"/>
+                        </a:spcBef>
+                        <a:spcAft>
+                          <a:spcPts val="800"/>
+                        </a:spcAft>
+                      </a:pPr>
+                      <a:r>
+                        <a:rPr lang="en-US" sz="1500">
+                          <a:effectLst/>
+                        </a:rPr>
+                        <a:t>adam</a:t>
+                      </a:r>
+                      <a:endParaRPr lang="en-US" sz="1500">
+                        <a:effectLst/>
+                        <a:latin typeface="Times New Roman" panose="02020603050405020304" pitchFamily="18" charset="0"/>
+                        <a:ea typeface="Calibri" panose="020F0502020204030204" pitchFamily="34" charset="0"/>
+                        <a:cs typeface="Arial" panose="020B0604020202020204" pitchFamily="34" charset="0"/>
+                      </a:endParaRPr>
+                    </a:p>
+                  </a:txBody>
+                  <a:tcPr marL="68580" marR="68580" marT="0" marB="0"/>
+                </a:tc>
+                <a:tc>
+                  <a:txBody>
+                    <a:bodyPr/>
+                    <a:lstStyle/>
+                    <a:p>
+                      <a:pPr marL="0" marR="0" algn="l">
+                        <a:lnSpc>
+                          <a:spcPct val="107000"/>
+                        </a:lnSpc>
+                        <a:spcBef>
+                          <a:spcPts val="0"/>
+                        </a:spcBef>
+                        <a:spcAft>
+                          <a:spcPts val="800"/>
+                        </a:spcAft>
+                      </a:pPr>
+                      <a:r>
+                        <a:rPr lang="en-US" sz="1500">
+                          <a:effectLst/>
+                        </a:rPr>
+                        <a:t>Favorite movie?</a:t>
+                      </a:r>
+                      <a:endParaRPr lang="en-US" sz="1500">
+                        <a:effectLst/>
+                        <a:latin typeface="Times New Roman" panose="02020603050405020304" pitchFamily="18" charset="0"/>
+                        <a:ea typeface="Calibri" panose="020F0502020204030204" pitchFamily="34" charset="0"/>
+                        <a:cs typeface="Arial" panose="020B0604020202020204" pitchFamily="34" charset="0"/>
+                      </a:endParaRPr>
+                    </a:p>
+                  </a:txBody>
+                  <a:tcPr marL="68580" marR="68580" marT="0" marB="0"/>
+                </a:tc>
+                <a:tc>
+                  <a:txBody>
+                    <a:bodyPr/>
+                    <a:lstStyle/>
+                    <a:p>
+                      <a:pPr marL="0" marR="0" algn="l">
+                        <a:lnSpc>
+                          <a:spcPct val="107000"/>
+                        </a:lnSpc>
+                        <a:spcBef>
+                          <a:spcPts val="0"/>
+                        </a:spcBef>
+                        <a:spcAft>
+                          <a:spcPts val="800"/>
+                        </a:spcAft>
+                      </a:pPr>
+                      <a:r>
+                        <a:rPr lang="en-US" sz="1500">
+                          <a:effectLst/>
+                        </a:rPr>
+                        <a:t>adam</a:t>
+                      </a:r>
+                      <a:endParaRPr lang="en-US" sz="1500">
+                        <a:effectLst/>
+                        <a:latin typeface="Times New Roman" panose="02020603050405020304" pitchFamily="18" charset="0"/>
+                        <a:ea typeface="Calibri" panose="020F0502020204030204" pitchFamily="34" charset="0"/>
+                        <a:cs typeface="Arial" panose="020B0604020202020204" pitchFamily="34" charset="0"/>
+                      </a:endParaRPr>
+                    </a:p>
+                  </a:txBody>
+                  <a:tcPr marL="68580" marR="68580" marT="0" marB="0"/>
+                </a:tc>
+                <a:tc>
+                  <a:txBody>
+                    <a:bodyPr/>
+                    <a:lstStyle/>
+                    <a:p>
+                      <a:pPr marL="0" marR="0" algn="l">
+                        <a:lnSpc>
+                          <a:spcPct val="107000"/>
+                        </a:lnSpc>
+                        <a:spcBef>
+                          <a:spcPts val="0"/>
+                        </a:spcBef>
+                        <a:spcAft>
+                          <a:spcPts val="800"/>
+                        </a:spcAft>
+                      </a:pPr>
+                      <a:r>
+                        <a:rPr lang="en-US" sz="1500" dirty="0">
+                          <a:effectLst/>
+                        </a:rPr>
+                        <a:t>2020-01-12</a:t>
+                      </a:r>
+                      <a:endParaRPr lang="en-US" sz="1500" dirty="0">
+                        <a:effectLst/>
+                        <a:latin typeface="Times New Roman" panose="02020603050405020304" pitchFamily="18" charset="0"/>
+                        <a:ea typeface="Calibri" panose="020F0502020204030204" pitchFamily="34" charset="0"/>
+                        <a:cs typeface="Arial" panose="020B0604020202020204" pitchFamily="34" charset="0"/>
+                      </a:endParaRPr>
+                    </a:p>
+                  </a:txBody>
+                  <a:tcPr marL="68580" marR="68580" marT="0" marB="0"/>
+                </a:tc>
+                <a:extLst>
+                  <a:ext uri="{0D108BD9-81ED-4DB2-BD59-A6C34878D82A}">
+                    <a16:rowId xmlns:a16="http://schemas.microsoft.com/office/drawing/2014/main" val="1060748872"/>
+                  </a:ext>
+                </a:extLst>
+              </a:tr>
+            </a:tbl>
+          </a:graphicData>
+        </a:graphic>
+      </p:graphicFrame>
     </p:spTree>
     <p:extLst>
       <p:ext uri="{BB962C8B-B14F-4D97-AF65-F5344CB8AC3E}">
-        <p14:creationId xmlns:p14="http://schemas.microsoft.com/office/powerpoint/2010/main" val="3797687294"/>
+        <p14:creationId xmlns:p14="http://schemas.microsoft.com/office/powerpoint/2010/main" val="1644037923"/>
       </p:ext>
     </p:extLst>
   </p:cSld>
@@ -10003,310 +12196,500 @@
       </p:grpSpPr>
       <p:sp>
         <p:nvSpPr>
-          <p:cNvPr id="2" name="Title 1">
+          <p:cNvPr id="7" name="Title 1">
             <a:extLst>
               <a:ext uri="{FF2B5EF4-FFF2-40B4-BE49-F238E27FC236}">
-                <a16:creationId xmlns:a16="http://schemas.microsoft.com/office/drawing/2014/main" id="{911F9341-3619-114C-98B5-053DBEDD641F}"/>
+                <a16:creationId xmlns:a16="http://schemas.microsoft.com/office/drawing/2014/main" id="{B45D6D69-1C84-3F40-BB39-D872C768F71F}"/>
               </a:ext>
             </a:extLst>
           </p:cNvPr>
-          <p:cNvSpPr>
-            <a:spLocks noGrp="1"/>
+          <p:cNvSpPr txBox="1">
+            <a:spLocks/>
           </p:cNvSpPr>
-          <p:nvPr>
-            <p:ph type="title"/>
-          </p:nvPr>
-        </p:nvSpPr>
-        <p:spPr/>
+          <p:nvPr/>
+        </p:nvSpPr>
+        <p:spPr>
+          <a:xfrm>
+            <a:off x="351457" y="1082093"/>
+            <a:ext cx="10509047" cy="1080938"/>
+          </a:xfrm>
+          <a:prstGeom prst="rect">
+            <a:avLst/>
+          </a:prstGeom>
+        </p:spPr>
         <p:txBody>
           <a:bodyPr/>
-          <a:lstStyle/>
+          <a:lstStyle>
+            <a:lvl1pPr algn="l" defTabSz="914400" rtl="0" eaLnBrk="1" latinLnBrk="0" hangingPunct="1">
+              <a:lnSpc>
+                <a:spcPct val="90000"/>
+              </a:lnSpc>
+              <a:spcBef>
+                <a:spcPct val="0"/>
+              </a:spcBef>
+              <a:buNone/>
+              <a:defRPr sz="3600" kern="1200">
+                <a:solidFill>
+                  <a:schemeClr val="tx1"/>
+                </a:solidFill>
+                <a:latin typeface="+mj-lt"/>
+                <a:ea typeface="+mj-ea"/>
+                <a:cs typeface="+mj-cs"/>
+              </a:defRPr>
+            </a:lvl1pPr>
+          </a:lstStyle>
           <a:p>
             <a:r>
               <a:rPr lang="en-US" dirty="0"/>
-              <a:t>System Tests</a:t>
-            </a:r>
+              <a:t>SystemTest-PMS-SecurityQuestion-003-Rainy02</a:t>
+            </a:r>
+          </a:p>
+          <a:p>
+            <a:endParaRPr lang="en-US" dirty="0"/>
           </a:p>
         </p:txBody>
       </p:sp>
       <p:sp>
         <p:nvSpPr>
-          <p:cNvPr id="3" name="Content Placeholder 2">
+          <p:cNvPr id="10" name="Content Placeholder 2">
             <a:extLst>
               <a:ext uri="{FF2B5EF4-FFF2-40B4-BE49-F238E27FC236}">
-                <a16:creationId xmlns:a16="http://schemas.microsoft.com/office/drawing/2014/main" id="{AF40CFC8-5303-FA40-BA82-11C32A6BB172}"/>
+                <a16:creationId xmlns:a16="http://schemas.microsoft.com/office/drawing/2014/main" id="{60DF5BC1-3D27-B24A-8675-063DE3303D7C}"/>
               </a:ext>
             </a:extLst>
           </p:cNvPr>
-          <p:cNvSpPr>
-            <a:spLocks noGrp="1"/>
+          <p:cNvSpPr txBox="1">
+            <a:spLocks/>
           </p:cNvSpPr>
-          <p:nvPr>
-            <p:ph idx="1"/>
-          </p:nvPr>
-        </p:nvSpPr>
-        <p:spPr/>
+          <p:nvPr/>
+        </p:nvSpPr>
+        <p:spPr>
+          <a:xfrm>
+            <a:off x="351457" y="2087183"/>
+            <a:ext cx="9613861" cy="1737212"/>
+          </a:xfrm>
+          <a:prstGeom prst="rect">
+            <a:avLst/>
+          </a:prstGeom>
+        </p:spPr>
         <p:txBody>
-          <a:bodyPr/>
-          <a:lstStyle/>
-          <a:p>
-            <a:endParaRPr lang="en-US" dirty="0"/>
+          <a:bodyPr>
+            <a:normAutofit lnSpcReduction="10000"/>
+          </a:bodyPr>
+          <a:lstStyle>
+            <a:lvl1pPr marL="228600" indent="-228600" algn="l" defTabSz="914400" rtl="0" eaLnBrk="1" latinLnBrk="0" hangingPunct="1">
+              <a:lnSpc>
+                <a:spcPct val="90000"/>
+              </a:lnSpc>
+              <a:spcBef>
+                <a:spcPts val="1000"/>
+              </a:spcBef>
+              <a:buFont typeface="Arial" panose="020B0604020202020204" pitchFamily="34" charset="0"/>
+              <a:buChar char="•"/>
+              <a:defRPr sz="2400" kern="1200">
+                <a:solidFill>
+                  <a:schemeClr val="tx1"/>
+                </a:solidFill>
+                <a:latin typeface="+mn-lt"/>
+                <a:ea typeface="+mn-ea"/>
+                <a:cs typeface="+mn-cs"/>
+              </a:defRPr>
+            </a:lvl1pPr>
+            <a:lvl2pPr marL="685800" indent="-228600" algn="l" defTabSz="914400" rtl="0" eaLnBrk="1" latinLnBrk="0" hangingPunct="1">
+              <a:lnSpc>
+                <a:spcPct val="90000"/>
+              </a:lnSpc>
+              <a:spcBef>
+                <a:spcPts val="500"/>
+              </a:spcBef>
+              <a:buFont typeface="Arial" panose="020B0604020202020204" pitchFamily="34" charset="0"/>
+              <a:buChar char="•"/>
+              <a:defRPr sz="2000" kern="1200">
+                <a:solidFill>
+                  <a:schemeClr val="tx1"/>
+                </a:solidFill>
+                <a:latin typeface="+mn-lt"/>
+                <a:ea typeface="+mn-ea"/>
+                <a:cs typeface="+mn-cs"/>
+              </a:defRPr>
+            </a:lvl2pPr>
+            <a:lvl3pPr marL="1143000" indent="-228600" algn="l" defTabSz="914400" rtl="0" eaLnBrk="1" latinLnBrk="0" hangingPunct="1">
+              <a:lnSpc>
+                <a:spcPct val="90000"/>
+              </a:lnSpc>
+              <a:spcBef>
+                <a:spcPts val="500"/>
+              </a:spcBef>
+              <a:buFont typeface="Arial" panose="020B0604020202020204" pitchFamily="34" charset="0"/>
+              <a:buChar char="•"/>
+              <a:defRPr sz="1800" kern="1200">
+                <a:solidFill>
+                  <a:schemeClr val="tx1"/>
+                </a:solidFill>
+                <a:latin typeface="+mn-lt"/>
+                <a:ea typeface="+mn-ea"/>
+                <a:cs typeface="+mn-cs"/>
+              </a:defRPr>
+            </a:lvl3pPr>
+            <a:lvl4pPr marL="1600200" indent="-228600" algn="l" defTabSz="914400" rtl="0" eaLnBrk="1" latinLnBrk="0" hangingPunct="1">
+              <a:lnSpc>
+                <a:spcPct val="90000"/>
+              </a:lnSpc>
+              <a:spcBef>
+                <a:spcPts val="500"/>
+              </a:spcBef>
+              <a:buFont typeface="Arial" panose="020B0604020202020204" pitchFamily="34" charset="0"/>
+              <a:buChar char="•"/>
+              <a:defRPr sz="1600" kern="1200">
+                <a:solidFill>
+                  <a:schemeClr val="tx1"/>
+                </a:solidFill>
+                <a:latin typeface="+mn-lt"/>
+                <a:ea typeface="+mn-ea"/>
+                <a:cs typeface="+mn-cs"/>
+              </a:defRPr>
+            </a:lvl4pPr>
+            <a:lvl5pPr marL="2057400" indent="-228600" algn="l" defTabSz="914400" rtl="0" eaLnBrk="1" latinLnBrk="0" hangingPunct="1">
+              <a:lnSpc>
+                <a:spcPct val="90000"/>
+              </a:lnSpc>
+              <a:spcBef>
+                <a:spcPts val="500"/>
+              </a:spcBef>
+              <a:buFont typeface="Arial" panose="020B0604020202020204" pitchFamily="34" charset="0"/>
+              <a:buChar char="•"/>
+              <a:defRPr sz="1600" kern="1200">
+                <a:solidFill>
+                  <a:schemeClr val="tx1"/>
+                </a:solidFill>
+                <a:latin typeface="+mn-lt"/>
+                <a:ea typeface="+mn-ea"/>
+                <a:cs typeface="+mn-cs"/>
+              </a:defRPr>
+            </a:lvl5pPr>
+            <a:lvl6pPr marL="2514600" indent="-228600" algn="l" defTabSz="914400" rtl="0" eaLnBrk="1" latinLnBrk="0" hangingPunct="1">
+              <a:lnSpc>
+                <a:spcPct val="90000"/>
+              </a:lnSpc>
+              <a:spcBef>
+                <a:spcPts val="500"/>
+              </a:spcBef>
+              <a:buFont typeface="Arial" panose="020B0604020202020204" pitchFamily="34" charset="0"/>
+              <a:buChar char="•"/>
+              <a:defRPr sz="1400" kern="1200">
+                <a:solidFill>
+                  <a:schemeClr val="tx1"/>
+                </a:solidFill>
+                <a:latin typeface="+mn-lt"/>
+                <a:ea typeface="+mn-ea"/>
+                <a:cs typeface="+mn-cs"/>
+              </a:defRPr>
+            </a:lvl6pPr>
+            <a:lvl7pPr marL="2971800" indent="-228600" algn="l" defTabSz="914400" rtl="0" eaLnBrk="1" latinLnBrk="0" hangingPunct="1">
+              <a:lnSpc>
+                <a:spcPct val="90000"/>
+              </a:lnSpc>
+              <a:spcBef>
+                <a:spcPts val="500"/>
+              </a:spcBef>
+              <a:buFont typeface="Arial" panose="020B0604020202020204" pitchFamily="34" charset="0"/>
+              <a:buChar char="•"/>
+              <a:defRPr sz="1400" kern="1200">
+                <a:solidFill>
+                  <a:schemeClr val="tx1"/>
+                </a:solidFill>
+                <a:latin typeface="+mn-lt"/>
+                <a:ea typeface="+mn-ea"/>
+                <a:cs typeface="+mn-cs"/>
+              </a:defRPr>
+            </a:lvl7pPr>
+            <a:lvl8pPr marL="3429000" indent="-228600" algn="l" defTabSz="914400" rtl="0" eaLnBrk="1" latinLnBrk="0" hangingPunct="1">
+              <a:lnSpc>
+                <a:spcPct val="90000"/>
+              </a:lnSpc>
+              <a:spcBef>
+                <a:spcPts val="500"/>
+              </a:spcBef>
+              <a:buFont typeface="Arial" panose="020B0604020202020204" pitchFamily="34" charset="0"/>
+              <a:buChar char="•"/>
+              <a:defRPr sz="1400" kern="1200">
+                <a:solidFill>
+                  <a:schemeClr val="tx1"/>
+                </a:solidFill>
+                <a:latin typeface="+mn-lt"/>
+                <a:ea typeface="+mn-ea"/>
+                <a:cs typeface="+mn-cs"/>
+              </a:defRPr>
+            </a:lvl8pPr>
+            <a:lvl9pPr marL="3886200" indent="-228600" algn="l" defTabSz="914400" rtl="0" eaLnBrk="1" latinLnBrk="0" hangingPunct="1">
+              <a:lnSpc>
+                <a:spcPct val="90000"/>
+              </a:lnSpc>
+              <a:spcBef>
+                <a:spcPts val="500"/>
+              </a:spcBef>
+              <a:buFont typeface="Arial" panose="020B0604020202020204" pitchFamily="34" charset="0"/>
+              <a:buChar char="•"/>
+              <a:defRPr sz="1400" kern="1200">
+                <a:solidFill>
+                  <a:schemeClr val="tx1"/>
+                </a:solidFill>
+                <a:latin typeface="+mn-lt"/>
+                <a:ea typeface="+mn-ea"/>
+                <a:cs typeface="+mn-cs"/>
+              </a:defRPr>
+            </a:lvl9pPr>
+          </a:lstStyle>
+          <a:p>
+            <a:r>
+              <a:rPr lang="en-US" b="1" dirty="0"/>
+              <a:t>Test input: </a:t>
+            </a:r>
+          </a:p>
+          <a:p>
+            <a:pPr lvl="1"/>
+            <a:r>
+              <a:rPr lang="en-US" dirty="0"/>
+              <a:t>Adam Clicks on “Forgot Password?”</a:t>
+            </a:r>
+          </a:p>
+          <a:p>
+            <a:pPr lvl="1"/>
+            <a:r>
+              <a:rPr lang="en-US" dirty="0"/>
+              <a:t>Then he inputs his employee ID &amp; Username</a:t>
+            </a:r>
+          </a:p>
+          <a:p>
+            <a:pPr lvl="1"/>
+            <a:r>
+              <a:rPr lang="en-US" dirty="0"/>
+              <a:t>He selects security questions &amp; input answers for them</a:t>
+            </a:r>
+          </a:p>
+          <a:p>
+            <a:pPr lvl="1"/>
+            <a:r>
+              <a:rPr lang="en-US" dirty="0"/>
+              <a:t>He finally clicks on Get Password button</a:t>
+            </a:r>
+          </a:p>
+          <a:p>
+            <a:pPr lvl="1"/>
+            <a:endParaRPr lang="en-US" b="1" dirty="0"/>
+          </a:p>
+        </p:txBody>
+      </p:sp>
+      <p:sp>
+        <p:nvSpPr>
+          <p:cNvPr id="11" name="Content Placeholder 2">
+            <a:extLst>
+              <a:ext uri="{FF2B5EF4-FFF2-40B4-BE49-F238E27FC236}">
+                <a16:creationId xmlns:a16="http://schemas.microsoft.com/office/drawing/2014/main" id="{9A854680-9033-EB41-B526-45A55BB64E35}"/>
+              </a:ext>
+            </a:extLst>
+          </p:cNvPr>
+          <p:cNvSpPr txBox="1">
+            <a:spLocks/>
+          </p:cNvSpPr>
+          <p:nvPr/>
+        </p:nvSpPr>
+        <p:spPr>
+          <a:xfrm>
+            <a:off x="351457" y="4123828"/>
+            <a:ext cx="10388731" cy="1106904"/>
+          </a:xfrm>
+          <a:prstGeom prst="rect">
+            <a:avLst/>
+          </a:prstGeom>
+        </p:spPr>
+        <p:txBody>
+          <a:bodyPr>
+            <a:normAutofit/>
+          </a:bodyPr>
+          <a:lstStyle>
+            <a:lvl1pPr marL="228600" indent="-228600" algn="l" defTabSz="914400" rtl="0" eaLnBrk="1" latinLnBrk="0" hangingPunct="1">
+              <a:lnSpc>
+                <a:spcPct val="90000"/>
+              </a:lnSpc>
+              <a:spcBef>
+                <a:spcPts val="1000"/>
+              </a:spcBef>
+              <a:buFont typeface="Arial" panose="020B0604020202020204" pitchFamily="34" charset="0"/>
+              <a:buChar char="•"/>
+              <a:defRPr sz="2400" kern="1200">
+                <a:solidFill>
+                  <a:schemeClr val="tx1"/>
+                </a:solidFill>
+                <a:latin typeface="+mn-lt"/>
+                <a:ea typeface="+mn-ea"/>
+                <a:cs typeface="+mn-cs"/>
+              </a:defRPr>
+            </a:lvl1pPr>
+            <a:lvl2pPr marL="685800" indent="-228600" algn="l" defTabSz="914400" rtl="0" eaLnBrk="1" latinLnBrk="0" hangingPunct="1">
+              <a:lnSpc>
+                <a:spcPct val="90000"/>
+              </a:lnSpc>
+              <a:spcBef>
+                <a:spcPts val="500"/>
+              </a:spcBef>
+              <a:buFont typeface="Arial" panose="020B0604020202020204" pitchFamily="34" charset="0"/>
+              <a:buChar char="•"/>
+              <a:defRPr sz="2000" kern="1200">
+                <a:solidFill>
+                  <a:schemeClr val="tx1"/>
+                </a:solidFill>
+                <a:latin typeface="+mn-lt"/>
+                <a:ea typeface="+mn-ea"/>
+                <a:cs typeface="+mn-cs"/>
+              </a:defRPr>
+            </a:lvl2pPr>
+            <a:lvl3pPr marL="1143000" indent="-228600" algn="l" defTabSz="914400" rtl="0" eaLnBrk="1" latinLnBrk="0" hangingPunct="1">
+              <a:lnSpc>
+                <a:spcPct val="90000"/>
+              </a:lnSpc>
+              <a:spcBef>
+                <a:spcPts val="500"/>
+              </a:spcBef>
+              <a:buFont typeface="Arial" panose="020B0604020202020204" pitchFamily="34" charset="0"/>
+              <a:buChar char="•"/>
+              <a:defRPr sz="1800" kern="1200">
+                <a:solidFill>
+                  <a:schemeClr val="tx1"/>
+                </a:solidFill>
+                <a:latin typeface="+mn-lt"/>
+                <a:ea typeface="+mn-ea"/>
+                <a:cs typeface="+mn-cs"/>
+              </a:defRPr>
+            </a:lvl3pPr>
+            <a:lvl4pPr marL="1600200" indent="-228600" algn="l" defTabSz="914400" rtl="0" eaLnBrk="1" latinLnBrk="0" hangingPunct="1">
+              <a:lnSpc>
+                <a:spcPct val="90000"/>
+              </a:lnSpc>
+              <a:spcBef>
+                <a:spcPts val="500"/>
+              </a:spcBef>
+              <a:buFont typeface="Arial" panose="020B0604020202020204" pitchFamily="34" charset="0"/>
+              <a:buChar char="•"/>
+              <a:defRPr sz="1600" kern="1200">
+                <a:solidFill>
+                  <a:schemeClr val="tx1"/>
+                </a:solidFill>
+                <a:latin typeface="+mn-lt"/>
+                <a:ea typeface="+mn-ea"/>
+                <a:cs typeface="+mn-cs"/>
+              </a:defRPr>
+            </a:lvl4pPr>
+            <a:lvl5pPr marL="2057400" indent="-228600" algn="l" defTabSz="914400" rtl="0" eaLnBrk="1" latinLnBrk="0" hangingPunct="1">
+              <a:lnSpc>
+                <a:spcPct val="90000"/>
+              </a:lnSpc>
+              <a:spcBef>
+                <a:spcPts val="500"/>
+              </a:spcBef>
+              <a:buFont typeface="Arial" panose="020B0604020202020204" pitchFamily="34" charset="0"/>
+              <a:buChar char="•"/>
+              <a:defRPr sz="1600" kern="1200">
+                <a:solidFill>
+                  <a:schemeClr val="tx1"/>
+                </a:solidFill>
+                <a:latin typeface="+mn-lt"/>
+                <a:ea typeface="+mn-ea"/>
+                <a:cs typeface="+mn-cs"/>
+              </a:defRPr>
+            </a:lvl5pPr>
+            <a:lvl6pPr marL="2514600" indent="-228600" algn="l" defTabSz="914400" rtl="0" eaLnBrk="1" latinLnBrk="0" hangingPunct="1">
+              <a:lnSpc>
+                <a:spcPct val="90000"/>
+              </a:lnSpc>
+              <a:spcBef>
+                <a:spcPts val="500"/>
+              </a:spcBef>
+              <a:buFont typeface="Arial" panose="020B0604020202020204" pitchFamily="34" charset="0"/>
+              <a:buChar char="•"/>
+              <a:defRPr sz="1400" kern="1200">
+                <a:solidFill>
+                  <a:schemeClr val="tx1"/>
+                </a:solidFill>
+                <a:latin typeface="+mn-lt"/>
+                <a:ea typeface="+mn-ea"/>
+                <a:cs typeface="+mn-cs"/>
+              </a:defRPr>
+            </a:lvl6pPr>
+            <a:lvl7pPr marL="2971800" indent="-228600" algn="l" defTabSz="914400" rtl="0" eaLnBrk="1" latinLnBrk="0" hangingPunct="1">
+              <a:lnSpc>
+                <a:spcPct val="90000"/>
+              </a:lnSpc>
+              <a:spcBef>
+                <a:spcPts val="500"/>
+              </a:spcBef>
+              <a:buFont typeface="Arial" panose="020B0604020202020204" pitchFamily="34" charset="0"/>
+              <a:buChar char="•"/>
+              <a:defRPr sz="1400" kern="1200">
+                <a:solidFill>
+                  <a:schemeClr val="tx1"/>
+                </a:solidFill>
+                <a:latin typeface="+mn-lt"/>
+                <a:ea typeface="+mn-ea"/>
+                <a:cs typeface="+mn-cs"/>
+              </a:defRPr>
+            </a:lvl7pPr>
+            <a:lvl8pPr marL="3429000" indent="-228600" algn="l" defTabSz="914400" rtl="0" eaLnBrk="1" latinLnBrk="0" hangingPunct="1">
+              <a:lnSpc>
+                <a:spcPct val="90000"/>
+              </a:lnSpc>
+              <a:spcBef>
+                <a:spcPts val="500"/>
+              </a:spcBef>
+              <a:buFont typeface="Arial" panose="020B0604020202020204" pitchFamily="34" charset="0"/>
+              <a:buChar char="•"/>
+              <a:defRPr sz="1400" kern="1200">
+                <a:solidFill>
+                  <a:schemeClr val="tx1"/>
+                </a:solidFill>
+                <a:latin typeface="+mn-lt"/>
+                <a:ea typeface="+mn-ea"/>
+                <a:cs typeface="+mn-cs"/>
+              </a:defRPr>
+            </a:lvl8pPr>
+            <a:lvl9pPr marL="3886200" indent="-228600" algn="l" defTabSz="914400" rtl="0" eaLnBrk="1" latinLnBrk="0" hangingPunct="1">
+              <a:lnSpc>
+                <a:spcPct val="90000"/>
+              </a:lnSpc>
+              <a:spcBef>
+                <a:spcPts val="500"/>
+              </a:spcBef>
+              <a:buFont typeface="Arial" panose="020B0604020202020204" pitchFamily="34" charset="0"/>
+              <a:buChar char="•"/>
+              <a:defRPr sz="1400" kern="1200">
+                <a:solidFill>
+                  <a:schemeClr val="tx1"/>
+                </a:solidFill>
+                <a:latin typeface="+mn-lt"/>
+                <a:ea typeface="+mn-ea"/>
+                <a:cs typeface="+mn-cs"/>
+              </a:defRPr>
+            </a:lvl9pPr>
+          </a:lstStyle>
+          <a:p>
+            <a:r>
+              <a:rPr lang="en-US" b="1" dirty="0"/>
+              <a:t>Expected output: </a:t>
+            </a:r>
+          </a:p>
+          <a:p>
+            <a:pPr lvl="1"/>
+            <a:r>
+              <a:rPr lang="en-US" dirty="0"/>
+              <a:t>“user details not found” alert will be shown since Adam did not enter correct answers for security questions. Hence there would be no changes to the database.</a:t>
+            </a:r>
           </a:p>
         </p:txBody>
       </p:sp>
     </p:spTree>
     <p:extLst>
       <p:ext uri="{BB962C8B-B14F-4D97-AF65-F5344CB8AC3E}">
-        <p14:creationId xmlns:p14="http://schemas.microsoft.com/office/powerpoint/2010/main" val="600130600"/>
-      </p:ext>
-    </p:extLst>
-  </p:cSld>
-  <p:clrMapOvr>
-    <a:masterClrMapping/>
-  </p:clrMapOvr>
-</p:sld>
-</file>
-
-<file path=ppt/slides/slide17.xml><?xml version="1.0" encoding="utf-8"?>
-<p:sld xmlns:a="http://schemas.openxmlformats.org/drawingml/2006/main" xmlns:r="http://schemas.openxmlformats.org/officeDocument/2006/relationships" xmlns:p="http://schemas.openxmlformats.org/presentationml/2006/main">
-  <p:cSld>
-    <p:spTree>
-      <p:nvGrpSpPr>
-        <p:cNvPr id="1" name=""/>
-        <p:cNvGrpSpPr/>
-        <p:nvPr/>
-      </p:nvGrpSpPr>
-      <p:grpSpPr>
-        <a:xfrm>
-          <a:off x="0" y="0"/>
-          <a:ext cx="0" cy="0"/>
-          <a:chOff x="0" y="0"/>
-          <a:chExt cx="0" cy="0"/>
-        </a:xfrm>
-      </p:grpSpPr>
-      <p:sp>
-        <p:nvSpPr>
-          <p:cNvPr id="2" name="Title 1">
-            <a:extLst>
-              <a:ext uri="{FF2B5EF4-FFF2-40B4-BE49-F238E27FC236}">
-                <a16:creationId xmlns:a16="http://schemas.microsoft.com/office/drawing/2014/main" id="{5F520D75-B082-2840-B78C-7B187194F4A4}"/>
-              </a:ext>
-            </a:extLst>
-          </p:cNvPr>
-          <p:cNvSpPr>
-            <a:spLocks noGrp="1"/>
-          </p:cNvSpPr>
-          <p:nvPr>
-            <p:ph type="title"/>
-          </p:nvPr>
-        </p:nvSpPr>
-        <p:spPr/>
-        <p:txBody>
-          <a:bodyPr/>
-          <a:lstStyle/>
-          <a:p>
-            <a:r>
-              <a:rPr lang="en-US" dirty="0"/>
-              <a:t>System Tests</a:t>
-            </a:r>
-          </a:p>
-        </p:txBody>
-      </p:sp>
-      <p:sp>
-        <p:nvSpPr>
-          <p:cNvPr id="3" name="Content Placeholder 2">
-            <a:extLst>
-              <a:ext uri="{FF2B5EF4-FFF2-40B4-BE49-F238E27FC236}">
-                <a16:creationId xmlns:a16="http://schemas.microsoft.com/office/drawing/2014/main" id="{C9362FB3-9803-DE4E-B4C7-705AB9E6F428}"/>
-              </a:ext>
-            </a:extLst>
-          </p:cNvPr>
-          <p:cNvSpPr>
-            <a:spLocks noGrp="1"/>
-          </p:cNvSpPr>
-          <p:nvPr>
-            <p:ph idx="1"/>
-          </p:nvPr>
-        </p:nvSpPr>
-        <p:spPr/>
-        <p:txBody>
-          <a:bodyPr/>
-          <a:lstStyle/>
-          <a:p>
-            <a:endParaRPr lang="en-US"/>
-          </a:p>
-        </p:txBody>
-      </p:sp>
-    </p:spTree>
-    <p:extLst>
-      <p:ext uri="{BB962C8B-B14F-4D97-AF65-F5344CB8AC3E}">
-        <p14:creationId xmlns:p14="http://schemas.microsoft.com/office/powerpoint/2010/main" val="2734053175"/>
-      </p:ext>
-    </p:extLst>
-  </p:cSld>
-  <p:clrMapOvr>
-    <a:masterClrMapping/>
-  </p:clrMapOvr>
-</p:sld>
-</file>
-
-<file path=ppt/slides/slide18.xml><?xml version="1.0" encoding="utf-8"?>
-<p:sld xmlns:a="http://schemas.openxmlformats.org/drawingml/2006/main" xmlns:r="http://schemas.openxmlformats.org/officeDocument/2006/relationships" xmlns:p="http://schemas.openxmlformats.org/presentationml/2006/main">
-  <p:cSld>
-    <p:spTree>
-      <p:nvGrpSpPr>
-        <p:cNvPr id="1" name=""/>
-        <p:cNvGrpSpPr/>
-        <p:nvPr/>
-      </p:nvGrpSpPr>
-      <p:grpSpPr>
-        <a:xfrm>
-          <a:off x="0" y="0"/>
-          <a:ext cx="0" cy="0"/>
-          <a:chOff x="0" y="0"/>
-          <a:chExt cx="0" cy="0"/>
-        </a:xfrm>
-      </p:grpSpPr>
-      <p:sp>
-        <p:nvSpPr>
-          <p:cNvPr id="2" name="Title 1">
-            <a:extLst>
-              <a:ext uri="{FF2B5EF4-FFF2-40B4-BE49-F238E27FC236}">
-                <a16:creationId xmlns:a16="http://schemas.microsoft.com/office/drawing/2014/main" id="{13CBF251-C50D-7145-A17C-D2FDAF7FE480}"/>
-              </a:ext>
-            </a:extLst>
-          </p:cNvPr>
-          <p:cNvSpPr>
-            <a:spLocks noGrp="1"/>
-          </p:cNvSpPr>
-          <p:nvPr>
-            <p:ph type="title"/>
-          </p:nvPr>
-        </p:nvSpPr>
-        <p:spPr/>
-        <p:txBody>
-          <a:bodyPr/>
-          <a:lstStyle/>
-          <a:p>
-            <a:r>
-              <a:rPr lang="en-US" dirty="0"/>
-              <a:t>System Tests</a:t>
-            </a:r>
-          </a:p>
-        </p:txBody>
-      </p:sp>
-      <p:sp>
-        <p:nvSpPr>
-          <p:cNvPr id="3" name="Content Placeholder 2">
-            <a:extLst>
-              <a:ext uri="{FF2B5EF4-FFF2-40B4-BE49-F238E27FC236}">
-                <a16:creationId xmlns:a16="http://schemas.microsoft.com/office/drawing/2014/main" id="{0AD1B2BB-D8B2-8D43-BEE9-114BD09747CE}"/>
-              </a:ext>
-            </a:extLst>
-          </p:cNvPr>
-          <p:cNvSpPr>
-            <a:spLocks noGrp="1"/>
-          </p:cNvSpPr>
-          <p:nvPr>
-            <p:ph idx="1"/>
-          </p:nvPr>
-        </p:nvSpPr>
-        <p:spPr/>
-        <p:txBody>
-          <a:bodyPr/>
-          <a:lstStyle/>
-          <a:p>
-            <a:endParaRPr lang="en-US"/>
-          </a:p>
-        </p:txBody>
-      </p:sp>
-    </p:spTree>
-    <p:extLst>
-      <p:ext uri="{BB962C8B-B14F-4D97-AF65-F5344CB8AC3E}">
-        <p14:creationId xmlns:p14="http://schemas.microsoft.com/office/powerpoint/2010/main" val="2208631635"/>
-      </p:ext>
-    </p:extLst>
-  </p:cSld>
-  <p:clrMapOvr>
-    <a:masterClrMapping/>
-  </p:clrMapOvr>
-</p:sld>
-</file>
-
-<file path=ppt/slides/slide19.xml><?xml version="1.0" encoding="utf-8"?>
-<p:sld xmlns:a="http://schemas.openxmlformats.org/drawingml/2006/main" xmlns:r="http://schemas.openxmlformats.org/officeDocument/2006/relationships" xmlns:p="http://schemas.openxmlformats.org/presentationml/2006/main">
-  <p:cSld>
-    <p:spTree>
-      <p:nvGrpSpPr>
-        <p:cNvPr id="1" name=""/>
-        <p:cNvGrpSpPr/>
-        <p:nvPr/>
-      </p:nvGrpSpPr>
-      <p:grpSpPr>
-        <a:xfrm>
-          <a:off x="0" y="0"/>
-          <a:ext cx="0" cy="0"/>
-          <a:chOff x="0" y="0"/>
-          <a:chExt cx="0" cy="0"/>
-        </a:xfrm>
-      </p:grpSpPr>
-      <p:sp>
-        <p:nvSpPr>
-          <p:cNvPr id="2" name="Title 1">
-            <a:extLst>
-              <a:ext uri="{FF2B5EF4-FFF2-40B4-BE49-F238E27FC236}">
-                <a16:creationId xmlns:a16="http://schemas.microsoft.com/office/drawing/2014/main" id="{BE5CD5EB-F7DD-F940-B733-B115B1B302FE}"/>
-              </a:ext>
-            </a:extLst>
-          </p:cNvPr>
-          <p:cNvSpPr>
-            <a:spLocks noGrp="1"/>
-          </p:cNvSpPr>
-          <p:nvPr>
-            <p:ph type="title"/>
-          </p:nvPr>
-        </p:nvSpPr>
-        <p:spPr/>
-        <p:txBody>
-          <a:bodyPr/>
-          <a:lstStyle/>
-          <a:p>
-            <a:r>
-              <a:rPr lang="en-US"/>
-              <a:t>System Tests</a:t>
-            </a:r>
-          </a:p>
-        </p:txBody>
-      </p:sp>
-      <p:sp>
-        <p:nvSpPr>
-          <p:cNvPr id="3" name="Content Placeholder 2">
-            <a:extLst>
-              <a:ext uri="{FF2B5EF4-FFF2-40B4-BE49-F238E27FC236}">
-                <a16:creationId xmlns:a16="http://schemas.microsoft.com/office/drawing/2014/main" id="{356DC83A-BCF9-094D-9CB3-7E4051BB8B34}"/>
-              </a:ext>
-            </a:extLst>
-          </p:cNvPr>
-          <p:cNvSpPr>
-            <a:spLocks noGrp="1"/>
-          </p:cNvSpPr>
-          <p:nvPr>
-            <p:ph idx="1"/>
-          </p:nvPr>
-        </p:nvSpPr>
-        <p:spPr/>
-        <p:txBody>
-          <a:bodyPr/>
-          <a:lstStyle/>
-          <a:p>
-            <a:endParaRPr lang="en-US"/>
-          </a:p>
-        </p:txBody>
-      </p:sp>
-    </p:spTree>
-    <p:extLst>
-      <p:ext uri="{BB962C8B-B14F-4D97-AF65-F5344CB8AC3E}">
-        <p14:creationId xmlns:p14="http://schemas.microsoft.com/office/powerpoint/2010/main" val="2089004631"/>
+        <p14:creationId xmlns:p14="http://schemas.microsoft.com/office/powerpoint/2010/main" val="38777595"/>
       </p:ext>
     </p:extLst>
   </p:cSld>
@@ -11621,21 +14004,45 @@
           <p:cNvPr id="2" name="Title 1">
             <a:extLst>
               <a:ext uri="{FF2B5EF4-FFF2-40B4-BE49-F238E27FC236}">
-                <a16:creationId xmlns:a16="http://schemas.microsoft.com/office/drawing/2014/main" id="{77DC1AED-D2ED-CE4A-BAE5-EC01FF208496}"/>
+                <a16:creationId xmlns:a16="http://schemas.microsoft.com/office/drawing/2014/main" id="{9F5BF070-6150-5E42-AA3D-1EFF79F02ED5}"/>
               </a:ext>
             </a:extLst>
           </p:cNvPr>
-          <p:cNvSpPr>
-            <a:spLocks noGrp="1"/>
+          <p:cNvSpPr txBox="1">
+            <a:spLocks/>
           </p:cNvSpPr>
-          <p:nvPr>
-            <p:ph type="title"/>
-          </p:nvPr>
-        </p:nvSpPr>
-        <p:spPr/>
+          <p:nvPr/>
+        </p:nvSpPr>
+        <p:spPr>
+          <a:xfrm>
+            <a:off x="327395" y="701791"/>
+            <a:ext cx="9613861" cy="1080938"/>
+          </a:xfrm>
+          <a:prstGeom prst="rect">
+            <a:avLst/>
+          </a:prstGeom>
+        </p:spPr>
         <p:txBody>
           <a:bodyPr/>
-          <a:lstStyle/>
+          <a:lstStyle>
+            <a:lvl1pPr algn="l" defTabSz="914400" rtl="0" eaLnBrk="1" latinLnBrk="0" hangingPunct="1">
+              <a:lnSpc>
+                <a:spcPct val="90000"/>
+              </a:lnSpc>
+              <a:spcBef>
+                <a:spcPct val="0"/>
+              </a:spcBef>
+              <a:buNone/>
+              <a:defRPr sz="3600" kern="1200">
+                <a:solidFill>
+                  <a:schemeClr val="tx1"/>
+                </a:solidFill>
+                <a:latin typeface="+mj-lt"/>
+                <a:ea typeface="+mj-ea"/>
+                <a:cs typeface="+mj-cs"/>
+              </a:defRPr>
+            </a:lvl1pPr>
+          </a:lstStyle>
           <a:p>
             <a:r>
               <a:rPr lang="en-US" dirty="0"/>
@@ -11644,35 +14051,40 @@
           </a:p>
         </p:txBody>
       </p:sp>
-      <p:sp>
-        <p:nvSpPr>
-          <p:cNvPr id="3" name="Content Placeholder 2">
+      <p:pic>
+        <p:nvPicPr>
+          <p:cNvPr id="3" name="Picture 2">
             <a:extLst>
               <a:ext uri="{FF2B5EF4-FFF2-40B4-BE49-F238E27FC236}">
-                <a16:creationId xmlns:a16="http://schemas.microsoft.com/office/drawing/2014/main" id="{57234F9C-84F8-BD41-B4AA-455429CC0959}"/>
+                <a16:creationId xmlns:a16="http://schemas.microsoft.com/office/drawing/2014/main" id="{09B31AD6-A815-E444-A8D4-9A8184CCA397}"/>
               </a:ext>
             </a:extLst>
           </p:cNvPr>
-          <p:cNvSpPr>
-            <a:spLocks noGrp="1"/>
-          </p:cNvSpPr>
-          <p:nvPr>
-            <p:ph idx="1"/>
-          </p:nvPr>
-        </p:nvSpPr>
-        <p:spPr/>
-        <p:txBody>
-          <a:bodyPr/>
-          <a:lstStyle/>
-          <a:p>
-            <a:endParaRPr lang="en-US" dirty="0"/>
-          </a:p>
-        </p:txBody>
-      </p:sp>
+          <p:cNvPicPr>
+            <a:picLocks noChangeAspect="1"/>
+          </p:cNvPicPr>
+          <p:nvPr/>
+        </p:nvPicPr>
+        <p:blipFill>
+          <a:blip r:embed="rId2"/>
+          <a:stretch>
+            <a:fillRect/>
+          </a:stretch>
+        </p:blipFill>
+        <p:spPr>
+          <a:xfrm>
+            <a:off x="1406856" y="1434764"/>
+            <a:ext cx="8534400" cy="5143500"/>
+          </a:xfrm>
+          <a:prstGeom prst="rect">
+            <a:avLst/>
+          </a:prstGeom>
+        </p:spPr>
+      </p:pic>
     </p:spTree>
     <p:extLst>
       <p:ext uri="{BB962C8B-B14F-4D97-AF65-F5344CB8AC3E}">
-        <p14:creationId xmlns:p14="http://schemas.microsoft.com/office/powerpoint/2010/main" val="2667537271"/>
+        <p14:creationId xmlns:p14="http://schemas.microsoft.com/office/powerpoint/2010/main" val="3329040705"/>
       </p:ext>
     </p:extLst>
   </p:cSld>

</xml_diff>

<commit_message>
add subsystem tests to ppt
</commit_message>
<xml_diff>
--- a/Presentation1.pptx
+++ b/Presentation1.pptx
@@ -401,7 +401,7 @@
           <a:p>
             <a:fld id="{78ABE3C1-DBE1-495D-B57B-2849774B866A}" type="datetimeFigureOut">
               <a:rPr lang="en-US" dirty="0"/>
-              <a:t>3/3/20</a:t>
+              <a:t>3/3/2020</a:t>
             </a:fld>
             <a:endParaRPr lang="en-US" dirty="0"/>
           </a:p>
@@ -810,7 +810,7 @@
           <a:p>
             <a:fld id="{446C117F-5CCF-4837-BE5F-2B92066CAFAF}" type="datetimeFigureOut">
               <a:rPr lang="en-US" dirty="0"/>
-              <a:t>3/3/20</a:t>
+              <a:t>3/3/2020</a:t>
             </a:fld>
             <a:endParaRPr lang="en-US" dirty="0"/>
           </a:p>
@@ -1141,7 +1141,7 @@
           <a:p>
             <a:fld id="{84EB90BD-B6CE-46B7-997F-7313B992CCDC}" type="datetimeFigureOut">
               <a:rPr lang="en-US" dirty="0"/>
-              <a:t>3/3/20</a:t>
+              <a:t>3/3/2020</a:t>
             </a:fld>
             <a:endParaRPr lang="en-US" dirty="0"/>
           </a:p>
@@ -1541,7 +1541,7 @@
           <a:p>
             <a:fld id="{CDB9D11F-B188-461D-B23F-39381795C052}" type="datetimeFigureOut">
               <a:rPr lang="en-US" dirty="0"/>
-              <a:t>3/3/20</a:t>
+              <a:t>3/3/2020</a:t>
             </a:fld>
             <a:endParaRPr lang="en-US" dirty="0"/>
           </a:p>
@@ -2104,7 +2104,7 @@
           <a:p>
             <a:fld id="{52E6D8D9-55A2-4063-B0F3-121F44549695}" type="datetimeFigureOut">
               <a:rPr lang="en-US" dirty="0"/>
-              <a:t>3/3/20</a:t>
+              <a:t>3/3/2020</a:t>
             </a:fld>
             <a:endParaRPr lang="en-US" dirty="0"/>
           </a:p>
@@ -2780,7 +2780,7 @@
           <a:p>
             <a:fld id="{D4B24536-994D-4021-A283-9F449C0DB509}" type="datetimeFigureOut">
               <a:rPr lang="en-US" dirty="0"/>
-              <a:t>3/3/20</a:t>
+              <a:t>3/3/2020</a:t>
             </a:fld>
             <a:endParaRPr lang="en-US" dirty="0"/>
           </a:p>
@@ -3688,7 +3688,7 @@
           <a:p>
             <a:fld id="{3CBBBB78-C96F-47B7-AB17-D852CA960AC9}" type="datetimeFigureOut">
               <a:rPr lang="en-US" dirty="0"/>
-              <a:t>3/3/20</a:t>
+              <a:t>3/3/2020</a:t>
             </a:fld>
             <a:endParaRPr lang="en-US" dirty="0"/>
           </a:p>
@@ -3996,7 +3996,7 @@
           <a:p>
             <a:fld id="{1FA3F48C-C7C6-4055-9F49-3777875E72AE}" type="datetimeFigureOut">
               <a:rPr lang="en-US" dirty="0"/>
-              <a:t>3/3/20</a:t>
+              <a:t>3/3/2020</a:t>
             </a:fld>
             <a:endParaRPr lang="en-US" dirty="0"/>
           </a:p>
@@ -4255,7 +4255,7 @@
           <a:p>
             <a:fld id="{6178E61D-D431-422C-9764-11DAFE33AB63}" type="datetimeFigureOut">
               <a:rPr lang="en-US" dirty="0"/>
-              <a:t>3/3/20</a:t>
+              <a:t>3/3/2020</a:t>
             </a:fld>
             <a:endParaRPr lang="en-US" dirty="0"/>
           </a:p>
@@ -4574,7 +4574,7 @@
           <a:p>
             <a:fld id="{12DE42F4-6EEF-4EF7-8ED4-2208F0F89A08}" type="datetimeFigureOut">
               <a:rPr lang="en-US" dirty="0"/>
-              <a:t>3/3/20</a:t>
+              <a:t>3/3/2020</a:t>
             </a:fld>
             <a:endParaRPr lang="en-US" dirty="0"/>
           </a:p>
@@ -4958,7 +4958,7 @@
           <a:p>
             <a:fld id="{30578ACC-22D6-47C1-A373-4FD133E34F3C}" type="datetimeFigureOut">
               <a:rPr lang="en-US" dirty="0"/>
-              <a:t>3/3/20</a:t>
+              <a:t>3/3/2020</a:t>
             </a:fld>
             <a:endParaRPr lang="en-US" dirty="0"/>
           </a:p>
@@ -5329,7 +5329,7 @@
           <a:p>
             <a:fld id="{4E5A6C69-6797-4E8A-BF37-F2C3751466E9}" type="datetimeFigureOut">
               <a:rPr lang="en-US" dirty="0"/>
-              <a:t>3/3/20</a:t>
+              <a:t>3/3/2020</a:t>
             </a:fld>
             <a:endParaRPr lang="en-US" dirty="0"/>
           </a:p>
@@ -5830,7 +5830,7 @@
           <a:p>
             <a:fld id="{D82014A1-A632-4878-A0D3-F52BA7563730}" type="datetimeFigureOut">
               <a:rPr lang="en-US" dirty="0"/>
-              <a:t>3/3/20</a:t>
+              <a:t>3/3/2020</a:t>
             </a:fld>
             <a:endParaRPr lang="en-US" dirty="0"/>
           </a:p>
@@ -6082,7 +6082,7 @@
           <a:p>
             <a:fld id="{CE99F462-093F-4566-844B-4C71F2739DA5}" type="datetimeFigureOut">
               <a:rPr lang="en-US" dirty="0"/>
-              <a:t>3/3/20</a:t>
+              <a:t>3/3/2020</a:t>
             </a:fld>
             <a:endParaRPr lang="en-US" dirty="0"/>
           </a:p>
@@ -6240,7 +6240,7 @@
           <a:p>
             <a:fld id="{3D24A7AC-904D-4781-85BA-7D10C17ED021}" type="datetimeFigureOut">
               <a:rPr lang="en-US" dirty="0"/>
-              <a:t>3/3/20</a:t>
+              <a:t>3/3/2020</a:t>
             </a:fld>
             <a:endParaRPr lang="en-US" dirty="0"/>
           </a:p>
@@ -6625,7 +6625,7 @@
           <a:p>
             <a:fld id="{E331444B-B92B-4E27-8C94-BB93EAF5CB18}" type="datetimeFigureOut">
               <a:rPr lang="en-US" dirty="0"/>
-              <a:t>3/3/20</a:t>
+              <a:t>3/3/2020</a:t>
             </a:fld>
             <a:endParaRPr lang="en-US" dirty="0"/>
           </a:p>
@@ -7029,7 +7029,7 @@
           <a:p>
             <a:fld id="{363EFA5E-FA76-400D-B3DC-F0BA90E6D107}" type="datetimeFigureOut">
               <a:rPr lang="en-US" dirty="0"/>
-              <a:t>3/3/20</a:t>
+              <a:t>3/3/2020</a:t>
             </a:fld>
             <a:endParaRPr lang="en-US" dirty="0"/>
           </a:p>
@@ -7268,7 +7268,7 @@
           <a:p>
             <a:fld id="{9D6E9DEC-419B-4CC5-A080-3B06BD5A8291}" type="datetimeFigureOut">
               <a:rPr lang="en-US" dirty="0"/>
-              <a:t>3/3/20</a:t>
+              <a:t>3/3/2020</a:t>
             </a:fld>
             <a:endParaRPr lang="en-US" dirty="0"/>
           </a:p>
@@ -8734,31 +8734,871 @@
           </a:p>
         </p:txBody>
       </p:sp>
-      <p:sp>
-        <p:nvSpPr>
-          <p:cNvPr id="3" name="Content Placeholder 2">
+      <p:graphicFrame>
+        <p:nvGraphicFramePr>
+          <p:cNvPr id="4" name="Content Placeholder 3">
             <a:extLst>
               <a:ext uri="{FF2B5EF4-FFF2-40B4-BE49-F238E27FC236}">
-                <a16:creationId xmlns:a16="http://schemas.microsoft.com/office/drawing/2014/main" id="{A4770D8C-886E-CC42-9A2F-25290EA19401}"/>
+                <a16:creationId xmlns:a16="http://schemas.microsoft.com/office/drawing/2014/main" id="{059FA50A-D129-42E9-92CB-DB0D9AFF8CA1}"/>
               </a:ext>
             </a:extLst>
           </p:cNvPr>
-          <p:cNvSpPr>
-            <a:spLocks noGrp="1"/>
-          </p:cNvSpPr>
+          <p:cNvGraphicFramePr>
+            <a:graphicFrameLocks noGrp="1"/>
+          </p:cNvGraphicFramePr>
           <p:nvPr>
             <p:ph idx="1"/>
+            <p:extLst>
+              <p:ext uri="{D42A27DB-BD31-4B8C-83A1-F6EECF244321}">
+                <p14:modId xmlns:p14="http://schemas.microsoft.com/office/powerpoint/2010/main" val="2163516687"/>
+              </p:ext>
+            </p:extLst>
           </p:nvPr>
-        </p:nvSpPr>
-        <p:spPr/>
-        <p:txBody>
-          <a:bodyPr/>
-          <a:lstStyle/>
-          <a:p>
-            <a:endParaRPr lang="en-US" dirty="0"/>
-          </a:p>
-        </p:txBody>
-      </p:sp>
+        </p:nvGraphicFramePr>
+        <p:xfrm>
+          <a:off x="530942" y="2336801"/>
+          <a:ext cx="10805652" cy="4372878"/>
+        </p:xfrm>
+        <a:graphic>
+          <a:graphicData uri="http://schemas.openxmlformats.org/drawingml/2006/table">
+            <a:tbl>
+              <a:tblPr firstRow="1" firstCol="1" bandRow="1">
+                <a:tableStyleId>{5C22544A-7EE6-4342-B048-85BDC9FD1C3A}</a:tableStyleId>
+              </a:tblPr>
+              <a:tblGrid>
+                <a:gridCol w="1560676">
+                  <a:extLst>
+                    <a:ext uri="{9D8B030D-6E8A-4147-A177-3AD203B41FA5}">
+                      <a16:colId xmlns:a16="http://schemas.microsoft.com/office/drawing/2014/main" val="2898484819"/>
+                    </a:ext>
+                  </a:extLst>
+                </a:gridCol>
+                <a:gridCol w="3679917">
+                  <a:extLst>
+                    <a:ext uri="{9D8B030D-6E8A-4147-A177-3AD203B41FA5}">
+                      <a16:colId xmlns:a16="http://schemas.microsoft.com/office/drawing/2014/main" val="465313352"/>
+                    </a:ext>
+                  </a:extLst>
+                </a:gridCol>
+                <a:gridCol w="5565059">
+                  <a:extLst>
+                    <a:ext uri="{9D8B030D-6E8A-4147-A177-3AD203B41FA5}">
+                      <a16:colId xmlns:a16="http://schemas.microsoft.com/office/drawing/2014/main" val="1838571880"/>
+                    </a:ext>
+                  </a:extLst>
+                </a:gridCol>
+              </a:tblGrid>
+              <a:tr h="194541">
+                <a:tc>
+                  <a:txBody>
+                    <a:bodyPr/>
+                    <a:lstStyle/>
+                    <a:p>
+                      <a:pPr marL="0" marR="0" algn="l">
+                        <a:lnSpc>
+                          <a:spcPct val="107000"/>
+                        </a:lnSpc>
+                        <a:spcBef>
+                          <a:spcPts val="0"/>
+                        </a:spcBef>
+                        <a:spcAft>
+                          <a:spcPts val="0"/>
+                        </a:spcAft>
+                      </a:pPr>
+                      <a:r>
+                        <a:rPr lang="en-US" sz="1400">
+                          <a:effectLst/>
+                        </a:rPr>
+                        <a:t>Test Case ID</a:t>
+                      </a:r>
+                      <a:endParaRPr lang="en-US" sz="1400">
+                        <a:effectLst/>
+                        <a:latin typeface="Times New Roman" panose="02020603050405020304" pitchFamily="18" charset="0"/>
+                        <a:ea typeface="Calibri" panose="020F0502020204030204" pitchFamily="34" charset="0"/>
+                        <a:cs typeface="Times New Roman" panose="02020603050405020304" pitchFamily="18" charset="0"/>
+                      </a:endParaRPr>
+                    </a:p>
+                  </a:txBody>
+                  <a:tcPr marL="18194" marR="18194" marT="0" marB="0" anchor="ctr"/>
+                </a:tc>
+                <a:tc gridSpan="2">
+                  <a:txBody>
+                    <a:bodyPr/>
+                    <a:lstStyle/>
+                    <a:p>
+                      <a:pPr marL="0" marR="0" algn="l">
+                        <a:lnSpc>
+                          <a:spcPct val="107000"/>
+                        </a:lnSpc>
+                        <a:spcBef>
+                          <a:spcPts val="0"/>
+                        </a:spcBef>
+                        <a:spcAft>
+                          <a:spcPts val="0"/>
+                        </a:spcAft>
+                      </a:pPr>
+                      <a:r>
+                        <a:rPr lang="en-US" sz="1400">
+                          <a:effectLst/>
+                        </a:rPr>
+                        <a:t>SubSystem-PMS-TimeSheetTest</a:t>
+                      </a:r>
+                      <a:endParaRPr lang="en-US" sz="1400">
+                        <a:effectLst/>
+                        <a:latin typeface="Times New Roman" panose="02020603050405020304" pitchFamily="18" charset="0"/>
+                        <a:ea typeface="Calibri" panose="020F0502020204030204" pitchFamily="34" charset="0"/>
+                        <a:cs typeface="Times New Roman" panose="02020603050405020304" pitchFamily="18" charset="0"/>
+                      </a:endParaRPr>
+                    </a:p>
+                  </a:txBody>
+                  <a:tcPr marL="18194" marR="18194" marT="0" marB="0" anchor="ctr"/>
+                </a:tc>
+                <a:tc hMerge="1">
+                  <a:txBody>
+                    <a:bodyPr/>
+                    <a:lstStyle/>
+                    <a:p>
+                      <a:endParaRPr lang="en-US"/>
+                    </a:p>
+                  </a:txBody>
+                  <a:tcPr/>
+                </a:tc>
+                <a:extLst>
+                  <a:ext uri="{0D108BD9-81ED-4DB2-BD59-A6C34878D82A}">
+                    <a16:rowId xmlns:a16="http://schemas.microsoft.com/office/drawing/2014/main" val="575546725"/>
+                  </a:ext>
+                </a:extLst>
+              </a:tr>
+              <a:tr h="403246">
+                <a:tc>
+                  <a:txBody>
+                    <a:bodyPr/>
+                    <a:lstStyle/>
+                    <a:p>
+                      <a:pPr marL="0" marR="0" algn="l">
+                        <a:lnSpc>
+                          <a:spcPct val="107000"/>
+                        </a:lnSpc>
+                        <a:spcBef>
+                          <a:spcPts val="0"/>
+                        </a:spcBef>
+                        <a:spcAft>
+                          <a:spcPts val="0"/>
+                        </a:spcAft>
+                      </a:pPr>
+                      <a:r>
+                        <a:rPr lang="en-US" sz="1400">
+                          <a:effectLst/>
+                        </a:rPr>
+                        <a:t>Purpose</a:t>
+                      </a:r>
+                      <a:endParaRPr lang="en-US" sz="1400">
+                        <a:effectLst/>
+                        <a:latin typeface="Times New Roman" panose="02020603050405020304" pitchFamily="18" charset="0"/>
+                        <a:ea typeface="Calibri" panose="020F0502020204030204" pitchFamily="34" charset="0"/>
+                        <a:cs typeface="Times New Roman" panose="02020603050405020304" pitchFamily="18" charset="0"/>
+                      </a:endParaRPr>
+                    </a:p>
+                  </a:txBody>
+                  <a:tcPr marL="18194" marR="18194" marT="0" marB="0" anchor="ctr"/>
+                </a:tc>
+                <a:tc gridSpan="2">
+                  <a:txBody>
+                    <a:bodyPr/>
+                    <a:lstStyle/>
+                    <a:p>
+                      <a:pPr marL="0" marR="0" algn="l">
+                        <a:lnSpc>
+                          <a:spcPct val="107000"/>
+                        </a:lnSpc>
+                        <a:spcBef>
+                          <a:spcPts val="0"/>
+                        </a:spcBef>
+                        <a:spcAft>
+                          <a:spcPts val="0"/>
+                        </a:spcAft>
+                      </a:pPr>
+                      <a:r>
+                        <a:rPr lang="en-US" sz="1400">
+                          <a:effectLst/>
+                        </a:rPr>
+                        <a:t>Test the interactions between multiple time sheet methods (add time sheet, update time sheet, get approved time sheets, etc)</a:t>
+                      </a:r>
+                      <a:endParaRPr lang="en-US" sz="1400">
+                        <a:effectLst/>
+                        <a:latin typeface="Times New Roman" panose="02020603050405020304" pitchFamily="18" charset="0"/>
+                        <a:ea typeface="Calibri" panose="020F0502020204030204" pitchFamily="34" charset="0"/>
+                        <a:cs typeface="Times New Roman" panose="02020603050405020304" pitchFamily="18" charset="0"/>
+                      </a:endParaRPr>
+                    </a:p>
+                  </a:txBody>
+                  <a:tcPr marL="18194" marR="18194" marT="0" marB="0" anchor="ctr"/>
+                </a:tc>
+                <a:tc hMerge="1">
+                  <a:txBody>
+                    <a:bodyPr/>
+                    <a:lstStyle/>
+                    <a:p>
+                      <a:endParaRPr lang="en-US"/>
+                    </a:p>
+                  </a:txBody>
+                  <a:tcPr/>
+                </a:tc>
+                <a:extLst>
+                  <a:ext uri="{0D108BD9-81ED-4DB2-BD59-A6C34878D82A}">
+                    <a16:rowId xmlns:a16="http://schemas.microsoft.com/office/drawing/2014/main" val="1043342057"/>
+                  </a:ext>
+                </a:extLst>
+              </a:tr>
+              <a:tr h="194541">
+                <a:tc>
+                  <a:txBody>
+                    <a:bodyPr/>
+                    <a:lstStyle/>
+                    <a:p>
+                      <a:pPr marL="0" marR="0" algn="l">
+                        <a:lnSpc>
+                          <a:spcPct val="107000"/>
+                        </a:lnSpc>
+                        <a:spcBef>
+                          <a:spcPts val="0"/>
+                        </a:spcBef>
+                        <a:spcAft>
+                          <a:spcPts val="0"/>
+                        </a:spcAft>
+                      </a:pPr>
+                      <a:r>
+                        <a:rPr lang="en-US" sz="1400">
+                          <a:effectLst/>
+                        </a:rPr>
+                        <a:t>Test Set Up</a:t>
+                      </a:r>
+                      <a:endParaRPr lang="en-US" sz="1400">
+                        <a:effectLst/>
+                        <a:latin typeface="Times New Roman" panose="02020603050405020304" pitchFamily="18" charset="0"/>
+                        <a:ea typeface="Calibri" panose="020F0502020204030204" pitchFamily="34" charset="0"/>
+                        <a:cs typeface="Times New Roman" panose="02020603050405020304" pitchFamily="18" charset="0"/>
+                      </a:endParaRPr>
+                    </a:p>
+                  </a:txBody>
+                  <a:tcPr marL="18194" marR="18194" marT="0" marB="0" anchor="ctr"/>
+                </a:tc>
+                <a:tc gridSpan="2">
+                  <a:txBody>
+                    <a:bodyPr/>
+                    <a:lstStyle/>
+                    <a:p>
+                      <a:pPr marL="0" marR="0" algn="l">
+                        <a:lnSpc>
+                          <a:spcPct val="107000"/>
+                        </a:lnSpc>
+                        <a:spcBef>
+                          <a:spcPts val="0"/>
+                        </a:spcBef>
+                        <a:spcAft>
+                          <a:spcPts val="0"/>
+                        </a:spcAft>
+                      </a:pPr>
+                      <a:r>
+                        <a:rPr lang="en-US" sz="1400">
+                          <a:effectLst/>
+                        </a:rPr>
+                        <a:t>Data base found in section 3.1.2</a:t>
+                      </a:r>
+                      <a:endParaRPr lang="en-US" sz="1400">
+                        <a:effectLst/>
+                        <a:latin typeface="Times New Roman" panose="02020603050405020304" pitchFamily="18" charset="0"/>
+                        <a:ea typeface="Calibri" panose="020F0502020204030204" pitchFamily="34" charset="0"/>
+                        <a:cs typeface="Times New Roman" panose="02020603050405020304" pitchFamily="18" charset="0"/>
+                      </a:endParaRPr>
+                    </a:p>
+                  </a:txBody>
+                  <a:tcPr marL="18194" marR="18194" marT="0" marB="0" anchor="ctr"/>
+                </a:tc>
+                <a:tc hMerge="1">
+                  <a:txBody>
+                    <a:bodyPr/>
+                    <a:lstStyle/>
+                    <a:p>
+                      <a:endParaRPr lang="en-US"/>
+                    </a:p>
+                  </a:txBody>
+                  <a:tcPr/>
+                </a:tc>
+                <a:extLst>
+                  <a:ext uri="{0D108BD9-81ED-4DB2-BD59-A6C34878D82A}">
+                    <a16:rowId xmlns:a16="http://schemas.microsoft.com/office/drawing/2014/main" val="3622683587"/>
+                  </a:ext>
+                </a:extLst>
+              </a:tr>
+              <a:tr h="194541">
+                <a:tc gridSpan="2">
+                  <a:txBody>
+                    <a:bodyPr/>
+                    <a:lstStyle/>
+                    <a:p>
+                      <a:pPr marL="0" marR="0" algn="ctr">
+                        <a:lnSpc>
+                          <a:spcPct val="107000"/>
+                        </a:lnSpc>
+                        <a:spcBef>
+                          <a:spcPts val="0"/>
+                        </a:spcBef>
+                        <a:spcAft>
+                          <a:spcPts val="0"/>
+                        </a:spcAft>
+                      </a:pPr>
+                      <a:r>
+                        <a:rPr lang="en-US" sz="1100">
+                          <a:effectLst/>
+                        </a:rPr>
+                        <a:t>Input</a:t>
+                      </a:r>
+                      <a:endParaRPr lang="en-US" sz="1100">
+                        <a:effectLst/>
+                        <a:latin typeface="Times New Roman" panose="02020603050405020304" pitchFamily="18" charset="0"/>
+                        <a:ea typeface="Calibri" panose="020F0502020204030204" pitchFamily="34" charset="0"/>
+                        <a:cs typeface="Times New Roman" panose="02020603050405020304" pitchFamily="18" charset="0"/>
+                      </a:endParaRPr>
+                    </a:p>
+                  </a:txBody>
+                  <a:tcPr marL="18194" marR="18194" marT="0" marB="0" anchor="ctr"/>
+                </a:tc>
+                <a:tc hMerge="1">
+                  <a:txBody>
+                    <a:bodyPr/>
+                    <a:lstStyle/>
+                    <a:p>
+                      <a:endParaRPr lang="en-US"/>
+                    </a:p>
+                  </a:txBody>
+                  <a:tcPr/>
+                </a:tc>
+                <a:tc>
+                  <a:txBody>
+                    <a:bodyPr/>
+                    <a:lstStyle/>
+                    <a:p>
+                      <a:pPr marL="0" marR="0" algn="ctr">
+                        <a:lnSpc>
+                          <a:spcPct val="107000"/>
+                        </a:lnSpc>
+                        <a:spcBef>
+                          <a:spcPts val="0"/>
+                        </a:spcBef>
+                        <a:spcAft>
+                          <a:spcPts val="0"/>
+                        </a:spcAft>
+                      </a:pPr>
+                      <a:r>
+                        <a:rPr lang="en-US" sz="1400">
+                          <a:effectLst/>
+                        </a:rPr>
+                        <a:t>Output</a:t>
+                      </a:r>
+                      <a:endParaRPr lang="en-US" sz="1400">
+                        <a:effectLst/>
+                        <a:latin typeface="Times New Roman" panose="02020603050405020304" pitchFamily="18" charset="0"/>
+                        <a:ea typeface="Calibri" panose="020F0502020204030204" pitchFamily="34" charset="0"/>
+                        <a:cs typeface="Times New Roman" panose="02020603050405020304" pitchFamily="18" charset="0"/>
+                      </a:endParaRPr>
+                    </a:p>
+                  </a:txBody>
+                  <a:tcPr marL="18194" marR="18194" marT="0" marB="0" anchor="ctr"/>
+                </a:tc>
+                <a:extLst>
+                  <a:ext uri="{0D108BD9-81ED-4DB2-BD59-A6C34878D82A}">
+                    <a16:rowId xmlns:a16="http://schemas.microsoft.com/office/drawing/2014/main" val="1409179028"/>
+                  </a:ext>
+                </a:extLst>
+              </a:tr>
+              <a:tr h="3293440">
+                <a:tc gridSpan="2">
+                  <a:txBody>
+                    <a:bodyPr/>
+                    <a:lstStyle/>
+                    <a:p>
+                      <a:pPr marL="0" marR="0" algn="l">
+                        <a:lnSpc>
+                          <a:spcPct val="107000"/>
+                        </a:lnSpc>
+                        <a:spcBef>
+                          <a:spcPts val="0"/>
+                        </a:spcBef>
+                        <a:spcAft>
+                          <a:spcPts val="0"/>
+                        </a:spcAft>
+                      </a:pPr>
+                      <a:r>
+                        <a:rPr lang="en-US" sz="1100" dirty="0" err="1">
+                          <a:effectLst/>
+                        </a:rPr>
+                        <a:t>TimeSheetaddTimeSheet</a:t>
+                      </a:r>
+                      <a:r>
+                        <a:rPr lang="en-US" sz="1100" dirty="0">
+                          <a:effectLst/>
+                        </a:rPr>
+                        <a:t>("1", "1", "Monday", "2020-03-02", "09:00:00", "12:00:00", "13:00:00", "17:00:00")</a:t>
+                      </a:r>
+                    </a:p>
+                    <a:p>
+                      <a:pPr marL="0" marR="0" algn="l">
+                        <a:lnSpc>
+                          <a:spcPct val="107000"/>
+                        </a:lnSpc>
+                        <a:spcBef>
+                          <a:spcPts val="0"/>
+                        </a:spcBef>
+                        <a:spcAft>
+                          <a:spcPts val="0"/>
+                        </a:spcAft>
+                      </a:pPr>
+                      <a:r>
+                        <a:rPr lang="en-US" sz="1100" dirty="0" err="1">
+                          <a:effectLst/>
+                        </a:rPr>
+                        <a:t>TimeSheetupdateTimeSheet</a:t>
+                      </a:r>
+                      <a:r>
+                        <a:rPr lang="en-US" sz="1100" dirty="0">
+                          <a:effectLst/>
+                        </a:rPr>
+                        <a:t>("1","10:00:00","12:00:00","13:00:00","22:00:00", "11")</a:t>
+                      </a:r>
+                    </a:p>
+                    <a:p>
+                      <a:pPr marL="0" marR="0" algn="l">
+                        <a:lnSpc>
+                          <a:spcPct val="107000"/>
+                        </a:lnSpc>
+                        <a:spcBef>
+                          <a:spcPts val="0"/>
+                        </a:spcBef>
+                        <a:spcAft>
+                          <a:spcPts val="0"/>
+                        </a:spcAft>
+                      </a:pPr>
+                      <a:r>
+                        <a:rPr lang="en-US" sz="1100" dirty="0" err="1">
+                          <a:effectLst/>
+                        </a:rPr>
+                        <a:t>TimeSheetsubmitTimeSheet</a:t>
+                      </a:r>
+                      <a:r>
+                        <a:rPr lang="en-US" sz="1100" dirty="0">
+                          <a:effectLst/>
+                        </a:rPr>
+                        <a:t>(“1”)</a:t>
+                      </a:r>
+                    </a:p>
+                    <a:p>
+                      <a:pPr marL="0" marR="0" algn="l">
+                        <a:lnSpc>
+                          <a:spcPct val="107000"/>
+                        </a:lnSpc>
+                        <a:spcBef>
+                          <a:spcPts val="0"/>
+                        </a:spcBef>
+                        <a:spcAft>
+                          <a:spcPts val="0"/>
+                        </a:spcAft>
+                      </a:pPr>
+                      <a:r>
+                        <a:rPr lang="en-US" sz="1100" dirty="0" err="1">
+                          <a:effectLst/>
+                        </a:rPr>
+                        <a:t>TimeSheetgetEmpTimeSheetNotApproved</a:t>
+                      </a:r>
+                      <a:r>
+                        <a:rPr lang="en-US" sz="1100" dirty="0">
+                          <a:effectLst/>
+                        </a:rPr>
+                        <a:t>(“1”)</a:t>
+                      </a:r>
+                    </a:p>
+                    <a:p>
+                      <a:pPr marL="0" marR="0" algn="l">
+                        <a:lnSpc>
+                          <a:spcPct val="107000"/>
+                        </a:lnSpc>
+                        <a:spcBef>
+                          <a:spcPts val="0"/>
+                        </a:spcBef>
+                        <a:spcAft>
+                          <a:spcPts val="0"/>
+                        </a:spcAft>
+                      </a:pPr>
+                      <a:endParaRPr lang="en-US" sz="1100" dirty="0">
+                        <a:effectLst/>
+                      </a:endParaRPr>
+                    </a:p>
+                    <a:p>
+                      <a:pPr marL="0" marR="0" algn="l">
+                        <a:lnSpc>
+                          <a:spcPct val="107000"/>
+                        </a:lnSpc>
+                        <a:spcBef>
+                          <a:spcPts val="0"/>
+                        </a:spcBef>
+                        <a:spcAft>
+                          <a:spcPts val="0"/>
+                        </a:spcAft>
+                      </a:pPr>
+                      <a:r>
+                        <a:rPr lang="en-US" sz="1100" dirty="0" err="1">
+                          <a:effectLst/>
+                        </a:rPr>
+                        <a:t>TimeSheetaddTimeSheet</a:t>
+                      </a:r>
+                      <a:r>
+                        <a:rPr lang="en-US" sz="1100" dirty="0">
+                          <a:effectLst/>
+                        </a:rPr>
+                        <a:t>("4", "4", "Monday", "2020-03-02", "09:00:00", "12:00:00", "13:00:00", "17:00:00")</a:t>
+                      </a:r>
+                    </a:p>
+                    <a:p>
+                      <a:pPr marL="0" marR="0" algn="l">
+                        <a:lnSpc>
+                          <a:spcPct val="107000"/>
+                        </a:lnSpc>
+                        <a:spcBef>
+                          <a:spcPts val="0"/>
+                        </a:spcBef>
+                        <a:spcAft>
+                          <a:spcPts val="0"/>
+                        </a:spcAft>
+                      </a:pPr>
+                      <a:r>
+                        <a:rPr lang="en-US" sz="1100" dirty="0" err="1">
+                          <a:effectLst/>
+                        </a:rPr>
+                        <a:t>TimeSheetaddTimeSheet</a:t>
+                      </a:r>
+                      <a:r>
+                        <a:rPr lang="en-US" sz="1100" dirty="0">
+                          <a:effectLst/>
+                        </a:rPr>
+                        <a:t>("5", "5", "Monday", "2020-03-02", "09:00:00", "12:00:00", "13:00:00", "17:00:00")</a:t>
+                      </a:r>
+                    </a:p>
+                    <a:p>
+                      <a:pPr marL="0" marR="0" algn="l">
+                        <a:lnSpc>
+                          <a:spcPct val="107000"/>
+                        </a:lnSpc>
+                        <a:spcBef>
+                          <a:spcPts val="0"/>
+                        </a:spcBef>
+                        <a:spcAft>
+                          <a:spcPts val="0"/>
+                        </a:spcAft>
+                      </a:pPr>
+                      <a:r>
+                        <a:rPr lang="en-US" sz="1100" dirty="0" err="1">
+                          <a:effectLst/>
+                        </a:rPr>
+                        <a:t>TimeSheetsubmitTimeSheet</a:t>
+                      </a:r>
+                      <a:r>
+                        <a:rPr lang="en-US" sz="1100" dirty="0">
+                          <a:effectLst/>
+                        </a:rPr>
+                        <a:t>(“4”)</a:t>
+                      </a:r>
+                    </a:p>
+                    <a:p>
+                      <a:pPr marL="0" marR="0" algn="l">
+                        <a:lnSpc>
+                          <a:spcPct val="107000"/>
+                        </a:lnSpc>
+                        <a:spcBef>
+                          <a:spcPts val="0"/>
+                        </a:spcBef>
+                        <a:spcAft>
+                          <a:spcPts val="0"/>
+                        </a:spcAft>
+                      </a:pPr>
+                      <a:r>
+                        <a:rPr lang="en-US" sz="1100" dirty="0" err="1">
+                          <a:effectLst/>
+                        </a:rPr>
+                        <a:t>TimeSheetsubmitTimeSheet</a:t>
+                      </a:r>
+                      <a:r>
+                        <a:rPr lang="en-US" sz="1100" dirty="0">
+                          <a:effectLst/>
+                        </a:rPr>
+                        <a:t>(“5”)</a:t>
+                      </a:r>
+                    </a:p>
+                    <a:p>
+                      <a:pPr marL="0" marR="0" algn="l">
+                        <a:lnSpc>
+                          <a:spcPct val="107000"/>
+                        </a:lnSpc>
+                        <a:spcBef>
+                          <a:spcPts val="0"/>
+                        </a:spcBef>
+                        <a:spcAft>
+                          <a:spcPts val="0"/>
+                        </a:spcAft>
+                      </a:pPr>
+                      <a:r>
+                        <a:rPr lang="en-US" sz="1100" dirty="0" err="1">
+                          <a:effectLst/>
+                        </a:rPr>
+                        <a:t>TimeSheetgetTimeSheetNotApproved</a:t>
+                      </a:r>
+                      <a:r>
+                        <a:rPr lang="en-US" sz="1100" dirty="0">
+                          <a:effectLst/>
+                        </a:rPr>
+                        <a:t>()</a:t>
+                      </a:r>
+                    </a:p>
+                    <a:p>
+                      <a:pPr marL="0" marR="0" algn="l">
+                        <a:lnSpc>
+                          <a:spcPct val="107000"/>
+                        </a:lnSpc>
+                        <a:spcBef>
+                          <a:spcPts val="0"/>
+                        </a:spcBef>
+                        <a:spcAft>
+                          <a:spcPts val="0"/>
+                        </a:spcAft>
+                      </a:pPr>
+                      <a:r>
+                        <a:rPr lang="en-US" sz="1100" dirty="0">
+                          <a:effectLst/>
+                        </a:rPr>
+                        <a:t> </a:t>
+                      </a:r>
+                    </a:p>
+                    <a:p>
+                      <a:pPr marL="0" marR="0" algn="l">
+                        <a:lnSpc>
+                          <a:spcPct val="107000"/>
+                        </a:lnSpc>
+                        <a:spcBef>
+                          <a:spcPts val="0"/>
+                        </a:spcBef>
+                        <a:spcAft>
+                          <a:spcPts val="0"/>
+                        </a:spcAft>
+                      </a:pPr>
+                      <a:r>
+                        <a:rPr lang="en-US" sz="1100" dirty="0" err="1">
+                          <a:effectLst/>
+                        </a:rPr>
+                        <a:t>TimeSheetgetTimeSheetApproved</a:t>
+                      </a:r>
+                      <a:r>
+                        <a:rPr lang="en-US" sz="1100" dirty="0">
+                          <a:effectLst/>
+                        </a:rPr>
+                        <a:t>(“1”)</a:t>
+                      </a:r>
+                    </a:p>
+                    <a:p>
+                      <a:pPr marL="0" marR="0" algn="l">
+                        <a:lnSpc>
+                          <a:spcPct val="107000"/>
+                        </a:lnSpc>
+                        <a:spcBef>
+                          <a:spcPts val="0"/>
+                        </a:spcBef>
+                        <a:spcAft>
+                          <a:spcPts val="0"/>
+                        </a:spcAft>
+                      </a:pPr>
+                      <a:r>
+                        <a:rPr lang="en-US" sz="1100" dirty="0">
+                          <a:effectLst/>
+                        </a:rPr>
+                        <a:t> </a:t>
+                      </a:r>
+                    </a:p>
+                    <a:p>
+                      <a:pPr marL="0" marR="0" algn="l">
+                        <a:lnSpc>
+                          <a:spcPct val="107000"/>
+                        </a:lnSpc>
+                        <a:spcBef>
+                          <a:spcPts val="0"/>
+                        </a:spcBef>
+                        <a:spcAft>
+                          <a:spcPts val="0"/>
+                        </a:spcAft>
+                      </a:pPr>
+                      <a:r>
+                        <a:rPr lang="en-US" sz="1100" dirty="0" err="1">
+                          <a:effectLst/>
+                        </a:rPr>
+                        <a:t>TimeSheetGetTimeSheetApprovedEmpIds</a:t>
+                      </a:r>
+                      <a:r>
+                        <a:rPr lang="en-US" sz="1100" dirty="0">
+                          <a:effectLst/>
+                        </a:rPr>
+                        <a:t>()</a:t>
+                      </a:r>
+                      <a:endParaRPr lang="en-US" sz="1100" dirty="0">
+                        <a:effectLst/>
+                        <a:latin typeface="Times New Roman" panose="02020603050405020304" pitchFamily="18" charset="0"/>
+                        <a:ea typeface="Calibri" panose="020F0502020204030204" pitchFamily="34" charset="0"/>
+                        <a:cs typeface="Times New Roman" panose="02020603050405020304" pitchFamily="18" charset="0"/>
+                      </a:endParaRPr>
+                    </a:p>
+                  </a:txBody>
+                  <a:tcPr marL="18194" marR="18194" marT="0" marB="0" anchor="ctr"/>
+                </a:tc>
+                <a:tc hMerge="1">
+                  <a:txBody>
+                    <a:bodyPr/>
+                    <a:lstStyle/>
+                    <a:p>
+                      <a:endParaRPr lang="en-US"/>
+                    </a:p>
+                  </a:txBody>
+                  <a:tcPr/>
+                </a:tc>
+                <a:tc>
+                  <a:txBody>
+                    <a:bodyPr/>
+                    <a:lstStyle/>
+                    <a:p>
+                      <a:pPr marL="0" marR="0" algn="l">
+                        <a:lnSpc>
+                          <a:spcPct val="107000"/>
+                        </a:lnSpc>
+                        <a:spcBef>
+                          <a:spcPts val="0"/>
+                        </a:spcBef>
+                        <a:spcAft>
+                          <a:spcPts val="0"/>
+                        </a:spcAft>
+                      </a:pPr>
+                      <a:r>
+                        <a:rPr lang="en-US" sz="1400" dirty="0">
+                          <a:effectLst/>
+                        </a:rPr>
+                        <a:t>Add a time sheet to Emp “1”, update that time sheet then submit it. Return 3 Not Approved timesheets for Emp “1” (2 from DB and the 1 just added)</a:t>
+                      </a:r>
+                    </a:p>
+                    <a:p>
+                      <a:pPr marL="0" marR="0" algn="l">
+                        <a:lnSpc>
+                          <a:spcPct val="107000"/>
+                        </a:lnSpc>
+                        <a:spcBef>
+                          <a:spcPts val="0"/>
+                        </a:spcBef>
+                        <a:spcAft>
+                          <a:spcPts val="0"/>
+                        </a:spcAft>
+                      </a:pPr>
+                      <a:r>
+                        <a:rPr lang="en-US" sz="1400" dirty="0">
+                          <a:effectLst/>
+                        </a:rPr>
+                        <a:t> </a:t>
+                      </a:r>
+                    </a:p>
+                    <a:p>
+                      <a:pPr marL="0" marR="0" algn="l">
+                        <a:lnSpc>
+                          <a:spcPct val="107000"/>
+                        </a:lnSpc>
+                        <a:spcBef>
+                          <a:spcPts val="0"/>
+                        </a:spcBef>
+                        <a:spcAft>
+                          <a:spcPts val="0"/>
+                        </a:spcAft>
+                      </a:pPr>
+                      <a:r>
+                        <a:rPr lang="en-US" sz="1400" dirty="0">
+                          <a:effectLst/>
+                        </a:rPr>
+                        <a:t>Add two dummy timesheets for Emp “4” and “5”. Return 5 Not Approved timesheets for all Emps (3 from Emp 1 and 2 from Emp 4 and 5)</a:t>
+                      </a:r>
+                    </a:p>
+                    <a:p>
+                      <a:pPr marL="0" marR="0" algn="l">
+                        <a:lnSpc>
+                          <a:spcPct val="107000"/>
+                        </a:lnSpc>
+                        <a:spcBef>
+                          <a:spcPts val="0"/>
+                        </a:spcBef>
+                        <a:spcAft>
+                          <a:spcPts val="0"/>
+                        </a:spcAft>
+                      </a:pPr>
+                      <a:endParaRPr lang="en-US" sz="1400" dirty="0">
+                        <a:effectLst/>
+                      </a:endParaRPr>
+                    </a:p>
+                    <a:p>
+                      <a:pPr marL="0" marR="0" algn="l">
+                        <a:lnSpc>
+                          <a:spcPct val="107000"/>
+                        </a:lnSpc>
+                        <a:spcBef>
+                          <a:spcPts val="0"/>
+                        </a:spcBef>
+                        <a:spcAft>
+                          <a:spcPts val="0"/>
+                        </a:spcAft>
+                      </a:pPr>
+                      <a:r>
+                        <a:rPr lang="en-US" sz="1400" dirty="0">
+                          <a:effectLst/>
+                        </a:rPr>
+                        <a:t>Return 3 Approved time sheets from Emp 1 (found in setup DB)</a:t>
+                      </a:r>
+                    </a:p>
+                    <a:p>
+                      <a:pPr marL="0" marR="0" algn="l">
+                        <a:lnSpc>
+                          <a:spcPct val="107000"/>
+                        </a:lnSpc>
+                        <a:spcBef>
+                          <a:spcPts val="0"/>
+                        </a:spcBef>
+                        <a:spcAft>
+                          <a:spcPts val="0"/>
+                        </a:spcAft>
+                      </a:pPr>
+                      <a:r>
+                        <a:rPr lang="en-US" sz="1400" dirty="0">
+                          <a:effectLst/>
+                        </a:rPr>
+                        <a:t>Return 2 (Emp 1 and Emp 2)</a:t>
+                      </a:r>
+                      <a:endParaRPr lang="en-US" sz="1400" dirty="0">
+                        <a:effectLst/>
+                        <a:latin typeface="Times New Roman" panose="02020603050405020304" pitchFamily="18" charset="0"/>
+                        <a:ea typeface="Calibri" panose="020F0502020204030204" pitchFamily="34" charset="0"/>
+                        <a:cs typeface="Times New Roman" panose="02020603050405020304" pitchFamily="18" charset="0"/>
+                      </a:endParaRPr>
+                    </a:p>
+                  </a:txBody>
+                  <a:tcPr marL="18194" marR="18194" marT="0" marB="0"/>
+                </a:tc>
+                <a:extLst>
+                  <a:ext uri="{0D108BD9-81ED-4DB2-BD59-A6C34878D82A}">
+                    <a16:rowId xmlns:a16="http://schemas.microsoft.com/office/drawing/2014/main" val="145290329"/>
+                  </a:ext>
+                </a:extLst>
+              </a:tr>
+            </a:tbl>
+          </a:graphicData>
+        </a:graphic>
+      </p:graphicFrame>
     </p:spTree>
     <p:extLst>
       <p:ext uri="{BB962C8B-B14F-4D97-AF65-F5344CB8AC3E}">
@@ -8817,31 +9657,677 @@
           </a:p>
         </p:txBody>
       </p:sp>
-      <p:sp>
-        <p:nvSpPr>
-          <p:cNvPr id="3" name="Content Placeholder 2">
+      <p:graphicFrame>
+        <p:nvGraphicFramePr>
+          <p:cNvPr id="4" name="Content Placeholder 3">
             <a:extLst>
               <a:ext uri="{FF2B5EF4-FFF2-40B4-BE49-F238E27FC236}">
-                <a16:creationId xmlns:a16="http://schemas.microsoft.com/office/drawing/2014/main" id="{1A35579C-D1B0-FA46-A057-796F118E5D5D}"/>
+                <a16:creationId xmlns:a16="http://schemas.microsoft.com/office/drawing/2014/main" id="{6B3F125B-12FC-4C50-9481-580A2E1F5942}"/>
               </a:ext>
             </a:extLst>
           </p:cNvPr>
-          <p:cNvSpPr>
-            <a:spLocks noGrp="1"/>
-          </p:cNvSpPr>
+          <p:cNvGraphicFramePr>
+            <a:graphicFrameLocks noGrp="1"/>
+          </p:cNvGraphicFramePr>
           <p:nvPr>
             <p:ph idx="1"/>
+            <p:extLst>
+              <p:ext uri="{D42A27DB-BD31-4B8C-83A1-F6EECF244321}">
+                <p14:modId xmlns:p14="http://schemas.microsoft.com/office/powerpoint/2010/main" val="33789128"/>
+              </p:ext>
+            </p:extLst>
           </p:nvPr>
-        </p:nvSpPr>
-        <p:spPr/>
-        <p:txBody>
-          <a:bodyPr/>
-          <a:lstStyle/>
-          <a:p>
-            <a:endParaRPr lang="en-US"/>
-          </a:p>
-        </p:txBody>
-      </p:sp>
+        </p:nvGraphicFramePr>
+        <p:xfrm>
+          <a:off x="875072" y="2336800"/>
+          <a:ext cx="10176386" cy="4132826"/>
+        </p:xfrm>
+        <a:graphic>
+          <a:graphicData uri="http://schemas.openxmlformats.org/drawingml/2006/table">
+            <a:tbl>
+              <a:tblPr firstRow="1" firstCol="1" bandRow="1">
+                <a:tableStyleId>{5C22544A-7EE6-4342-B048-85BDC9FD1C3A}</a:tableStyleId>
+              </a:tblPr>
+              <a:tblGrid>
+                <a:gridCol w="1479890">
+                  <a:extLst>
+                    <a:ext uri="{9D8B030D-6E8A-4147-A177-3AD203B41FA5}">
+                      <a16:colId xmlns:a16="http://schemas.microsoft.com/office/drawing/2014/main" val="3971933541"/>
+                    </a:ext>
+                  </a:extLst>
+                </a:gridCol>
+                <a:gridCol w="3554225">
+                  <a:extLst>
+                    <a:ext uri="{9D8B030D-6E8A-4147-A177-3AD203B41FA5}">
+                      <a16:colId xmlns:a16="http://schemas.microsoft.com/office/drawing/2014/main" val="550055155"/>
+                    </a:ext>
+                  </a:extLst>
+                </a:gridCol>
+                <a:gridCol w="5142271">
+                  <a:extLst>
+                    <a:ext uri="{9D8B030D-6E8A-4147-A177-3AD203B41FA5}">
+                      <a16:colId xmlns:a16="http://schemas.microsoft.com/office/drawing/2014/main" val="2647980549"/>
+                    </a:ext>
+                  </a:extLst>
+                </a:gridCol>
+              </a:tblGrid>
+              <a:tr h="413644">
+                <a:tc>
+                  <a:txBody>
+                    <a:bodyPr/>
+                    <a:lstStyle/>
+                    <a:p>
+                      <a:pPr marL="0" marR="0" algn="l">
+                        <a:lnSpc>
+                          <a:spcPct val="107000"/>
+                        </a:lnSpc>
+                        <a:spcBef>
+                          <a:spcPts val="0"/>
+                        </a:spcBef>
+                        <a:spcAft>
+                          <a:spcPts val="0"/>
+                        </a:spcAft>
+                      </a:pPr>
+                      <a:r>
+                        <a:rPr lang="en-US" sz="1600">
+                          <a:effectLst/>
+                        </a:rPr>
+                        <a:t>Test Case ID</a:t>
+                      </a:r>
+                      <a:endParaRPr lang="en-US" sz="1600">
+                        <a:effectLst/>
+                        <a:latin typeface="Times New Roman" panose="02020603050405020304" pitchFamily="18" charset="0"/>
+                        <a:ea typeface="Calibri" panose="020F0502020204030204" pitchFamily="34" charset="0"/>
+                        <a:cs typeface="Times New Roman" panose="02020603050405020304" pitchFamily="18" charset="0"/>
+                      </a:endParaRPr>
+                    </a:p>
+                  </a:txBody>
+                  <a:tcPr marL="65315" marR="65315" marT="0" marB="0" anchor="ctr"/>
+                </a:tc>
+                <a:tc gridSpan="2">
+                  <a:txBody>
+                    <a:bodyPr/>
+                    <a:lstStyle/>
+                    <a:p>
+                      <a:pPr marL="0" marR="0" algn="l">
+                        <a:lnSpc>
+                          <a:spcPct val="107000"/>
+                        </a:lnSpc>
+                        <a:spcBef>
+                          <a:spcPts val="0"/>
+                        </a:spcBef>
+                        <a:spcAft>
+                          <a:spcPts val="0"/>
+                        </a:spcAft>
+                      </a:pPr>
+                      <a:r>
+                        <a:rPr lang="en-US" sz="1600">
+                          <a:effectLst/>
+                        </a:rPr>
+                        <a:t>SubSystem-PMS-SalaryTest</a:t>
+                      </a:r>
+                      <a:endParaRPr lang="en-US" sz="1600">
+                        <a:effectLst/>
+                        <a:latin typeface="Times New Roman" panose="02020603050405020304" pitchFamily="18" charset="0"/>
+                        <a:ea typeface="Calibri" panose="020F0502020204030204" pitchFamily="34" charset="0"/>
+                        <a:cs typeface="Times New Roman" panose="02020603050405020304" pitchFamily="18" charset="0"/>
+                      </a:endParaRPr>
+                    </a:p>
+                  </a:txBody>
+                  <a:tcPr marL="65315" marR="65315" marT="0" marB="0" anchor="ctr"/>
+                </a:tc>
+                <a:tc hMerge="1">
+                  <a:txBody>
+                    <a:bodyPr/>
+                    <a:lstStyle/>
+                    <a:p>
+                      <a:endParaRPr lang="en-US"/>
+                    </a:p>
+                  </a:txBody>
+                  <a:tcPr/>
+                </a:tc>
+                <a:extLst>
+                  <a:ext uri="{0D108BD9-81ED-4DB2-BD59-A6C34878D82A}">
+                    <a16:rowId xmlns:a16="http://schemas.microsoft.com/office/drawing/2014/main" val="380334741"/>
+                  </a:ext>
+                </a:extLst>
+              </a:tr>
+              <a:tr h="269466">
+                <a:tc>
+                  <a:txBody>
+                    <a:bodyPr/>
+                    <a:lstStyle/>
+                    <a:p>
+                      <a:pPr marL="0" marR="0" algn="l">
+                        <a:lnSpc>
+                          <a:spcPct val="107000"/>
+                        </a:lnSpc>
+                        <a:spcBef>
+                          <a:spcPts val="0"/>
+                        </a:spcBef>
+                        <a:spcAft>
+                          <a:spcPts val="0"/>
+                        </a:spcAft>
+                      </a:pPr>
+                      <a:r>
+                        <a:rPr lang="en-US" sz="1600">
+                          <a:effectLst/>
+                        </a:rPr>
+                        <a:t>Purpose</a:t>
+                      </a:r>
+                      <a:endParaRPr lang="en-US" sz="1600">
+                        <a:effectLst/>
+                        <a:latin typeface="Times New Roman" panose="02020603050405020304" pitchFamily="18" charset="0"/>
+                        <a:ea typeface="Calibri" panose="020F0502020204030204" pitchFamily="34" charset="0"/>
+                        <a:cs typeface="Times New Roman" panose="02020603050405020304" pitchFamily="18" charset="0"/>
+                      </a:endParaRPr>
+                    </a:p>
+                  </a:txBody>
+                  <a:tcPr marL="65315" marR="65315" marT="0" marB="0" anchor="ctr"/>
+                </a:tc>
+                <a:tc gridSpan="2">
+                  <a:txBody>
+                    <a:bodyPr/>
+                    <a:lstStyle/>
+                    <a:p>
+                      <a:pPr marL="0" marR="0" algn="l">
+                        <a:lnSpc>
+                          <a:spcPct val="107000"/>
+                        </a:lnSpc>
+                        <a:spcBef>
+                          <a:spcPts val="0"/>
+                        </a:spcBef>
+                        <a:spcAft>
+                          <a:spcPts val="0"/>
+                        </a:spcAft>
+                      </a:pPr>
+                      <a:r>
+                        <a:rPr lang="en-US" sz="1600">
+                          <a:effectLst/>
+                        </a:rPr>
+                        <a:t>Test the interactions between multiple salary methods</a:t>
+                      </a:r>
+                      <a:endParaRPr lang="en-US" sz="1600">
+                        <a:effectLst/>
+                        <a:latin typeface="Times New Roman" panose="02020603050405020304" pitchFamily="18" charset="0"/>
+                        <a:ea typeface="Calibri" panose="020F0502020204030204" pitchFamily="34" charset="0"/>
+                        <a:cs typeface="Times New Roman" panose="02020603050405020304" pitchFamily="18" charset="0"/>
+                      </a:endParaRPr>
+                    </a:p>
+                  </a:txBody>
+                  <a:tcPr marL="65315" marR="65315" marT="0" marB="0" anchor="ctr"/>
+                </a:tc>
+                <a:tc hMerge="1">
+                  <a:txBody>
+                    <a:bodyPr/>
+                    <a:lstStyle/>
+                    <a:p>
+                      <a:endParaRPr lang="en-US"/>
+                    </a:p>
+                  </a:txBody>
+                  <a:tcPr/>
+                </a:tc>
+                <a:extLst>
+                  <a:ext uri="{0D108BD9-81ED-4DB2-BD59-A6C34878D82A}">
+                    <a16:rowId xmlns:a16="http://schemas.microsoft.com/office/drawing/2014/main" val="1633119559"/>
+                  </a:ext>
+                </a:extLst>
+              </a:tr>
+              <a:tr h="269466">
+                <a:tc>
+                  <a:txBody>
+                    <a:bodyPr/>
+                    <a:lstStyle/>
+                    <a:p>
+                      <a:pPr marL="0" marR="0" algn="l">
+                        <a:lnSpc>
+                          <a:spcPct val="107000"/>
+                        </a:lnSpc>
+                        <a:spcBef>
+                          <a:spcPts val="0"/>
+                        </a:spcBef>
+                        <a:spcAft>
+                          <a:spcPts val="0"/>
+                        </a:spcAft>
+                      </a:pPr>
+                      <a:r>
+                        <a:rPr lang="en-US" sz="1600">
+                          <a:effectLst/>
+                        </a:rPr>
+                        <a:t>Test Set Up</a:t>
+                      </a:r>
+                      <a:endParaRPr lang="en-US" sz="1600">
+                        <a:effectLst/>
+                        <a:latin typeface="Times New Roman" panose="02020603050405020304" pitchFamily="18" charset="0"/>
+                        <a:ea typeface="Calibri" panose="020F0502020204030204" pitchFamily="34" charset="0"/>
+                        <a:cs typeface="Times New Roman" panose="02020603050405020304" pitchFamily="18" charset="0"/>
+                      </a:endParaRPr>
+                    </a:p>
+                  </a:txBody>
+                  <a:tcPr marL="65315" marR="65315" marT="0" marB="0" anchor="ctr"/>
+                </a:tc>
+                <a:tc gridSpan="2">
+                  <a:txBody>
+                    <a:bodyPr/>
+                    <a:lstStyle/>
+                    <a:p>
+                      <a:pPr marL="0" marR="0" algn="l">
+                        <a:lnSpc>
+                          <a:spcPct val="107000"/>
+                        </a:lnSpc>
+                        <a:spcBef>
+                          <a:spcPts val="0"/>
+                        </a:spcBef>
+                        <a:spcAft>
+                          <a:spcPts val="0"/>
+                        </a:spcAft>
+                      </a:pPr>
+                      <a:r>
+                        <a:rPr lang="en-US" sz="1600">
+                          <a:effectLst/>
+                        </a:rPr>
+                        <a:t>Data base found in section 3.1.2</a:t>
+                      </a:r>
+                      <a:endParaRPr lang="en-US" sz="1600">
+                        <a:effectLst/>
+                        <a:latin typeface="Times New Roman" panose="02020603050405020304" pitchFamily="18" charset="0"/>
+                        <a:ea typeface="Calibri" panose="020F0502020204030204" pitchFamily="34" charset="0"/>
+                        <a:cs typeface="Times New Roman" panose="02020603050405020304" pitchFamily="18" charset="0"/>
+                      </a:endParaRPr>
+                    </a:p>
+                  </a:txBody>
+                  <a:tcPr marL="65315" marR="65315" marT="0" marB="0" anchor="ctr"/>
+                </a:tc>
+                <a:tc hMerge="1">
+                  <a:txBody>
+                    <a:bodyPr/>
+                    <a:lstStyle/>
+                    <a:p>
+                      <a:endParaRPr lang="en-US"/>
+                    </a:p>
+                  </a:txBody>
+                  <a:tcPr/>
+                </a:tc>
+                <a:extLst>
+                  <a:ext uri="{0D108BD9-81ED-4DB2-BD59-A6C34878D82A}">
+                    <a16:rowId xmlns:a16="http://schemas.microsoft.com/office/drawing/2014/main" val="1158906688"/>
+                  </a:ext>
+                </a:extLst>
+              </a:tr>
+              <a:tr h="269466">
+                <a:tc gridSpan="2">
+                  <a:txBody>
+                    <a:bodyPr/>
+                    <a:lstStyle/>
+                    <a:p>
+                      <a:pPr marL="0" marR="0" algn="ctr">
+                        <a:lnSpc>
+                          <a:spcPct val="107000"/>
+                        </a:lnSpc>
+                        <a:spcBef>
+                          <a:spcPts val="0"/>
+                        </a:spcBef>
+                        <a:spcAft>
+                          <a:spcPts val="0"/>
+                        </a:spcAft>
+                      </a:pPr>
+                      <a:r>
+                        <a:rPr lang="en-US" sz="1600">
+                          <a:effectLst/>
+                        </a:rPr>
+                        <a:t>Input</a:t>
+                      </a:r>
+                      <a:endParaRPr lang="en-US" sz="1600">
+                        <a:effectLst/>
+                        <a:latin typeface="Times New Roman" panose="02020603050405020304" pitchFamily="18" charset="0"/>
+                        <a:ea typeface="Calibri" panose="020F0502020204030204" pitchFamily="34" charset="0"/>
+                        <a:cs typeface="Times New Roman" panose="02020603050405020304" pitchFamily="18" charset="0"/>
+                      </a:endParaRPr>
+                    </a:p>
+                  </a:txBody>
+                  <a:tcPr marL="65315" marR="65315" marT="0" marB="0" anchor="ctr"/>
+                </a:tc>
+                <a:tc hMerge="1">
+                  <a:txBody>
+                    <a:bodyPr/>
+                    <a:lstStyle/>
+                    <a:p>
+                      <a:endParaRPr lang="en-US"/>
+                    </a:p>
+                  </a:txBody>
+                  <a:tcPr/>
+                </a:tc>
+                <a:tc>
+                  <a:txBody>
+                    <a:bodyPr/>
+                    <a:lstStyle/>
+                    <a:p>
+                      <a:pPr marL="0" marR="0" algn="ctr">
+                        <a:lnSpc>
+                          <a:spcPct val="107000"/>
+                        </a:lnSpc>
+                        <a:spcBef>
+                          <a:spcPts val="0"/>
+                        </a:spcBef>
+                        <a:spcAft>
+                          <a:spcPts val="0"/>
+                        </a:spcAft>
+                      </a:pPr>
+                      <a:r>
+                        <a:rPr lang="en-US" sz="1600">
+                          <a:effectLst/>
+                        </a:rPr>
+                        <a:t>Output</a:t>
+                      </a:r>
+                      <a:endParaRPr lang="en-US" sz="1600">
+                        <a:effectLst/>
+                        <a:latin typeface="Times New Roman" panose="02020603050405020304" pitchFamily="18" charset="0"/>
+                        <a:ea typeface="Calibri" panose="020F0502020204030204" pitchFamily="34" charset="0"/>
+                        <a:cs typeface="Times New Roman" panose="02020603050405020304" pitchFamily="18" charset="0"/>
+                      </a:endParaRPr>
+                    </a:p>
+                  </a:txBody>
+                  <a:tcPr marL="65315" marR="65315" marT="0" marB="0" anchor="ctr"/>
+                </a:tc>
+                <a:extLst>
+                  <a:ext uri="{0D108BD9-81ED-4DB2-BD59-A6C34878D82A}">
+                    <a16:rowId xmlns:a16="http://schemas.microsoft.com/office/drawing/2014/main" val="1245358923"/>
+                  </a:ext>
+                </a:extLst>
+              </a:tr>
+              <a:tr h="2910784">
+                <a:tc gridSpan="2">
+                  <a:txBody>
+                    <a:bodyPr/>
+                    <a:lstStyle/>
+                    <a:p>
+                      <a:pPr marL="0" marR="0" algn="l">
+                        <a:lnSpc>
+                          <a:spcPct val="107000"/>
+                        </a:lnSpc>
+                        <a:spcBef>
+                          <a:spcPts val="0"/>
+                        </a:spcBef>
+                        <a:spcAft>
+                          <a:spcPts val="0"/>
+                        </a:spcAft>
+                      </a:pPr>
+                      <a:r>
+                        <a:rPr lang="en-US" sz="1600" dirty="0" err="1">
+                          <a:effectLst/>
+                        </a:rPr>
+                        <a:t>SalarycalculateSalary</a:t>
+                      </a:r>
+                      <a:r>
+                        <a:rPr lang="en-US" sz="1600" dirty="0">
+                          <a:effectLst/>
+                        </a:rPr>
+                        <a:t>();</a:t>
+                      </a:r>
+                    </a:p>
+                    <a:p>
+                      <a:pPr marL="0" marR="0" algn="l">
+                        <a:lnSpc>
+                          <a:spcPct val="107000"/>
+                        </a:lnSpc>
+                        <a:spcBef>
+                          <a:spcPts val="0"/>
+                        </a:spcBef>
+                        <a:spcAft>
+                          <a:spcPts val="0"/>
+                        </a:spcAft>
+                      </a:pPr>
+                      <a:r>
+                        <a:rPr lang="en-US" sz="1600" dirty="0">
+                          <a:effectLst/>
+                        </a:rPr>
+                        <a:t>		</a:t>
+                      </a:r>
+                    </a:p>
+                    <a:p>
+                      <a:pPr marL="0" marR="0" algn="l">
+                        <a:lnSpc>
+                          <a:spcPct val="107000"/>
+                        </a:lnSpc>
+                        <a:spcBef>
+                          <a:spcPts val="0"/>
+                        </a:spcBef>
+                        <a:spcAft>
+                          <a:spcPts val="0"/>
+                        </a:spcAft>
+                      </a:pPr>
+                      <a:r>
+                        <a:rPr lang="en-US" sz="1600" dirty="0" err="1">
+                          <a:effectLst/>
+                        </a:rPr>
+                        <a:t>SalarygetEmpPays</a:t>
+                      </a:r>
+                      <a:r>
+                        <a:rPr lang="en-US" sz="1600" dirty="0">
+                          <a:effectLst/>
+                        </a:rPr>
+                        <a:t>();</a:t>
+                      </a:r>
+                    </a:p>
+                    <a:p>
+                      <a:pPr marL="0" marR="0" algn="l">
+                        <a:lnSpc>
+                          <a:spcPct val="107000"/>
+                        </a:lnSpc>
+                        <a:spcBef>
+                          <a:spcPts val="0"/>
+                        </a:spcBef>
+                        <a:spcAft>
+                          <a:spcPts val="0"/>
+                        </a:spcAft>
+                      </a:pPr>
+                      <a:r>
+                        <a:rPr lang="en-US" sz="1600" dirty="0">
+                          <a:effectLst/>
+                        </a:rPr>
+                        <a:t>		</a:t>
+                      </a:r>
+                    </a:p>
+                    <a:p>
+                      <a:pPr marL="0" marR="0" algn="l">
+                        <a:lnSpc>
+                          <a:spcPct val="107000"/>
+                        </a:lnSpc>
+                        <a:spcBef>
+                          <a:spcPts val="0"/>
+                        </a:spcBef>
+                        <a:spcAft>
+                          <a:spcPts val="0"/>
+                        </a:spcAft>
+                      </a:pPr>
+                      <a:r>
+                        <a:rPr lang="en-US" sz="1600" dirty="0" err="1">
+                          <a:effectLst/>
+                        </a:rPr>
+                        <a:t>SalarygetEmpPay</a:t>
+                      </a:r>
+                      <a:r>
+                        <a:rPr lang="en-US" sz="1600" dirty="0">
+                          <a:effectLst/>
+                        </a:rPr>
+                        <a:t>("2");	    </a:t>
+                      </a:r>
+                    </a:p>
+                    <a:p>
+                      <a:pPr marL="0" marR="0" algn="l">
+                        <a:lnSpc>
+                          <a:spcPct val="107000"/>
+                        </a:lnSpc>
+                        <a:spcBef>
+                          <a:spcPts val="0"/>
+                        </a:spcBef>
+                        <a:spcAft>
+                          <a:spcPts val="0"/>
+                        </a:spcAft>
+                      </a:pPr>
+                      <a:r>
+                        <a:rPr lang="en-US" sz="1600" dirty="0">
+                          <a:effectLst/>
+                        </a:rPr>
+                        <a:t>		</a:t>
+                      </a:r>
+                    </a:p>
+                    <a:p>
+                      <a:pPr marL="0" marR="0" algn="l">
+                        <a:lnSpc>
+                          <a:spcPct val="107000"/>
+                        </a:lnSpc>
+                        <a:spcBef>
+                          <a:spcPts val="0"/>
+                        </a:spcBef>
+                        <a:spcAft>
+                          <a:spcPts val="0"/>
+                        </a:spcAft>
+                      </a:pPr>
+                      <a:r>
+                        <a:rPr lang="en-US" sz="1600" dirty="0">
+                          <a:effectLst/>
+                        </a:rPr>
+                        <a:t> </a:t>
+                      </a:r>
+                      <a:endParaRPr lang="en-US" sz="1600" dirty="0">
+                        <a:effectLst/>
+                        <a:latin typeface="Times New Roman" panose="02020603050405020304" pitchFamily="18" charset="0"/>
+                        <a:ea typeface="Calibri" panose="020F0502020204030204" pitchFamily="34" charset="0"/>
+                        <a:cs typeface="Times New Roman" panose="02020603050405020304" pitchFamily="18" charset="0"/>
+                      </a:endParaRPr>
+                    </a:p>
+                  </a:txBody>
+                  <a:tcPr marL="65315" marR="65315" marT="0" marB="0"/>
+                </a:tc>
+                <a:tc hMerge="1">
+                  <a:txBody>
+                    <a:bodyPr/>
+                    <a:lstStyle/>
+                    <a:p>
+                      <a:endParaRPr lang="en-US"/>
+                    </a:p>
+                  </a:txBody>
+                  <a:tcPr/>
+                </a:tc>
+                <a:tc>
+                  <a:txBody>
+                    <a:bodyPr/>
+                    <a:lstStyle/>
+                    <a:p>
+                      <a:pPr marL="0" marR="0" algn="l">
+                        <a:lnSpc>
+                          <a:spcPct val="107000"/>
+                        </a:lnSpc>
+                        <a:spcBef>
+                          <a:spcPts val="0"/>
+                        </a:spcBef>
+                        <a:spcAft>
+                          <a:spcPts val="0"/>
+                        </a:spcAft>
+                      </a:pPr>
+                      <a:r>
+                        <a:rPr lang="en-US" sz="1600" dirty="0">
+                          <a:effectLst/>
+                        </a:rPr>
+                        <a:t>Return 4, 2 from Setup DB, 2 from method</a:t>
+                      </a:r>
+                    </a:p>
+                    <a:p>
+                      <a:pPr marL="0" marR="0" algn="l">
+                        <a:lnSpc>
+                          <a:spcPct val="107000"/>
+                        </a:lnSpc>
+                        <a:spcBef>
+                          <a:spcPts val="0"/>
+                        </a:spcBef>
+                        <a:spcAft>
+                          <a:spcPts val="0"/>
+                        </a:spcAft>
+                      </a:pPr>
+                      <a:r>
+                        <a:rPr lang="en-US" sz="1600" dirty="0">
+                          <a:effectLst/>
+                        </a:rPr>
+                        <a:t> </a:t>
+                      </a:r>
+                    </a:p>
+                    <a:p>
+                      <a:pPr marL="0" marR="0" algn="l">
+                        <a:lnSpc>
+                          <a:spcPct val="107000"/>
+                        </a:lnSpc>
+                        <a:spcBef>
+                          <a:spcPts val="0"/>
+                        </a:spcBef>
+                        <a:spcAft>
+                          <a:spcPts val="0"/>
+                        </a:spcAft>
+                      </a:pPr>
+                      <a:r>
+                        <a:rPr lang="en-US" sz="1600" dirty="0">
+                          <a:effectLst/>
+                        </a:rPr>
+                        <a:t>Return 4, 4 salaries in DB</a:t>
+                      </a:r>
+                    </a:p>
+                    <a:p>
+                      <a:pPr marL="0" marR="0" algn="l">
+                        <a:lnSpc>
+                          <a:spcPct val="107000"/>
+                        </a:lnSpc>
+                        <a:spcBef>
+                          <a:spcPts val="0"/>
+                        </a:spcBef>
+                        <a:spcAft>
+                          <a:spcPts val="0"/>
+                        </a:spcAft>
+                      </a:pPr>
+                      <a:r>
+                        <a:rPr lang="en-US" sz="1600" dirty="0">
+                          <a:effectLst/>
+                        </a:rPr>
+                        <a:t> </a:t>
+                      </a:r>
+                    </a:p>
+                    <a:p>
+                      <a:pPr marL="0" marR="0" algn="l">
+                        <a:lnSpc>
+                          <a:spcPct val="107000"/>
+                        </a:lnSpc>
+                        <a:spcBef>
+                          <a:spcPts val="0"/>
+                        </a:spcBef>
+                        <a:spcAft>
+                          <a:spcPts val="0"/>
+                        </a:spcAft>
+                      </a:pPr>
+                      <a:r>
+                        <a:rPr lang="en-US" sz="1600" dirty="0">
+                          <a:effectLst/>
+                        </a:rPr>
+                        <a:t>Return 2, 1 from setup DB, 1 from calculate salary method</a:t>
+                      </a:r>
+                      <a:endParaRPr lang="en-US" sz="1600" dirty="0">
+                        <a:effectLst/>
+                        <a:latin typeface="Times New Roman" panose="02020603050405020304" pitchFamily="18" charset="0"/>
+                        <a:ea typeface="Calibri" panose="020F0502020204030204" pitchFamily="34" charset="0"/>
+                        <a:cs typeface="Times New Roman" panose="02020603050405020304" pitchFamily="18" charset="0"/>
+                      </a:endParaRPr>
+                    </a:p>
+                  </a:txBody>
+                  <a:tcPr marL="65315" marR="65315" marT="0" marB="0"/>
+                </a:tc>
+                <a:extLst>
+                  <a:ext uri="{0D108BD9-81ED-4DB2-BD59-A6C34878D82A}">
+                    <a16:rowId xmlns:a16="http://schemas.microsoft.com/office/drawing/2014/main" val="3962366155"/>
+                  </a:ext>
+                </a:extLst>
+              </a:tr>
+            </a:tbl>
+          </a:graphicData>
+        </a:graphic>
+      </p:graphicFrame>
     </p:spTree>
     <p:extLst>
       <p:ext uri="{BB962C8B-B14F-4D97-AF65-F5344CB8AC3E}">
@@ -9931,7 +11417,7 @@
         </p:nvGraphicFramePr>
         <p:xfrm>
           <a:off x="479794" y="4334024"/>
-          <a:ext cx="11074535" cy="1831467"/>
+          <a:ext cx="11074535" cy="1813877"/>
         </p:xfrm>
         <a:graphic>
           <a:graphicData uri="http://schemas.openxmlformats.org/drawingml/2006/table">
@@ -13947,15 +15433,7 @@
           <a:p>
             <a:r>
               <a:rPr lang="en-US" sz="2200" dirty="0"/>
-              <a:t>Subsystem Tests goes through all of the units to make sure they work properly together. JUnit and </a:t>
-            </a:r>
-            <a:r>
-              <a:rPr lang="en-US" sz="2200" dirty="0" err="1"/>
-              <a:t>Mokito</a:t>
-            </a:r>
-            <a:r>
-              <a:rPr lang="en-US" sz="2200" dirty="0"/>
-              <a:t> are used within the Eclipse IDE to perform all of the subsystem tests.</a:t>
+              <a:t>Subsystem Tests goes through all of the units to make sure they work properly together. JUnit and Mockito are used within the Eclipse IDE to perform all of the subsystem tests.</a:t>
             </a:r>
           </a:p>
           <a:p>
@@ -14563,7 +16041,12 @@
             <p:ph idx="1"/>
           </p:nvPr>
         </p:nvSpPr>
-        <p:spPr/>
+        <p:spPr>
+          <a:xfrm>
+            <a:off x="680321" y="2336873"/>
+            <a:ext cx="9613861" cy="4044262"/>
+          </a:xfrm>
+        </p:spPr>
         <p:txBody>
           <a:bodyPr>
             <a:normAutofit fontScale="92500" lnSpcReduction="20000"/>
@@ -14638,6 +16121,16 @@
               <a:rPr lang="en-US" dirty="0"/>
               <a:t>View Profile</a:t>
             </a:r>
+          </a:p>
+          <a:p>
+            <a:r>
+              <a:rPr lang="en-US" dirty="0"/>
+              <a:t>Reset Password (Security)</a:t>
+            </a:r>
+          </a:p>
+          <a:p>
+            <a:pPr lvl="0"/>
+            <a:endParaRPr lang="en-US" dirty="0"/>
           </a:p>
           <a:p>
             <a:endParaRPr lang="en-US" dirty="0"/>
@@ -14748,13 +16241,6 @@
             <a:r>
               <a:rPr lang="en-US" dirty="0"/>
               <a:t>Duplicate Submission</a:t>
-            </a:r>
-          </a:p>
-          <a:p>
-            <a:pPr lvl="0"/>
-            <a:r>
-              <a:rPr lang="en-US" dirty="0"/>
-              <a:t>Reset Password (Security)</a:t>
             </a:r>
           </a:p>
           <a:p>

</xml_diff>